<commit_message>
added phone attributes and cleaned up lines
</commit_message>
<xml_diff>
--- a/Project/ER Model.pptx
+++ b/Project/ER Model.pptx
@@ -122,12 +122,180 @@
 <p1510:revInfo xmlns:a="http://schemas.openxmlformats.org/drawingml/2006/main" xmlns:r="http://schemas.openxmlformats.org/officeDocument/2006/relationships" xmlns:p1510="http://schemas.microsoft.com/office/powerpoint/2015/10/main">
   <p1510:revLst>
     <p1510:client id="{520D5F83-C509-40EF-B9FD-99FC93E75FE1}" v="13" dt="2022-10-26T20:57:55.599"/>
+    <p1510:client id="{E16A9B21-8A09-4821-A32D-4609244DB1F6}" v="4" dt="2022-10-27T15:37:32.708"/>
   </p1510:revLst>
 </p1510:revInfo>
 </file>
 
 <file path=ppt/changesInfos/changesInfo1.xml><?xml version="1.0" encoding="utf-8"?>
 <pc:chgInfo xmlns:a="http://schemas.openxmlformats.org/drawingml/2006/main" xmlns:r="http://schemas.openxmlformats.org/officeDocument/2006/relationships" xmlns:ac="http://schemas.microsoft.com/office/drawing/2013/main/command" xmlns:pc="http://schemas.microsoft.com/office/powerpoint/2013/main/command">
+  <pc:docChgLst>
+    <pc:chgData name="Parmanto, Dharma" userId="4f9a10d7-3858-4ebd-b991-a7b30feaabcd" providerId="ADAL" clId="{E16A9B21-8A09-4821-A32D-4609244DB1F6}"/>
+    <pc:docChg chg="custSel modSld">
+      <pc:chgData name="Parmanto, Dharma" userId="4f9a10d7-3858-4ebd-b991-a7b30feaabcd" providerId="ADAL" clId="{E16A9B21-8A09-4821-A32D-4609244DB1F6}" dt="2022-10-27T15:39:58.704" v="80" actId="14100"/>
+      <pc:docMkLst>
+        <pc:docMk/>
+      </pc:docMkLst>
+      <pc:sldChg chg="addSp delSp modSp mod">
+        <pc:chgData name="Parmanto, Dharma" userId="4f9a10d7-3858-4ebd-b991-a7b30feaabcd" providerId="ADAL" clId="{E16A9B21-8A09-4821-A32D-4609244DB1F6}" dt="2022-10-27T15:39:42.702" v="79" actId="692"/>
+        <pc:sldMkLst>
+          <pc:docMk/>
+          <pc:sldMk cId="3265300168" sldId="257"/>
+        </pc:sldMkLst>
+        <pc:cxnChg chg="del">
+          <ac:chgData name="Parmanto, Dharma" userId="4f9a10d7-3858-4ebd-b991-a7b30feaabcd" providerId="ADAL" clId="{E16A9B21-8A09-4821-A32D-4609244DB1F6}" dt="2022-10-27T15:38:40.039" v="64" actId="478"/>
+          <ac:cxnSpMkLst>
+            <pc:docMk/>
+            <pc:sldMk cId="3265300168" sldId="257"/>
+            <ac:cxnSpMk id="2" creationId="{43848DF1-C15D-58C8-F651-16298F038520}"/>
+          </ac:cxnSpMkLst>
+        </pc:cxnChg>
+        <pc:cxnChg chg="mod">
+          <ac:chgData name="Parmanto, Dharma" userId="4f9a10d7-3858-4ebd-b991-a7b30feaabcd" providerId="ADAL" clId="{E16A9B21-8A09-4821-A32D-4609244DB1F6}" dt="2022-10-27T15:39:27.401" v="76" actId="692"/>
+          <ac:cxnSpMkLst>
+            <pc:docMk/>
+            <pc:sldMk cId="3265300168" sldId="257"/>
+            <ac:cxnSpMk id="14" creationId="{154F5747-B922-40F0-BAE4-0F814299123F}"/>
+          </ac:cxnSpMkLst>
+        </pc:cxnChg>
+        <pc:cxnChg chg="del">
+          <ac:chgData name="Parmanto, Dharma" userId="4f9a10d7-3858-4ebd-b991-a7b30feaabcd" providerId="ADAL" clId="{E16A9B21-8A09-4821-A32D-4609244DB1F6}" dt="2022-10-27T15:38:37.447" v="63" actId="478"/>
+          <ac:cxnSpMkLst>
+            <pc:docMk/>
+            <pc:sldMk cId="3265300168" sldId="257"/>
+            <ac:cxnSpMk id="19" creationId="{8D84B695-7A00-B609-E61F-40846BF69AC8}"/>
+          </ac:cxnSpMkLst>
+        </pc:cxnChg>
+        <pc:cxnChg chg="add mod">
+          <ac:chgData name="Parmanto, Dharma" userId="4f9a10d7-3858-4ebd-b991-a7b30feaabcd" providerId="ADAL" clId="{E16A9B21-8A09-4821-A32D-4609244DB1F6}" dt="2022-10-27T15:39:09.024" v="73" actId="692"/>
+          <ac:cxnSpMkLst>
+            <pc:docMk/>
+            <pc:sldMk cId="3265300168" sldId="257"/>
+            <ac:cxnSpMk id="20" creationId="{594EA61F-5C02-983F-DB32-D462FD79F789}"/>
+          </ac:cxnSpMkLst>
+        </pc:cxnChg>
+        <pc:cxnChg chg="del">
+          <ac:chgData name="Parmanto, Dharma" userId="4f9a10d7-3858-4ebd-b991-a7b30feaabcd" providerId="ADAL" clId="{E16A9B21-8A09-4821-A32D-4609244DB1F6}" dt="2022-10-27T15:39:17.711" v="74" actId="478"/>
+          <ac:cxnSpMkLst>
+            <pc:docMk/>
+            <pc:sldMk cId="3265300168" sldId="257"/>
+            <ac:cxnSpMk id="21" creationId="{205266DB-06B1-18F7-F64C-AAD0FF062BD0}"/>
+          </ac:cxnSpMkLst>
+        </pc:cxnChg>
+        <pc:cxnChg chg="del mod">
+          <ac:chgData name="Parmanto, Dharma" userId="4f9a10d7-3858-4ebd-b991-a7b30feaabcd" providerId="ADAL" clId="{E16A9B21-8A09-4821-A32D-4609244DB1F6}" dt="2022-10-27T15:38:41.555" v="65" actId="478"/>
+          <ac:cxnSpMkLst>
+            <pc:docMk/>
+            <pc:sldMk cId="3265300168" sldId="257"/>
+            <ac:cxnSpMk id="32" creationId="{42DCB8B2-3CAA-D1E9-2E05-300E3E86039E}"/>
+          </ac:cxnSpMkLst>
+        </pc:cxnChg>
+        <pc:cxnChg chg="del mod">
+          <ac:chgData name="Parmanto, Dharma" userId="4f9a10d7-3858-4ebd-b991-a7b30feaabcd" providerId="ADAL" clId="{E16A9B21-8A09-4821-A32D-4609244DB1F6}" dt="2022-10-27T15:38:43.373" v="66" actId="478"/>
+          <ac:cxnSpMkLst>
+            <pc:docMk/>
+            <pc:sldMk cId="3265300168" sldId="257"/>
+            <ac:cxnSpMk id="35" creationId="{F5395CE3-C90A-45C5-1758-DCFBBC0FFAC1}"/>
+          </ac:cxnSpMkLst>
+        </pc:cxnChg>
+        <pc:cxnChg chg="mod">
+          <ac:chgData name="Parmanto, Dharma" userId="4f9a10d7-3858-4ebd-b991-a7b30feaabcd" providerId="ADAL" clId="{E16A9B21-8A09-4821-A32D-4609244DB1F6}" dt="2022-10-27T15:39:42.702" v="79" actId="692"/>
+          <ac:cxnSpMkLst>
+            <pc:docMk/>
+            <pc:sldMk cId="3265300168" sldId="257"/>
+            <ac:cxnSpMk id="43" creationId="{5A96B510-D029-C4C7-8AE4-84DF53FFD064}"/>
+          </ac:cxnSpMkLst>
+        </pc:cxnChg>
+        <pc:cxnChg chg="del">
+          <ac:chgData name="Parmanto, Dharma" userId="4f9a10d7-3858-4ebd-b991-a7b30feaabcd" providerId="ADAL" clId="{E16A9B21-8A09-4821-A32D-4609244DB1F6}" dt="2022-10-27T15:39:36.516" v="77" actId="478"/>
+          <ac:cxnSpMkLst>
+            <pc:docMk/>
+            <pc:sldMk cId="3265300168" sldId="257"/>
+            <ac:cxnSpMk id="48" creationId="{2D057358-2EEE-EC68-7A39-806CDCB4A671}"/>
+          </ac:cxnSpMkLst>
+        </pc:cxnChg>
+        <pc:cxnChg chg="mod">
+          <ac:chgData name="Parmanto, Dharma" userId="4f9a10d7-3858-4ebd-b991-a7b30feaabcd" providerId="ADAL" clId="{E16A9B21-8A09-4821-A32D-4609244DB1F6}" dt="2022-10-27T15:38:34.136" v="62" actId="692"/>
+          <ac:cxnSpMkLst>
+            <pc:docMk/>
+            <pc:sldMk cId="3265300168" sldId="257"/>
+            <ac:cxnSpMk id="53" creationId="{D4013AB7-7F06-3512-96C3-486A4AF579CD}"/>
+          </ac:cxnSpMkLst>
+        </pc:cxnChg>
+        <pc:cxnChg chg="del">
+          <ac:chgData name="Parmanto, Dharma" userId="4f9a10d7-3858-4ebd-b991-a7b30feaabcd" providerId="ADAL" clId="{E16A9B21-8A09-4821-A32D-4609244DB1F6}" dt="2022-10-27T15:38:27.839" v="60" actId="478"/>
+          <ac:cxnSpMkLst>
+            <pc:docMk/>
+            <pc:sldMk cId="3265300168" sldId="257"/>
+            <ac:cxnSpMk id="59" creationId="{E88901CF-5821-8CD1-D6C5-E434D5E3404B}"/>
+          </ac:cxnSpMkLst>
+        </pc:cxnChg>
+      </pc:sldChg>
+      <pc:sldChg chg="addSp delSp modSp mod">
+        <pc:chgData name="Parmanto, Dharma" userId="4f9a10d7-3858-4ebd-b991-a7b30feaabcd" providerId="ADAL" clId="{E16A9B21-8A09-4821-A32D-4609244DB1F6}" dt="2022-10-27T15:39:58.704" v="80" actId="14100"/>
+        <pc:sldMkLst>
+          <pc:docMk/>
+          <pc:sldMk cId="804916847" sldId="262"/>
+        </pc:sldMkLst>
+        <pc:spChg chg="add mod">
+          <ac:chgData name="Parmanto, Dharma" userId="4f9a10d7-3858-4ebd-b991-a7b30feaabcd" providerId="ADAL" clId="{E16A9B21-8A09-4821-A32D-4609244DB1F6}" dt="2022-10-27T15:37:31.138" v="51" actId="1076"/>
+          <ac:spMkLst>
+            <pc:docMk/>
+            <pc:sldMk cId="804916847" sldId="262"/>
+            <ac:spMk id="3" creationId="{37B4A138-19A4-8C60-1F83-BF00B5CE4074}"/>
+          </ac:spMkLst>
+        </pc:spChg>
+        <pc:spChg chg="add mod">
+          <ac:chgData name="Parmanto, Dharma" userId="4f9a10d7-3858-4ebd-b991-a7b30feaabcd" providerId="ADAL" clId="{E16A9B21-8A09-4821-A32D-4609244DB1F6}" dt="2022-10-27T15:38:06.152" v="58" actId="1076"/>
+          <ac:spMkLst>
+            <pc:docMk/>
+            <pc:sldMk cId="804916847" sldId="262"/>
+            <ac:spMk id="8" creationId="{37D7C8C4-A62D-EE1B-6A0A-862D6219969E}"/>
+          </ac:spMkLst>
+        </pc:spChg>
+        <pc:spChg chg="mod">
+          <ac:chgData name="Parmanto, Dharma" userId="4f9a10d7-3858-4ebd-b991-a7b30feaabcd" providerId="ADAL" clId="{E16A9B21-8A09-4821-A32D-4609244DB1F6}" dt="2022-10-27T15:38:11.922" v="59" actId="692"/>
+          <ac:spMkLst>
+            <pc:docMk/>
+            <pc:sldMk cId="804916847" sldId="262"/>
+            <ac:spMk id="13" creationId="{C8C613BA-362A-DCC3-145C-A77FEF830EE5}"/>
+          </ac:spMkLst>
+        </pc:spChg>
+        <pc:spChg chg="del mod">
+          <ac:chgData name="Parmanto, Dharma" userId="4f9a10d7-3858-4ebd-b991-a7b30feaabcd" providerId="ADAL" clId="{E16A9B21-8A09-4821-A32D-4609244DB1F6}" dt="2022-10-27T15:36:41.224" v="41" actId="478"/>
+          <ac:spMkLst>
+            <pc:docMk/>
+            <pc:sldMk cId="804916847" sldId="262"/>
+            <ac:spMk id="81" creationId="{DC5533F3-94B4-FE5F-3DDC-58209D1840AE}"/>
+          </ac:spMkLst>
+        </pc:spChg>
+        <pc:cxnChg chg="add mod">
+          <ac:chgData name="Parmanto, Dharma" userId="4f9a10d7-3858-4ebd-b991-a7b30feaabcd" providerId="ADAL" clId="{E16A9B21-8A09-4821-A32D-4609244DB1F6}" dt="2022-10-27T15:38:06.152" v="58" actId="1076"/>
+          <ac:cxnSpMkLst>
+            <pc:docMk/>
+            <pc:sldMk cId="804916847" sldId="262"/>
+            <ac:cxnSpMk id="10" creationId="{8073A10E-A8B8-B2E4-4584-3205A8E38915}"/>
+          </ac:cxnSpMkLst>
+        </pc:cxnChg>
+        <pc:cxnChg chg="mod">
+          <ac:chgData name="Parmanto, Dharma" userId="4f9a10d7-3858-4ebd-b991-a7b30feaabcd" providerId="ADAL" clId="{E16A9B21-8A09-4821-A32D-4609244DB1F6}" dt="2022-10-27T15:39:58.704" v="80" actId="14100"/>
+          <ac:cxnSpMkLst>
+            <pc:docMk/>
+            <pc:sldMk cId="804916847" sldId="262"/>
+            <ac:cxnSpMk id="14" creationId="{7385F875-491E-0A9C-5FF4-9BA918EFC8D1}"/>
+          </ac:cxnSpMkLst>
+        </pc:cxnChg>
+        <pc:cxnChg chg="add mod">
+          <ac:chgData name="Parmanto, Dharma" userId="4f9a10d7-3858-4ebd-b991-a7b30feaabcd" providerId="ADAL" clId="{E16A9B21-8A09-4821-A32D-4609244DB1F6}" dt="2022-10-27T15:37:58.336" v="56" actId="14100"/>
+          <ac:cxnSpMkLst>
+            <pc:docMk/>
+            <pc:sldMk cId="804916847" sldId="262"/>
+            <ac:cxnSpMk id="17" creationId="{05C61E30-9BFD-8251-939D-2662AE0E24B5}"/>
+          </ac:cxnSpMkLst>
+        </pc:cxnChg>
+      </pc:sldChg>
+    </pc:docChg>
+  </pc:docChgLst>
   <pc:docChgLst>
     <pc:chgData name="Clark Necciai" userId="2d3c143e28508c56" providerId="LiveId" clId="{520D5F83-C509-40EF-B9FD-99FC93E75FE1}"/>
     <pc:docChg chg="undo custSel addSld delSld modSld addSection delSection">
@@ -3049,7 +3217,7 @@
           <a:p>
             <a:fld id="{E0981F5B-2BEF-4D8E-8064-E6D20D34FC04}" type="datetimeFigureOut">
               <a:rPr lang="en-US" smtClean="0"/>
-              <a:t>10/26/2022</a:t>
+              <a:t>10/27/2022</a:t>
             </a:fld>
             <a:endParaRPr lang="en-US"/>
           </a:p>
@@ -3257,7 +3425,7 @@
           <a:p>
             <a:fld id="{E0981F5B-2BEF-4D8E-8064-E6D20D34FC04}" type="datetimeFigureOut">
               <a:rPr lang="en-US" smtClean="0"/>
-              <a:t>10/26/2022</a:t>
+              <a:t>10/27/2022</a:t>
             </a:fld>
             <a:endParaRPr lang="en-US"/>
           </a:p>
@@ -3513,7 +3681,7 @@
           <a:p>
             <a:fld id="{E0981F5B-2BEF-4D8E-8064-E6D20D34FC04}" type="datetimeFigureOut">
               <a:rPr lang="en-US" smtClean="0"/>
-              <a:t>10/26/2022</a:t>
+              <a:t>10/27/2022</a:t>
             </a:fld>
             <a:endParaRPr lang="en-US"/>
           </a:p>
@@ -3687,7 +3855,7 @@
           <a:p>
             <a:fld id="{E0981F5B-2BEF-4D8E-8064-E6D20D34FC04}" type="datetimeFigureOut">
               <a:rPr lang="en-US" smtClean="0"/>
-              <a:t>10/26/2022</a:t>
+              <a:t>10/27/2022</a:t>
             </a:fld>
             <a:endParaRPr lang="en-US"/>
           </a:p>
@@ -4030,7 +4198,7 @@
           <a:p>
             <a:fld id="{E0981F5B-2BEF-4D8E-8064-E6D20D34FC04}" type="datetimeFigureOut">
               <a:rPr lang="en-US" smtClean="0"/>
-              <a:t>10/26/2022</a:t>
+              <a:t>10/27/2022</a:t>
             </a:fld>
             <a:endParaRPr lang="en-US"/>
           </a:p>
@@ -4305,7 +4473,7 @@
           <a:p>
             <a:fld id="{E0981F5B-2BEF-4D8E-8064-E6D20D34FC04}" type="datetimeFigureOut">
               <a:rPr lang="en-US" smtClean="0"/>
-              <a:t>10/26/2022</a:t>
+              <a:t>10/27/2022</a:t>
             </a:fld>
             <a:endParaRPr lang="en-US"/>
           </a:p>
@@ -4684,7 +4852,7 @@
           <a:p>
             <a:fld id="{E0981F5B-2BEF-4D8E-8064-E6D20D34FC04}" type="datetimeFigureOut">
               <a:rPr lang="en-US" smtClean="0"/>
-              <a:t>10/26/2022</a:t>
+              <a:t>10/27/2022</a:t>
             </a:fld>
             <a:endParaRPr lang="en-US"/>
           </a:p>
@@ -4802,7 +4970,7 @@
           <a:p>
             <a:fld id="{E0981F5B-2BEF-4D8E-8064-E6D20D34FC04}" type="datetimeFigureOut">
               <a:rPr lang="en-US" smtClean="0"/>
-              <a:t>10/26/2022</a:t>
+              <a:t>10/27/2022</a:t>
             </a:fld>
             <a:endParaRPr lang="en-US"/>
           </a:p>
@@ -4973,7 +5141,7 @@
           <a:p>
             <a:fld id="{E0981F5B-2BEF-4D8E-8064-E6D20D34FC04}" type="datetimeFigureOut">
               <a:rPr lang="en-US" smtClean="0"/>
-              <a:t>10/26/2022</a:t>
+              <a:t>10/27/2022</a:t>
             </a:fld>
             <a:endParaRPr lang="en-US"/>
           </a:p>
@@ -5327,7 +5495,7 @@
           <a:p>
             <a:fld id="{E0981F5B-2BEF-4D8E-8064-E6D20D34FC04}" type="datetimeFigureOut">
               <a:rPr lang="en-US" smtClean="0"/>
-              <a:t>10/26/2022</a:t>
+              <a:t>10/27/2022</a:t>
             </a:fld>
             <a:endParaRPr lang="en-US"/>
           </a:p>
@@ -5709,7 +5877,7 @@
           <a:p>
             <a:fld id="{E0981F5B-2BEF-4D8E-8064-E6D20D34FC04}" type="datetimeFigureOut">
               <a:rPr lang="en-US" smtClean="0"/>
-              <a:t>10/26/2022</a:t>
+              <a:t>10/27/2022</a:t>
             </a:fld>
             <a:endParaRPr lang="en-US"/>
           </a:p>
@@ -5996,7 +6164,7 @@
           <a:p>
             <a:fld id="{E0981F5B-2BEF-4D8E-8064-E6D20D34FC04}" type="datetimeFigureOut">
               <a:rPr lang="en-US" smtClean="0"/>
-              <a:t>10/26/2022</a:t>
+              <a:t>10/27/2022</a:t>
             </a:fld>
             <a:endParaRPr lang="en-US"/>
           </a:p>
@@ -7054,7 +7222,7 @@
           <a:prstGeom prst="line">
             <a:avLst/>
           </a:prstGeom>
-          <a:ln w="38100">
+          <a:ln w="76200" cmpd="dbl">
             <a:solidFill>
               <a:schemeClr val="tx1"/>
             </a:solidFill>
@@ -7120,49 +7288,6 @@
           </a:fontRef>
         </p:style>
       </p:cxnSp>
-      <p:cxnSp>
-        <p:nvCxnSpPr>
-          <p:cNvPr id="21" name="Straight Connector 20">
-            <a:extLst>
-              <a:ext uri="{FF2B5EF4-FFF2-40B4-BE49-F238E27FC236}">
-                <a16:creationId xmlns:a16="http://schemas.microsoft.com/office/drawing/2014/main" id="{205266DB-06B1-18F7-F64C-AAD0FF062BD0}"/>
-              </a:ext>
-            </a:extLst>
-          </p:cNvPr>
-          <p:cNvCxnSpPr>
-            <a:cxnSpLocks/>
-          </p:cNvCxnSpPr>
-          <p:nvPr/>
-        </p:nvCxnSpPr>
-        <p:spPr>
-          <a:xfrm>
-            <a:off x="6021076" y="3163843"/>
-            <a:ext cx="1607303" cy="0"/>
-          </a:xfrm>
-          <a:prstGeom prst="line">
-            <a:avLst/>
-          </a:prstGeom>
-          <a:ln w="38100">
-            <a:solidFill>
-              <a:schemeClr val="tx1"/>
-            </a:solidFill>
-          </a:ln>
-        </p:spPr>
-        <p:style>
-          <a:lnRef idx="1">
-            <a:schemeClr val="dk1"/>
-          </a:lnRef>
-          <a:fillRef idx="0">
-            <a:schemeClr val="dk1"/>
-          </a:fillRef>
-          <a:effectRef idx="0">
-            <a:schemeClr val="dk1"/>
-          </a:effectRef>
-          <a:fontRef idx="minor">
-            <a:schemeClr val="tx1"/>
-          </a:fontRef>
-        </p:style>
-      </p:cxnSp>
       <p:sp>
         <p:nvSpPr>
           <p:cNvPr id="24" name="Diamond 23">
@@ -7310,94 +7435,6 @@
       </p:cxnSp>
       <p:cxnSp>
         <p:nvCxnSpPr>
-          <p:cNvPr id="32" name="Straight Connector 31">
-            <a:extLst>
-              <a:ext uri="{FF2B5EF4-FFF2-40B4-BE49-F238E27FC236}">
-                <a16:creationId xmlns:a16="http://schemas.microsoft.com/office/drawing/2014/main" id="{42DCB8B2-3CAA-D1E9-2E05-300E3E86039E}"/>
-              </a:ext>
-            </a:extLst>
-          </p:cNvPr>
-          <p:cNvCxnSpPr>
-            <a:cxnSpLocks/>
-            <a:endCxn id="24" idx="0"/>
-          </p:cNvCxnSpPr>
-          <p:nvPr/>
-        </p:nvCxnSpPr>
-        <p:spPr>
-          <a:xfrm>
-            <a:off x="10905525" y="1106563"/>
-            <a:ext cx="0" cy="1159881"/>
-          </a:xfrm>
-          <a:prstGeom prst="line">
-            <a:avLst/>
-          </a:prstGeom>
-          <a:ln w="38100">
-            <a:solidFill>
-              <a:schemeClr val="tx1"/>
-            </a:solidFill>
-          </a:ln>
-        </p:spPr>
-        <p:style>
-          <a:lnRef idx="1">
-            <a:schemeClr val="dk1"/>
-          </a:lnRef>
-          <a:fillRef idx="0">
-            <a:schemeClr val="dk1"/>
-          </a:fillRef>
-          <a:effectRef idx="0">
-            <a:schemeClr val="dk1"/>
-          </a:effectRef>
-          <a:fontRef idx="minor">
-            <a:schemeClr val="tx1"/>
-          </a:fontRef>
-        </p:style>
-      </p:cxnSp>
-      <p:cxnSp>
-        <p:nvCxnSpPr>
-          <p:cNvPr id="35" name="Straight Connector 34">
-            <a:extLst>
-              <a:ext uri="{FF2B5EF4-FFF2-40B4-BE49-F238E27FC236}">
-                <a16:creationId xmlns:a16="http://schemas.microsoft.com/office/drawing/2014/main" id="{F5395CE3-C90A-45C5-1758-DCFBBC0FFAC1}"/>
-              </a:ext>
-            </a:extLst>
-          </p:cNvPr>
-          <p:cNvCxnSpPr>
-            <a:cxnSpLocks/>
-            <a:endCxn id="5" idx="3"/>
-          </p:cNvCxnSpPr>
-          <p:nvPr/>
-        </p:nvCxnSpPr>
-        <p:spPr>
-          <a:xfrm flipH="1">
-            <a:off x="10033727" y="1106563"/>
-            <a:ext cx="871797" cy="0"/>
-          </a:xfrm>
-          <a:prstGeom prst="line">
-            <a:avLst/>
-          </a:prstGeom>
-          <a:ln w="38100">
-            <a:solidFill>
-              <a:schemeClr val="tx1"/>
-            </a:solidFill>
-          </a:ln>
-        </p:spPr>
-        <p:style>
-          <a:lnRef idx="1">
-            <a:schemeClr val="dk1"/>
-          </a:lnRef>
-          <a:fillRef idx="0">
-            <a:schemeClr val="dk1"/>
-          </a:fillRef>
-          <a:effectRef idx="0">
-            <a:schemeClr val="dk1"/>
-          </a:effectRef>
-          <a:fontRef idx="minor">
-            <a:schemeClr val="tx1"/>
-          </a:fontRef>
-        </p:style>
-      </p:cxnSp>
-      <p:cxnSp>
-        <p:nvCxnSpPr>
           <p:cNvPr id="39" name="Straight Connector 38">
             <a:extLst>
               <a:ext uri="{FF2B5EF4-FFF2-40B4-BE49-F238E27FC236}">
@@ -7463,50 +7500,7 @@
           <a:prstGeom prst="line">
             <a:avLst/>
           </a:prstGeom>
-          <a:ln w="38100">
-            <a:solidFill>
-              <a:schemeClr val="tx1"/>
-            </a:solidFill>
-          </a:ln>
-        </p:spPr>
-        <p:style>
-          <a:lnRef idx="1">
-            <a:schemeClr val="dk1"/>
-          </a:lnRef>
-          <a:fillRef idx="0">
-            <a:schemeClr val="dk1"/>
-          </a:fillRef>
-          <a:effectRef idx="0">
-            <a:schemeClr val="dk1"/>
-          </a:effectRef>
-          <a:fontRef idx="minor">
-            <a:schemeClr val="tx1"/>
-          </a:fontRef>
-        </p:style>
-      </p:cxnSp>
-      <p:cxnSp>
-        <p:nvCxnSpPr>
-          <p:cNvPr id="48" name="Straight Connector 47">
-            <a:extLst>
-              <a:ext uri="{FF2B5EF4-FFF2-40B4-BE49-F238E27FC236}">
-                <a16:creationId xmlns:a16="http://schemas.microsoft.com/office/drawing/2014/main" id="{2D057358-2EEE-EC68-7A39-806CDCB4A671}"/>
-              </a:ext>
-            </a:extLst>
-          </p:cNvPr>
-          <p:cNvCxnSpPr>
-            <a:cxnSpLocks/>
-          </p:cNvCxnSpPr>
-          <p:nvPr/>
-        </p:nvCxnSpPr>
-        <p:spPr>
-          <a:xfrm>
-            <a:off x="5399750" y="3488418"/>
-            <a:ext cx="0" cy="1178327"/>
-          </a:xfrm>
-          <a:prstGeom prst="line">
-            <a:avLst/>
-          </a:prstGeom>
-          <a:ln w="38100">
+          <a:ln w="76200" cmpd="dbl">
             <a:solidFill>
               <a:schemeClr val="tx1"/>
             </a:solidFill>
@@ -7608,7 +7602,7 @@
           <a:prstGeom prst="line">
             <a:avLst/>
           </a:prstGeom>
-          <a:ln w="38100">
+          <a:ln w="76200" cmpd="dbl">
             <a:solidFill>
               <a:schemeClr val="tx1"/>
             </a:solidFill>
@@ -7649,49 +7643,6 @@
           <a:xfrm flipV="1">
             <a:off x="2263264" y="1488508"/>
             <a:ext cx="543906" cy="777935"/>
-          </a:xfrm>
-          <a:prstGeom prst="line">
-            <a:avLst/>
-          </a:prstGeom>
-          <a:ln w="38100">
-            <a:solidFill>
-              <a:schemeClr val="tx1"/>
-            </a:solidFill>
-          </a:ln>
-        </p:spPr>
-        <p:style>
-          <a:lnRef idx="1">
-            <a:schemeClr val="dk1"/>
-          </a:lnRef>
-          <a:fillRef idx="0">
-            <a:schemeClr val="dk1"/>
-          </a:fillRef>
-          <a:effectRef idx="0">
-            <a:schemeClr val="dk1"/>
-          </a:effectRef>
-          <a:fontRef idx="minor">
-            <a:schemeClr val="tx1"/>
-          </a:fontRef>
-        </p:style>
-      </p:cxnSp>
-      <p:cxnSp>
-        <p:nvCxnSpPr>
-          <p:cNvPr id="59" name="Straight Connector 58">
-            <a:extLst>
-              <a:ext uri="{FF2B5EF4-FFF2-40B4-BE49-F238E27FC236}">
-                <a16:creationId xmlns:a16="http://schemas.microsoft.com/office/drawing/2014/main" id="{E88901CF-5821-8CD1-D6C5-E434D5E3404B}"/>
-              </a:ext>
-            </a:extLst>
-          </p:cNvPr>
-          <p:cNvCxnSpPr>
-            <a:cxnSpLocks/>
-          </p:cNvCxnSpPr>
-          <p:nvPr/>
-        </p:nvCxnSpPr>
-        <p:spPr>
-          <a:xfrm>
-            <a:off x="2981670" y="2952245"/>
-            <a:ext cx="1564693" cy="0"/>
           </a:xfrm>
           <a:prstGeom prst="line">
             <a:avLst/>
@@ -8879,27 +8830,28 @@
       </p:sp>
       <p:cxnSp>
         <p:nvCxnSpPr>
-          <p:cNvPr id="2" name="Straight Connector 1">
+          <p:cNvPr id="20" name="Connector: Elbow 19">
             <a:extLst>
               <a:ext uri="{FF2B5EF4-FFF2-40B4-BE49-F238E27FC236}">
-                <a16:creationId xmlns:a16="http://schemas.microsoft.com/office/drawing/2014/main" id="{43848DF1-C15D-58C8-F651-16298F038520}"/>
+                <a16:creationId xmlns:a16="http://schemas.microsoft.com/office/drawing/2014/main" id="{594EA61F-5C02-983F-DB32-D462FD79F789}"/>
               </a:ext>
             </a:extLst>
           </p:cNvPr>
           <p:cNvCxnSpPr>
-            <a:cxnSpLocks/>
+            <a:stCxn id="5" idx="3"/>
+            <a:endCxn id="24" idx="0"/>
           </p:cNvCxnSpPr>
           <p:nvPr/>
         </p:nvCxnSpPr>
         <p:spPr>
           <a:xfrm>
-            <a:off x="11000559" y="998220"/>
-            <a:ext cx="0" cy="1352044"/>
-          </a:xfrm>
-          <a:prstGeom prst="line">
-            <a:avLst/>
-          </a:prstGeom>
-          <a:ln w="38100">
+            <a:off x="10033727" y="1106563"/>
+            <a:ext cx="871798" cy="1159881"/>
+          </a:xfrm>
+          <a:prstGeom prst="bentConnector2">
+            <a:avLst/>
+          </a:prstGeom>
+          <a:ln w="76200" cmpd="dbl">
             <a:solidFill>
               <a:schemeClr val="tx1"/>
             </a:solidFill>
@@ -8907,56 +8859,13 @@
         </p:spPr>
         <p:style>
           <a:lnRef idx="1">
-            <a:schemeClr val="dk1"/>
+            <a:schemeClr val="accent1"/>
           </a:lnRef>
           <a:fillRef idx="0">
-            <a:schemeClr val="dk1"/>
+            <a:schemeClr val="accent1"/>
           </a:fillRef>
           <a:effectRef idx="0">
-            <a:schemeClr val="dk1"/>
-          </a:effectRef>
-          <a:fontRef idx="minor">
-            <a:schemeClr val="tx1"/>
-          </a:fontRef>
-        </p:style>
-      </p:cxnSp>
-      <p:cxnSp>
-        <p:nvCxnSpPr>
-          <p:cNvPr id="19" name="Straight Connector 18">
-            <a:extLst>
-              <a:ext uri="{FF2B5EF4-FFF2-40B4-BE49-F238E27FC236}">
-                <a16:creationId xmlns:a16="http://schemas.microsoft.com/office/drawing/2014/main" id="{8D84B695-7A00-B609-E61F-40846BF69AC8}"/>
-              </a:ext>
-            </a:extLst>
-          </p:cNvPr>
-          <p:cNvCxnSpPr>
-            <a:cxnSpLocks/>
-          </p:cNvCxnSpPr>
-          <p:nvPr/>
-        </p:nvCxnSpPr>
-        <p:spPr>
-          <a:xfrm>
-            <a:off x="10033727" y="998220"/>
-            <a:ext cx="966832" cy="0"/>
-          </a:xfrm>
-          <a:prstGeom prst="line">
-            <a:avLst/>
-          </a:prstGeom>
-          <a:ln w="38100">
-            <a:solidFill>
-              <a:schemeClr val="tx1"/>
-            </a:solidFill>
-          </a:ln>
-        </p:spPr>
-        <p:style>
-          <a:lnRef idx="1">
-            <a:schemeClr val="dk1"/>
-          </a:lnRef>
-          <a:fillRef idx="0">
-            <a:schemeClr val="dk1"/>
-          </a:fillRef>
-          <a:effectRef idx="0">
-            <a:schemeClr val="dk1"/>
+            <a:schemeClr val="accent1"/>
           </a:effectRef>
           <a:fontRef idx="minor">
             <a:schemeClr val="tx1"/>
@@ -12010,64 +11919,6 @@
       </p:grpSpPr>
       <p:sp>
         <p:nvSpPr>
-          <p:cNvPr id="81" name="Oval 80">
-            <a:extLst>
-              <a:ext uri="{FF2B5EF4-FFF2-40B4-BE49-F238E27FC236}">
-                <a16:creationId xmlns:a16="http://schemas.microsoft.com/office/drawing/2014/main" id="{DC5533F3-94B4-FE5F-3DDC-58209D1840AE}"/>
-              </a:ext>
-            </a:extLst>
-          </p:cNvPr>
-          <p:cNvSpPr/>
-          <p:nvPr/>
-        </p:nvSpPr>
-        <p:spPr>
-          <a:xfrm>
-            <a:off x="1727239" y="4189941"/>
-            <a:ext cx="3104411" cy="1028699"/>
-          </a:xfrm>
-          <a:prstGeom prst="ellipse">
-            <a:avLst/>
-          </a:prstGeom>
-          <a:solidFill>
-            <a:schemeClr val="bg1"/>
-          </a:solidFill>
-          <a:ln>
-            <a:solidFill>
-              <a:schemeClr val="tx1"/>
-            </a:solidFill>
-          </a:ln>
-        </p:spPr>
-        <p:style>
-          <a:lnRef idx="2">
-            <a:schemeClr val="accent1">
-              <a:shade val="50000"/>
-            </a:schemeClr>
-          </a:lnRef>
-          <a:fillRef idx="1">
-            <a:schemeClr val="accent1"/>
-          </a:fillRef>
-          <a:effectRef idx="0">
-            <a:schemeClr val="accent1"/>
-          </a:effectRef>
-          <a:fontRef idx="minor">
-            <a:schemeClr val="lt1"/>
-          </a:fontRef>
-        </p:style>
-        <p:txBody>
-          <a:bodyPr rtlCol="0" anchor="ctr"/>
-          <a:lstStyle/>
-          <a:p>
-            <a:pPr algn="ctr"/>
-            <a:endParaRPr lang="en-US" dirty="0">
-              <a:solidFill>
-                <a:schemeClr val="tx1"/>
-              </a:solidFill>
-            </a:endParaRPr>
-          </a:p>
-        </p:txBody>
-      </p:sp>
-      <p:sp>
-        <p:nvSpPr>
           <p:cNvPr id="4" name="Rectangle 3">
             <a:extLst>
               <a:ext uri="{FF2B5EF4-FFF2-40B4-BE49-F238E27FC236}">
@@ -12982,7 +12833,7 @@
         </p:nvSpPr>
         <p:spPr>
           <a:xfrm>
-            <a:off x="1986013" y="4340590"/>
+            <a:off x="2975930" y="4518274"/>
             <a:ext cx="2637120" cy="746503"/>
           </a:xfrm>
           <a:prstGeom prst="ellipse">
@@ -12991,7 +12842,7 @@
           <a:solidFill>
             <a:schemeClr val="bg1"/>
           </a:solidFill>
-          <a:ln>
+          <a:ln w="50800" cmpd="dbl">
             <a:solidFill>
               <a:schemeClr val="tx1"/>
             </a:solidFill>
@@ -13024,7 +12875,7 @@
                   <a:schemeClr val="tx1"/>
                 </a:solidFill>
               </a:rPr>
-              <a:t>phone_number</a:t>
+              <a:t>phone</a:t>
             </a:r>
           </a:p>
         </p:txBody>
@@ -13040,15 +12891,15 @@
           </p:cNvPr>
           <p:cNvCxnSpPr>
             <a:cxnSpLocks/>
-            <a:stCxn id="81" idx="7"/>
+            <a:stCxn id="13" idx="7"/>
             <a:endCxn id="4" idx="2"/>
           </p:cNvCxnSpPr>
           <p:nvPr/>
         </p:nvCxnSpPr>
         <p:spPr>
           <a:xfrm flipV="1">
-            <a:off x="4377020" y="4094700"/>
-            <a:ext cx="1381490" cy="245890"/>
+            <a:off x="5226853" y="4094700"/>
+            <a:ext cx="531657" cy="532897"/>
           </a:xfrm>
           <a:prstGeom prst="line">
             <a:avLst/>
@@ -13155,6 +13006,223 @@
           <a:xfrm flipH="1">
             <a:off x="5758510" y="2446915"/>
             <a:ext cx="851256" cy="619086"/>
+          </a:xfrm>
+          <a:prstGeom prst="line">
+            <a:avLst/>
+          </a:prstGeom>
+          <a:ln w="38100">
+            <a:solidFill>
+              <a:schemeClr val="tx1"/>
+            </a:solidFill>
+          </a:ln>
+        </p:spPr>
+        <p:style>
+          <a:lnRef idx="1">
+            <a:schemeClr val="dk1"/>
+          </a:lnRef>
+          <a:fillRef idx="0">
+            <a:schemeClr val="dk1"/>
+          </a:fillRef>
+          <a:effectRef idx="0">
+            <a:schemeClr val="dk1"/>
+          </a:effectRef>
+          <a:fontRef idx="minor">
+            <a:schemeClr val="tx1"/>
+          </a:fontRef>
+        </p:style>
+      </p:cxnSp>
+      <p:sp>
+        <p:nvSpPr>
+          <p:cNvPr id="3" name="Oval 2">
+            <a:extLst>
+              <a:ext uri="{FF2B5EF4-FFF2-40B4-BE49-F238E27FC236}">
+                <a16:creationId xmlns:a16="http://schemas.microsoft.com/office/drawing/2014/main" id="{37B4A138-19A4-8C60-1F83-BF00B5CE4074}"/>
+              </a:ext>
+            </a:extLst>
+          </p:cNvPr>
+          <p:cNvSpPr/>
+          <p:nvPr/>
+        </p:nvSpPr>
+        <p:spPr>
+          <a:xfrm>
+            <a:off x="175613" y="4220555"/>
+            <a:ext cx="2447759" cy="571938"/>
+          </a:xfrm>
+          <a:prstGeom prst="ellipse">
+            <a:avLst/>
+          </a:prstGeom>
+          <a:solidFill>
+            <a:schemeClr val="bg1"/>
+          </a:solidFill>
+          <a:ln>
+            <a:solidFill>
+              <a:schemeClr val="tx1"/>
+            </a:solidFill>
+          </a:ln>
+        </p:spPr>
+        <p:style>
+          <a:lnRef idx="2">
+            <a:schemeClr val="accent1">
+              <a:shade val="50000"/>
+            </a:schemeClr>
+          </a:lnRef>
+          <a:fillRef idx="1">
+            <a:schemeClr val="accent1"/>
+          </a:fillRef>
+          <a:effectRef idx="0">
+            <a:schemeClr val="accent1"/>
+          </a:effectRef>
+          <a:fontRef idx="minor">
+            <a:schemeClr val="lt1"/>
+          </a:fontRef>
+        </p:style>
+        <p:txBody>
+          <a:bodyPr rtlCol="0" anchor="ctr"/>
+          <a:lstStyle/>
+          <a:p>
+            <a:pPr algn="ctr"/>
+            <a:r>
+              <a:rPr lang="en-US" dirty="0" err="1">
+                <a:solidFill>
+                  <a:schemeClr val="tx1"/>
+                </a:solidFill>
+              </a:rPr>
+              <a:t>phone_number</a:t>
+            </a:r>
+            <a:endParaRPr lang="en-US" dirty="0">
+              <a:solidFill>
+                <a:schemeClr val="tx1"/>
+              </a:solidFill>
+            </a:endParaRPr>
+          </a:p>
+        </p:txBody>
+      </p:sp>
+      <p:sp>
+        <p:nvSpPr>
+          <p:cNvPr id="8" name="Oval 7">
+            <a:extLst>
+              <a:ext uri="{FF2B5EF4-FFF2-40B4-BE49-F238E27FC236}">
+                <a16:creationId xmlns:a16="http://schemas.microsoft.com/office/drawing/2014/main" id="{37D7C8C4-A62D-EE1B-6A0A-862D6219969E}"/>
+              </a:ext>
+            </a:extLst>
+          </p:cNvPr>
+          <p:cNvSpPr/>
+          <p:nvPr/>
+        </p:nvSpPr>
+        <p:spPr>
+          <a:xfrm>
+            <a:off x="1476247" y="5084639"/>
+            <a:ext cx="1142812" cy="554538"/>
+          </a:xfrm>
+          <a:prstGeom prst="ellipse">
+            <a:avLst/>
+          </a:prstGeom>
+          <a:solidFill>
+            <a:schemeClr val="bg1"/>
+          </a:solidFill>
+          <a:ln>
+            <a:solidFill>
+              <a:schemeClr val="tx1"/>
+            </a:solidFill>
+          </a:ln>
+        </p:spPr>
+        <p:style>
+          <a:lnRef idx="2">
+            <a:schemeClr val="accent1">
+              <a:shade val="50000"/>
+            </a:schemeClr>
+          </a:lnRef>
+          <a:fillRef idx="1">
+            <a:schemeClr val="accent1"/>
+          </a:fillRef>
+          <a:effectRef idx="0">
+            <a:schemeClr val="accent1"/>
+          </a:effectRef>
+          <a:fontRef idx="minor">
+            <a:schemeClr val="lt1"/>
+          </a:fontRef>
+        </p:style>
+        <p:txBody>
+          <a:bodyPr rtlCol="0" anchor="ctr"/>
+          <a:lstStyle/>
+          <a:p>
+            <a:pPr algn="ctr"/>
+            <a:r>
+              <a:rPr lang="en-US" dirty="0">
+                <a:solidFill>
+                  <a:schemeClr val="tx1"/>
+                </a:solidFill>
+              </a:rPr>
+              <a:t>type</a:t>
+            </a:r>
+          </a:p>
+        </p:txBody>
+      </p:sp>
+      <p:cxnSp>
+        <p:nvCxnSpPr>
+          <p:cNvPr id="10" name="Straight Connector 9">
+            <a:extLst>
+              <a:ext uri="{FF2B5EF4-FFF2-40B4-BE49-F238E27FC236}">
+                <a16:creationId xmlns:a16="http://schemas.microsoft.com/office/drawing/2014/main" id="{8073A10E-A8B8-B2E4-4584-3205A8E38915}"/>
+              </a:ext>
+            </a:extLst>
+          </p:cNvPr>
+          <p:cNvCxnSpPr>
+            <a:cxnSpLocks/>
+            <a:stCxn id="8" idx="7"/>
+            <a:endCxn id="13" idx="2"/>
+          </p:cNvCxnSpPr>
+          <p:nvPr/>
+        </p:nvCxnSpPr>
+        <p:spPr>
+          <a:xfrm flipV="1">
+            <a:off x="2451698" y="4891526"/>
+            <a:ext cx="524232" cy="274323"/>
+          </a:xfrm>
+          <a:prstGeom prst="line">
+            <a:avLst/>
+          </a:prstGeom>
+          <a:ln w="38100">
+            <a:solidFill>
+              <a:schemeClr val="tx1"/>
+            </a:solidFill>
+          </a:ln>
+        </p:spPr>
+        <p:style>
+          <a:lnRef idx="1">
+            <a:schemeClr val="dk1"/>
+          </a:lnRef>
+          <a:fillRef idx="0">
+            <a:schemeClr val="dk1"/>
+          </a:fillRef>
+          <a:effectRef idx="0">
+            <a:schemeClr val="dk1"/>
+          </a:effectRef>
+          <a:fontRef idx="minor">
+            <a:schemeClr val="tx1"/>
+          </a:fontRef>
+        </p:style>
+      </p:cxnSp>
+      <p:cxnSp>
+        <p:nvCxnSpPr>
+          <p:cNvPr id="17" name="Straight Connector 16">
+            <a:extLst>
+              <a:ext uri="{FF2B5EF4-FFF2-40B4-BE49-F238E27FC236}">
+                <a16:creationId xmlns:a16="http://schemas.microsoft.com/office/drawing/2014/main" id="{05C61E30-9BFD-8251-939D-2662AE0E24B5}"/>
+              </a:ext>
+            </a:extLst>
+          </p:cNvPr>
+          <p:cNvCxnSpPr>
+            <a:cxnSpLocks/>
+            <a:stCxn id="3" idx="5"/>
+            <a:endCxn id="13" idx="2"/>
+          </p:cNvCxnSpPr>
+          <p:nvPr/>
+        </p:nvCxnSpPr>
+        <p:spPr>
+          <a:xfrm>
+            <a:off x="2264906" y="4708735"/>
+            <a:ext cx="711024" cy="182791"/>
           </a:xfrm>
           <a:prstGeom prst="line">
             <a:avLst/>

</xml_diff>

<commit_message>
Added assumption for Promotions and Changed Diagrams Accordingly
</commit_message>
<xml_diff>
--- a/Project/ER Model.pptx
+++ b/Project/ER Model.pptx
@@ -121,7 +121,6 @@
 <file path=ppt/revisionInfo.xml><?xml version="1.0" encoding="utf-8"?>
 <p1510:revInfo xmlns:a="http://schemas.openxmlformats.org/drawingml/2006/main" xmlns:r="http://schemas.openxmlformats.org/officeDocument/2006/relationships" xmlns:p1510="http://schemas.microsoft.com/office/powerpoint/2015/10/main">
   <p1510:revLst>
-    <p1510:client id="{520D5F83-C509-40EF-B9FD-99FC93E75FE1}" v="13" dt="2022-10-26T20:57:55.599"/>
     <p1510:client id="{E16A9B21-8A09-4821-A32D-4609244DB1F6}" v="4" dt="2022-10-27T15:37:32.708"/>
   </p1510:revLst>
 </p1510:revInfo>
@@ -131,13 +130,13 @@
 <pc:chgInfo xmlns:a="http://schemas.openxmlformats.org/drawingml/2006/main" xmlns:r="http://schemas.openxmlformats.org/officeDocument/2006/relationships" xmlns:ac="http://schemas.microsoft.com/office/drawing/2013/main/command" xmlns:pc="http://schemas.microsoft.com/office/powerpoint/2013/main/command">
   <pc:docChgLst>
     <pc:chgData name="Parmanto, Dharma" userId="4f9a10d7-3858-4ebd-b991-a7b30feaabcd" providerId="ADAL" clId="{E16A9B21-8A09-4821-A32D-4609244DB1F6}"/>
-    <pc:docChg chg="custSel modSld">
-      <pc:chgData name="Parmanto, Dharma" userId="4f9a10d7-3858-4ebd-b991-a7b30feaabcd" providerId="ADAL" clId="{E16A9B21-8A09-4821-A32D-4609244DB1F6}" dt="2022-10-27T15:39:58.704" v="80" actId="14100"/>
+    <pc:docChg chg="undo custSel modSld">
+      <pc:chgData name="Parmanto, Dharma" userId="4f9a10d7-3858-4ebd-b991-a7b30feaabcd" providerId="ADAL" clId="{E16A9B21-8A09-4821-A32D-4609244DB1F6}" dt="2022-11-01T13:38:53.155" v="221" actId="20577"/>
       <pc:docMkLst>
         <pc:docMk/>
       </pc:docMkLst>
       <pc:sldChg chg="addSp delSp modSp mod">
-        <pc:chgData name="Parmanto, Dharma" userId="4f9a10d7-3858-4ebd-b991-a7b30feaabcd" providerId="ADAL" clId="{E16A9B21-8A09-4821-A32D-4609244DB1F6}" dt="2022-10-27T15:39:42.702" v="79" actId="692"/>
+        <pc:chgData name="Parmanto, Dharma" userId="4f9a10d7-3858-4ebd-b991-a7b30feaabcd" providerId="ADAL" clId="{E16A9B21-8A09-4821-A32D-4609244DB1F6}" dt="2022-11-01T13:32:16.777" v="202" actId="692"/>
         <pc:sldMkLst>
           <pc:docMk/>
           <pc:sldMk cId="3265300168" sldId="257"/>
@@ -190,6 +189,14 @@
             <ac:cxnSpMk id="32" creationId="{42DCB8B2-3CAA-D1E9-2E05-300E3E86039E}"/>
           </ac:cxnSpMkLst>
         </pc:cxnChg>
+        <pc:cxnChg chg="mod">
+          <ac:chgData name="Parmanto, Dharma" userId="4f9a10d7-3858-4ebd-b991-a7b30feaabcd" providerId="ADAL" clId="{E16A9B21-8A09-4821-A32D-4609244DB1F6}" dt="2022-11-01T13:32:16.777" v="202" actId="692"/>
+          <ac:cxnSpMkLst>
+            <pc:docMk/>
+            <pc:sldMk cId="3265300168" sldId="257"/>
+            <ac:cxnSpMk id="34" creationId="{DDA579C7-69C7-7243-2A32-0F8531FA559B}"/>
+          </ac:cxnSpMkLst>
+        </pc:cxnChg>
         <pc:cxnChg chg="del mod">
           <ac:chgData name="Parmanto, Dharma" userId="4f9a10d7-3858-4ebd-b991-a7b30feaabcd" providerId="ADAL" clId="{E16A9B21-8A09-4821-A32D-4609244DB1F6}" dt="2022-10-27T15:38:43.373" v="66" actId="478"/>
           <ac:cxnSpMkLst>
@@ -231,8 +238,85 @@
           </ac:cxnSpMkLst>
         </pc:cxnChg>
       </pc:sldChg>
+      <pc:sldChg chg="modSp mod">
+        <pc:chgData name="Parmanto, Dharma" userId="4f9a10d7-3858-4ebd-b991-a7b30feaabcd" providerId="ADAL" clId="{E16A9B21-8A09-4821-A32D-4609244DB1F6}" dt="2022-11-01T13:36:47.671" v="207" actId="1076"/>
+        <pc:sldMkLst>
+          <pc:docMk/>
+          <pc:sldMk cId="2741865147" sldId="259"/>
+        </pc:sldMkLst>
+        <pc:spChg chg="mod">
+          <ac:chgData name="Parmanto, Dharma" userId="4f9a10d7-3858-4ebd-b991-a7b30feaabcd" providerId="ADAL" clId="{E16A9B21-8A09-4821-A32D-4609244DB1F6}" dt="2022-11-01T13:36:47.671" v="207" actId="1076"/>
+          <ac:spMkLst>
+            <pc:docMk/>
+            <pc:sldMk cId="2741865147" sldId="259"/>
+            <ac:spMk id="99" creationId="{7FBE7A22-D09A-B9E3-AC30-16A14CD34A2F}"/>
+          </ac:spMkLst>
+        </pc:spChg>
+        <pc:spChg chg="mod">
+          <ac:chgData name="Parmanto, Dharma" userId="4f9a10d7-3858-4ebd-b991-a7b30feaabcd" providerId="ADAL" clId="{E16A9B21-8A09-4821-A32D-4609244DB1F6}" dt="2022-11-01T13:36:38.253" v="204" actId="1076"/>
+          <ac:spMkLst>
+            <pc:docMk/>
+            <pc:sldMk cId="2741865147" sldId="259"/>
+            <ac:spMk id="100" creationId="{3571C8C9-1FC0-E854-8AE2-45BA8AA63D17}"/>
+          </ac:spMkLst>
+        </pc:spChg>
+        <pc:cxnChg chg="mod">
+          <ac:chgData name="Parmanto, Dharma" userId="4f9a10d7-3858-4ebd-b991-a7b30feaabcd" providerId="ADAL" clId="{E16A9B21-8A09-4821-A32D-4609244DB1F6}" dt="2022-11-01T13:26:27.743" v="81" actId="14100"/>
+          <ac:cxnSpMkLst>
+            <pc:docMk/>
+            <pc:sldMk cId="2741865147" sldId="259"/>
+            <ac:cxnSpMk id="20" creationId="{8A9934D4-824E-69C0-BE9C-89F258C16798}"/>
+          </ac:cxnSpMkLst>
+        </pc:cxnChg>
+        <pc:cxnChg chg="mod">
+          <ac:chgData name="Parmanto, Dharma" userId="4f9a10d7-3858-4ebd-b991-a7b30feaabcd" providerId="ADAL" clId="{E16A9B21-8A09-4821-A32D-4609244DB1F6}" dt="2022-11-01T13:36:38.253" v="204" actId="1076"/>
+          <ac:cxnSpMkLst>
+            <pc:docMk/>
+            <pc:sldMk cId="2741865147" sldId="259"/>
+            <ac:cxnSpMk id="112" creationId="{03CFF2A7-22E8-6EDE-88DE-8BA93AEF34AC}"/>
+          </ac:cxnSpMkLst>
+        </pc:cxnChg>
+        <pc:cxnChg chg="mod">
+          <ac:chgData name="Parmanto, Dharma" userId="4f9a10d7-3858-4ebd-b991-a7b30feaabcd" providerId="ADAL" clId="{E16A9B21-8A09-4821-A32D-4609244DB1F6}" dt="2022-11-01T13:36:47.671" v="207" actId="1076"/>
+          <ac:cxnSpMkLst>
+            <pc:docMk/>
+            <pc:sldMk cId="2741865147" sldId="259"/>
+            <ac:cxnSpMk id="115" creationId="{0C64884E-9469-4BDD-4D43-DD65E17FC704}"/>
+          </ac:cxnSpMkLst>
+        </pc:cxnChg>
+      </pc:sldChg>
+      <pc:sldChg chg="modSp mod">
+        <pc:chgData name="Parmanto, Dharma" userId="4f9a10d7-3858-4ebd-b991-a7b30feaabcd" providerId="ADAL" clId="{E16A9B21-8A09-4821-A32D-4609244DB1F6}" dt="2022-11-01T13:31:42.347" v="198" actId="20577"/>
+        <pc:sldMkLst>
+          <pc:docMk/>
+          <pc:sldMk cId="1871788821" sldId="260"/>
+        </pc:sldMkLst>
+        <pc:spChg chg="mod">
+          <ac:chgData name="Parmanto, Dharma" userId="4f9a10d7-3858-4ebd-b991-a7b30feaabcd" providerId="ADAL" clId="{E16A9B21-8A09-4821-A32D-4609244DB1F6}" dt="2022-11-01T13:31:42.347" v="198" actId="20577"/>
+          <ac:spMkLst>
+            <pc:docMk/>
+            <pc:sldMk cId="1871788821" sldId="260"/>
+            <ac:spMk id="3" creationId="{59C44DD6-9389-6B4C-6D7C-CE926EF1EED2}"/>
+          </ac:spMkLst>
+        </pc:spChg>
+      </pc:sldChg>
+      <pc:sldChg chg="modSp mod">
+        <pc:chgData name="Parmanto, Dharma" userId="4f9a10d7-3858-4ebd-b991-a7b30feaabcd" providerId="ADAL" clId="{E16A9B21-8A09-4821-A32D-4609244DB1F6}" dt="2022-11-01T13:38:53.155" v="221" actId="20577"/>
+        <pc:sldMkLst>
+          <pc:docMk/>
+          <pc:sldMk cId="298272431" sldId="261"/>
+        </pc:sldMkLst>
+        <pc:spChg chg="mod">
+          <ac:chgData name="Parmanto, Dharma" userId="4f9a10d7-3858-4ebd-b991-a7b30feaabcd" providerId="ADAL" clId="{E16A9B21-8A09-4821-A32D-4609244DB1F6}" dt="2022-11-01T13:38:53.155" v="221" actId="20577"/>
+          <ac:spMkLst>
+            <pc:docMk/>
+            <pc:sldMk cId="298272431" sldId="261"/>
+            <ac:spMk id="15" creationId="{645AFB24-AF41-6A9E-0A67-ADDB00DBC052}"/>
+          </ac:spMkLst>
+        </pc:spChg>
+      </pc:sldChg>
       <pc:sldChg chg="addSp delSp modSp mod">
-        <pc:chgData name="Parmanto, Dharma" userId="4f9a10d7-3858-4ebd-b991-a7b30feaabcd" providerId="ADAL" clId="{E16A9B21-8A09-4821-A32D-4609244DB1F6}" dt="2022-10-27T15:39:58.704" v="80" actId="14100"/>
+        <pc:chgData name="Parmanto, Dharma" userId="4f9a10d7-3858-4ebd-b991-a7b30feaabcd" providerId="ADAL" clId="{E16A9B21-8A09-4821-A32D-4609244DB1F6}" dt="2022-11-01T13:37:41.001" v="216" actId="14100"/>
         <pc:sldMkLst>
           <pc:docMk/>
           <pc:sldMk cId="804916847" sldId="262"/>
@@ -261,6 +345,22 @@
             <ac:spMk id="13" creationId="{C8C613BA-362A-DCC3-145C-A77FEF830EE5}"/>
           </ac:spMkLst>
         </pc:spChg>
+        <pc:spChg chg="mod">
+          <ac:chgData name="Parmanto, Dharma" userId="4f9a10d7-3858-4ebd-b991-a7b30feaabcd" providerId="ADAL" clId="{E16A9B21-8A09-4821-A32D-4609244DB1F6}" dt="2022-11-01T13:37:38.196" v="215" actId="1076"/>
+          <ac:spMkLst>
+            <pc:docMk/>
+            <pc:sldMk cId="804916847" sldId="262"/>
+            <ac:spMk id="67" creationId="{6A3EB60A-51DC-F3F1-4615-140FBF7D2523}"/>
+          </ac:spMkLst>
+        </pc:spChg>
+        <pc:spChg chg="mod">
+          <ac:chgData name="Parmanto, Dharma" userId="4f9a10d7-3858-4ebd-b991-a7b30feaabcd" providerId="ADAL" clId="{E16A9B21-8A09-4821-A32D-4609244DB1F6}" dt="2022-11-01T13:37:34.344" v="214" actId="1076"/>
+          <ac:spMkLst>
+            <pc:docMk/>
+            <pc:sldMk cId="804916847" sldId="262"/>
+            <ac:spMk id="69" creationId="{26BB20C4-8BE6-1E04-0C34-BEEB9FBEE7D8}"/>
+          </ac:spMkLst>
+        </pc:spChg>
         <pc:spChg chg="del mod">
           <ac:chgData name="Parmanto, Dharma" userId="4f9a10d7-3858-4ebd-b991-a7b30feaabcd" providerId="ADAL" clId="{E16A9B21-8A09-4821-A32D-4609244DB1F6}" dt="2022-10-27T15:36:41.224" v="41" actId="478"/>
           <ac:spMkLst>
@@ -286,11 +386,51 @@
           </ac:cxnSpMkLst>
         </pc:cxnChg>
         <pc:cxnChg chg="add mod">
-          <ac:chgData name="Parmanto, Dharma" userId="4f9a10d7-3858-4ebd-b991-a7b30feaabcd" providerId="ADAL" clId="{E16A9B21-8A09-4821-A32D-4609244DB1F6}" dt="2022-10-27T15:37:58.336" v="56" actId="14100"/>
+          <ac:chgData name="Parmanto, Dharma" userId="4f9a10d7-3858-4ebd-b991-a7b30feaabcd" providerId="ADAL" clId="{E16A9B21-8A09-4821-A32D-4609244DB1F6}" dt="2022-11-01T13:26:36.140" v="82" actId="14100"/>
           <ac:cxnSpMkLst>
             <pc:docMk/>
             <pc:sldMk cId="804916847" sldId="262"/>
             <ac:cxnSpMk id="17" creationId="{05C61E30-9BFD-8251-939D-2662AE0E24B5}"/>
+          </ac:cxnSpMkLst>
+        </pc:cxnChg>
+        <pc:cxnChg chg="mod">
+          <ac:chgData name="Parmanto, Dharma" userId="4f9a10d7-3858-4ebd-b991-a7b30feaabcd" providerId="ADAL" clId="{E16A9B21-8A09-4821-A32D-4609244DB1F6}" dt="2022-11-01T13:37:34.344" v="214" actId="1076"/>
+          <ac:cxnSpMkLst>
+            <pc:docMk/>
+            <pc:sldMk cId="804916847" sldId="262"/>
+            <ac:cxnSpMk id="76" creationId="{74D6E3A2-6F14-8490-6179-06D757C6C3BD}"/>
+          </ac:cxnSpMkLst>
+        </pc:cxnChg>
+        <pc:cxnChg chg="mod">
+          <ac:chgData name="Parmanto, Dharma" userId="4f9a10d7-3858-4ebd-b991-a7b30feaabcd" providerId="ADAL" clId="{E16A9B21-8A09-4821-A32D-4609244DB1F6}" dt="2022-11-01T13:26:50.646" v="86" actId="14100"/>
+          <ac:cxnSpMkLst>
+            <pc:docMk/>
+            <pc:sldMk cId="804916847" sldId="262"/>
+            <ac:cxnSpMk id="79" creationId="{A228EE20-5CEC-7B44-AEFA-D166DA374C82}"/>
+          </ac:cxnSpMkLst>
+        </pc:cxnChg>
+        <pc:cxnChg chg="mod">
+          <ac:chgData name="Parmanto, Dharma" userId="4f9a10d7-3858-4ebd-b991-a7b30feaabcd" providerId="ADAL" clId="{E16A9B21-8A09-4821-A32D-4609244DB1F6}" dt="2022-11-01T13:26:46.913" v="85" actId="14100"/>
+          <ac:cxnSpMkLst>
+            <pc:docMk/>
+            <pc:sldMk cId="804916847" sldId="262"/>
+            <ac:cxnSpMk id="82" creationId="{19B3D5D7-359B-C410-3C3C-AE077E298AED}"/>
+          </ac:cxnSpMkLst>
+        </pc:cxnChg>
+        <pc:cxnChg chg="mod">
+          <ac:chgData name="Parmanto, Dharma" userId="4f9a10d7-3858-4ebd-b991-a7b30feaabcd" providerId="ADAL" clId="{E16A9B21-8A09-4821-A32D-4609244DB1F6}" dt="2022-11-01T13:26:41.229" v="83" actId="14100"/>
+          <ac:cxnSpMkLst>
+            <pc:docMk/>
+            <pc:sldMk cId="804916847" sldId="262"/>
+            <ac:cxnSpMk id="85" creationId="{C79CCE4D-13EA-72E4-4EB5-C601C4B0765D}"/>
+          </ac:cxnSpMkLst>
+        </pc:cxnChg>
+        <pc:cxnChg chg="mod">
+          <ac:chgData name="Parmanto, Dharma" userId="4f9a10d7-3858-4ebd-b991-a7b30feaabcd" providerId="ADAL" clId="{E16A9B21-8A09-4821-A32D-4609244DB1F6}" dt="2022-11-01T13:37:41.001" v="216" actId="14100"/>
+          <ac:cxnSpMkLst>
+            <pc:docMk/>
+            <pc:sldMk cId="804916847" sldId="262"/>
+            <ac:cxnSpMk id="90" creationId="{7C8B479A-B08B-0147-6969-DF366D79A4A7}"/>
           </ac:cxnSpMkLst>
         </pc:cxnChg>
       </pc:sldChg>
@@ -3217,7 +3357,7 @@
           <a:p>
             <a:fld id="{E0981F5B-2BEF-4D8E-8064-E6D20D34FC04}" type="datetimeFigureOut">
               <a:rPr lang="en-US" smtClean="0"/>
-              <a:t>10/27/2022</a:t>
+              <a:t>11/1/2022</a:t>
             </a:fld>
             <a:endParaRPr lang="en-US"/>
           </a:p>
@@ -3425,7 +3565,7 @@
           <a:p>
             <a:fld id="{E0981F5B-2BEF-4D8E-8064-E6D20D34FC04}" type="datetimeFigureOut">
               <a:rPr lang="en-US" smtClean="0"/>
-              <a:t>10/27/2022</a:t>
+              <a:t>11/1/2022</a:t>
             </a:fld>
             <a:endParaRPr lang="en-US"/>
           </a:p>
@@ -3681,7 +3821,7 @@
           <a:p>
             <a:fld id="{E0981F5B-2BEF-4D8E-8064-E6D20D34FC04}" type="datetimeFigureOut">
               <a:rPr lang="en-US" smtClean="0"/>
-              <a:t>10/27/2022</a:t>
+              <a:t>11/1/2022</a:t>
             </a:fld>
             <a:endParaRPr lang="en-US"/>
           </a:p>
@@ -3855,7 +3995,7 @@
           <a:p>
             <a:fld id="{E0981F5B-2BEF-4D8E-8064-E6D20D34FC04}" type="datetimeFigureOut">
               <a:rPr lang="en-US" smtClean="0"/>
-              <a:t>10/27/2022</a:t>
+              <a:t>11/1/2022</a:t>
             </a:fld>
             <a:endParaRPr lang="en-US"/>
           </a:p>
@@ -4198,7 +4338,7 @@
           <a:p>
             <a:fld id="{E0981F5B-2BEF-4D8E-8064-E6D20D34FC04}" type="datetimeFigureOut">
               <a:rPr lang="en-US" smtClean="0"/>
-              <a:t>10/27/2022</a:t>
+              <a:t>11/1/2022</a:t>
             </a:fld>
             <a:endParaRPr lang="en-US"/>
           </a:p>
@@ -4473,7 +4613,7 @@
           <a:p>
             <a:fld id="{E0981F5B-2BEF-4D8E-8064-E6D20D34FC04}" type="datetimeFigureOut">
               <a:rPr lang="en-US" smtClean="0"/>
-              <a:t>10/27/2022</a:t>
+              <a:t>11/1/2022</a:t>
             </a:fld>
             <a:endParaRPr lang="en-US"/>
           </a:p>
@@ -4852,7 +4992,7 @@
           <a:p>
             <a:fld id="{E0981F5B-2BEF-4D8E-8064-E6D20D34FC04}" type="datetimeFigureOut">
               <a:rPr lang="en-US" smtClean="0"/>
-              <a:t>10/27/2022</a:t>
+              <a:t>11/1/2022</a:t>
             </a:fld>
             <a:endParaRPr lang="en-US"/>
           </a:p>
@@ -4970,7 +5110,7 @@
           <a:p>
             <a:fld id="{E0981F5B-2BEF-4D8E-8064-E6D20D34FC04}" type="datetimeFigureOut">
               <a:rPr lang="en-US" smtClean="0"/>
-              <a:t>10/27/2022</a:t>
+              <a:t>11/1/2022</a:t>
             </a:fld>
             <a:endParaRPr lang="en-US"/>
           </a:p>
@@ -5141,7 +5281,7 @@
           <a:p>
             <a:fld id="{E0981F5B-2BEF-4D8E-8064-E6D20D34FC04}" type="datetimeFigureOut">
               <a:rPr lang="en-US" smtClean="0"/>
-              <a:t>10/27/2022</a:t>
+              <a:t>11/1/2022</a:t>
             </a:fld>
             <a:endParaRPr lang="en-US"/>
           </a:p>
@@ -5495,7 +5635,7 @@
           <a:p>
             <a:fld id="{E0981F5B-2BEF-4D8E-8064-E6D20D34FC04}" type="datetimeFigureOut">
               <a:rPr lang="en-US" smtClean="0"/>
-              <a:t>10/27/2022</a:t>
+              <a:t>11/1/2022</a:t>
             </a:fld>
             <a:endParaRPr lang="en-US"/>
           </a:p>
@@ -5877,7 +6017,7 @@
           <a:p>
             <a:fld id="{E0981F5B-2BEF-4D8E-8064-E6D20D34FC04}" type="datetimeFigureOut">
               <a:rPr lang="en-US" smtClean="0"/>
-              <a:t>10/27/2022</a:t>
+              <a:t>11/1/2022</a:t>
             </a:fld>
             <a:endParaRPr lang="en-US"/>
           </a:p>
@@ -6164,7 +6304,7 @@
           <a:p>
             <a:fld id="{E0981F5B-2BEF-4D8E-8064-E6D20D34FC04}" type="datetimeFigureOut">
               <a:rPr lang="en-US" smtClean="0"/>
-              <a:t>10/27/2022</a:t>
+              <a:t>11/1/2022</a:t>
             </a:fld>
             <a:endParaRPr lang="en-US"/>
           </a:p>
@@ -8737,7 +8877,7 @@
           <a:prstGeom prst="line">
             <a:avLst/>
           </a:prstGeom>
-          <a:ln w="38100">
+          <a:ln w="76200" cmpd="dbl">
             <a:solidFill>
               <a:schemeClr val="tx1"/>
             </a:solidFill>
@@ -10859,15 +10999,15 @@
           </p:cNvPr>
           <p:cNvCxnSpPr>
             <a:cxnSpLocks/>
-            <a:stCxn id="7" idx="2"/>
+            <a:stCxn id="7" idx="4"/>
             <a:endCxn id="3" idx="0"/>
           </p:cNvCxnSpPr>
           <p:nvPr/>
         </p:nvCxnSpPr>
         <p:spPr>
           <a:xfrm>
-            <a:off x="163575" y="619389"/>
-            <a:ext cx="1357439" cy="1306449"/>
+            <a:off x="979546" y="957170"/>
+            <a:ext cx="541468" cy="968668"/>
           </a:xfrm>
           <a:prstGeom prst="line">
             <a:avLst/>
@@ -11283,7 +11423,7 @@
         </p:nvSpPr>
         <p:spPr>
           <a:xfrm>
-            <a:off x="5278424" y="5322170"/>
+            <a:off x="4968626" y="5087137"/>
             <a:ext cx="2019709" cy="675563"/>
           </a:xfrm>
           <a:prstGeom prst="ellipse">
@@ -11344,7 +11484,7 @@
         </p:nvSpPr>
         <p:spPr>
           <a:xfrm>
-            <a:off x="5399484" y="3925397"/>
+            <a:off x="5172497" y="4051676"/>
             <a:ext cx="2019709" cy="675563"/>
           </a:xfrm>
           <a:prstGeom prst="ellipse">
@@ -11660,14 +11800,14 @@
           <p:cNvCxnSpPr>
             <a:cxnSpLocks/>
             <a:stCxn id="100" idx="5"/>
-            <a:endCxn id="24" idx="0"/>
+            <a:endCxn id="24" idx="1"/>
           </p:cNvCxnSpPr>
           <p:nvPr/>
         </p:nvCxnSpPr>
         <p:spPr>
           <a:xfrm>
-            <a:off x="7123413" y="4502026"/>
-            <a:ext cx="755541" cy="203277"/>
+            <a:off x="6896426" y="4628305"/>
+            <a:ext cx="268453" cy="175932"/>
           </a:xfrm>
           <a:prstGeom prst="line">
             <a:avLst/>
@@ -11705,14 +11845,14 @@
           <p:cNvCxnSpPr>
             <a:cxnSpLocks/>
             <a:stCxn id="99" idx="6"/>
-            <a:endCxn id="24" idx="4"/>
+            <a:endCxn id="24" idx="3"/>
           </p:cNvCxnSpPr>
           <p:nvPr/>
         </p:nvCxnSpPr>
         <p:spPr>
           <a:xfrm flipV="1">
-            <a:off x="7298133" y="5380866"/>
-            <a:ext cx="580821" cy="279086"/>
+            <a:off x="6988335" y="5281932"/>
+            <a:ext cx="176544" cy="142987"/>
           </a:xfrm>
           <a:prstGeom prst="line">
             <a:avLst/>
@@ -12229,7 +12369,7 @@
         </p:nvSpPr>
         <p:spPr>
           <a:xfrm>
-            <a:off x="3508495" y="1305738"/>
+            <a:off x="7936604" y="2857062"/>
             <a:ext cx="2019709" cy="571938"/>
           </a:xfrm>
           <a:prstGeom prst="ellipse">
@@ -12351,7 +12491,7 @@
         </p:nvSpPr>
         <p:spPr>
           <a:xfrm>
-            <a:off x="7976942" y="2639151"/>
+            <a:off x="3632646" y="1526650"/>
             <a:ext cx="2019709" cy="675563"/>
           </a:xfrm>
           <a:prstGeom prst="ellipse">
@@ -12516,14 +12656,14 @@
           <p:cNvCxnSpPr>
             <a:cxnSpLocks/>
             <a:stCxn id="4" idx="0"/>
-            <a:endCxn id="67" idx="5"/>
+            <a:endCxn id="69" idx="5"/>
           </p:cNvCxnSpPr>
           <p:nvPr/>
         </p:nvCxnSpPr>
         <p:spPr>
           <a:xfrm flipH="1" flipV="1">
-            <a:off x="5232424" y="1793918"/>
-            <a:ext cx="526086" cy="1272083"/>
+            <a:off x="5356575" y="2103279"/>
+            <a:ext cx="401935" cy="962722"/>
           </a:xfrm>
           <a:prstGeom prst="line">
             <a:avLst/>
@@ -12561,14 +12701,14 @@
           <p:cNvCxnSpPr>
             <a:cxnSpLocks/>
             <a:stCxn id="65" idx="5"/>
-            <a:endCxn id="44" idx="1"/>
+            <a:endCxn id="44" idx="0"/>
           </p:cNvCxnSpPr>
           <p:nvPr/>
         </p:nvCxnSpPr>
         <p:spPr>
-          <a:xfrm flipH="1">
-            <a:off x="6609766" y="1351604"/>
-            <a:ext cx="59151" cy="700296"/>
+          <a:xfrm>
+            <a:off x="6668917" y="1351604"/>
+            <a:ext cx="317593" cy="618486"/>
           </a:xfrm>
           <a:prstGeom prst="line">
             <a:avLst/>
@@ -12605,15 +12745,15 @@
           </p:cNvPr>
           <p:cNvCxnSpPr>
             <a:cxnSpLocks/>
-            <a:stCxn id="66" idx="3"/>
-            <a:endCxn id="44" idx="0"/>
+            <a:stCxn id="66" idx="4"/>
+            <a:endCxn id="44" idx="7"/>
           </p:cNvCxnSpPr>
           <p:nvPr/>
         </p:nvCxnSpPr>
         <p:spPr>
           <a:xfrm flipH="1">
-            <a:off x="6986510" y="1394137"/>
-            <a:ext cx="438818" cy="575953"/>
+            <a:off x="7363253" y="1477895"/>
+            <a:ext cx="807076" cy="574005"/>
           </a:xfrm>
           <a:prstGeom prst="line">
             <a:avLst/>
@@ -12651,14 +12791,14 @@
           <p:cNvCxnSpPr>
             <a:cxnSpLocks/>
             <a:stCxn id="64" idx="2"/>
-            <a:endCxn id="44" idx="7"/>
+            <a:endCxn id="44" idx="6"/>
           </p:cNvCxnSpPr>
           <p:nvPr/>
         </p:nvCxnSpPr>
         <p:spPr>
           <a:xfrm flipH="1">
-            <a:off x="7363253" y="1996957"/>
-            <a:ext cx="701184" cy="54943"/>
+            <a:off x="7519305" y="1996957"/>
+            <a:ext cx="545132" cy="252451"/>
           </a:xfrm>
           <a:prstGeom prst="line">
             <a:avLst/>
@@ -12740,15 +12880,15 @@
           </p:cNvPr>
           <p:cNvCxnSpPr>
             <a:cxnSpLocks/>
-            <a:stCxn id="69" idx="2"/>
+            <a:stCxn id="67" idx="2"/>
             <a:endCxn id="4" idx="3"/>
           </p:cNvCxnSpPr>
           <p:nvPr/>
         </p:nvCxnSpPr>
         <p:spPr>
           <a:xfrm flipH="1">
-            <a:off x="7222530" y="2976933"/>
-            <a:ext cx="754412" cy="603418"/>
+            <a:off x="7222530" y="3143031"/>
+            <a:ext cx="714074" cy="437320"/>
           </a:xfrm>
           <a:prstGeom prst="line">
             <a:avLst/>
@@ -13513,7 +13653,7 @@
             </a:r>
             <a:r>
               <a:rPr lang="en-US" dirty="0"/>
-              <a:t>:&lt;COFFEE, PROMOTION&gt;, R:S, PARTIAL/PARTIAL;</a:t>
+              <a:t>:&lt;COFFEE, PROMOTION&gt;, R:S, PARTIAL/TOTAL;</a:t>
             </a:r>
           </a:p>
           <a:p>
@@ -13835,28 +13975,6 @@
           </a:bodyPr>
           <a:lstStyle/>
           <a:p>
-            <a:pPr marL="0" indent="0">
-              <a:buNone/>
-            </a:pPr>
-            <a:r>
-              <a:rPr lang="en-US" sz="1400" dirty="0">
-                <a:latin typeface="+mj-lt"/>
-              </a:rPr>
-              <a:t>- A customer only maintains 1 level of membership at any given time and so the attributes of `loyalty_level` and `points_earned`</a:t>
-            </a:r>
-          </a:p>
-          <a:p>
-            <a:pPr marL="0" indent="0">
-              <a:buNone/>
-            </a:pPr>
-            <a:r>
-              <a:rPr lang="en-US" sz="1400" dirty="0">
-                <a:latin typeface="+mj-lt"/>
-              </a:rPr>
-              <a:t>- If a customer is not a member, its `loyalty_level` and `points_earned` values will be NULL and 0 by default, respectively</a:t>
-            </a:r>
-          </a:p>
-          <a:p>
             <a:pPr>
               <a:buFontTx/>
               <a:buChar char="-"/>
@@ -13865,13 +13983,55 @@
               <a:rPr lang="en-US" sz="1400" dirty="0">
                 <a:latin typeface="+mj-lt"/>
               </a:rPr>
-              <a:t>Each Sale entry of coffee(single/multiple types of coffee) will be recorded as one type per entry with any amount of quantity </a:t>
-            </a:r>
-            <a:r>
-              <a:rPr lang="en-US" sz="1400">
+              <a:t>A customer only maintains 1 level of membership at any given time and so the attributes of `loyalty_level` and `</a:t>
+            </a:r>
+            <a:r>
+              <a:rPr lang="en-US" sz="1400" dirty="0" err="1">
                 <a:latin typeface="+mj-lt"/>
               </a:rPr>
-              <a:t>per entry</a:t>
+              <a:t>points_earned</a:t>
+            </a:r>
+            <a:r>
+              <a:rPr lang="en-US" sz="1400" dirty="0">
+                <a:latin typeface="+mj-lt"/>
+              </a:rPr>
+              <a:t>`</a:t>
+            </a:r>
+          </a:p>
+          <a:p>
+            <a:pPr>
+              <a:buFontTx/>
+              <a:buChar char="-"/>
+            </a:pPr>
+            <a:r>
+              <a:rPr lang="en-US" sz="1400" dirty="0">
+                <a:latin typeface="+mj-lt"/>
+              </a:rPr>
+              <a:t>If a customer is not a member, its `loyalty_level` and `points_earned` values will be NULL and 0 by default, respectively</a:t>
+            </a:r>
+          </a:p>
+          <a:p>
+            <a:pPr>
+              <a:buFontTx/>
+              <a:buChar char="-"/>
+            </a:pPr>
+            <a:r>
+              <a:rPr lang="en-US" sz="1400" dirty="0">
+                <a:latin typeface="+mj-lt"/>
+              </a:rPr>
+              <a:t>Each Sale entry of coffee(single/multiple types of coffee) will be recorded as one type per entry with any amount of quantity per entry</a:t>
+            </a:r>
+          </a:p>
+          <a:p>
+            <a:pPr>
+              <a:buFontTx/>
+              <a:buChar char="-"/>
+            </a:pPr>
+            <a:r>
+              <a:rPr lang="en-US" sz="1400" dirty="0">
+                <a:latin typeface="+mj-lt"/>
+              </a:rPr>
+              <a:t>Each Promotion Will have at least one Coffee that is promoted</a:t>
             </a:r>
           </a:p>
           <a:p>
@@ -13898,9 +14058,12 @@
             </a:pPr>
             <a:r>
               <a:rPr lang="en-US" sz="1400" dirty="0">
+                <a:solidFill>
+                  <a:schemeClr val="accent1"/>
+                </a:solidFill>
                 <a:latin typeface="+mj-lt"/>
               </a:rPr>
-              <a:t>-</a:t>
+              <a:t>- </a:t>
             </a:r>
             <a:r>
               <a:rPr lang="en-US" sz="1400" dirty="0">

</xml_diff>

<commit_message>
Added Ternary Relationship in Both E-R Model Forms
</commit_message>
<xml_diff>
--- a/Project/ER Model.pptx
+++ b/Project/ER Model.pptx
@@ -122,6 +122,7 @@
 <p1510:revInfo xmlns:a="http://schemas.openxmlformats.org/drawingml/2006/main" xmlns:r="http://schemas.openxmlformats.org/officeDocument/2006/relationships" xmlns:p1510="http://schemas.microsoft.com/office/powerpoint/2015/10/main">
   <p1510:revLst>
     <p1510:client id="{9D4BCFD5-1D90-4D44-B593-73DB9CAE7C55}" v="1" dt="2022-11-01T13:45:31.288"/>
+    <p1510:client id="{E16A9B21-8A09-4821-A32D-4609244DB1F6}" v="5" dt="2022-11-01T16:54:55.705"/>
   </p1510:revLst>
 </p1510:revInfo>
 </file>
@@ -207,17 +208,297 @@
   </pc:docChgLst>
   <pc:docChgLst>
     <pc:chgData name="Parmanto, Dharma" userId="4f9a10d7-3858-4ebd-b991-a7b30feaabcd" providerId="ADAL" clId="{E16A9B21-8A09-4821-A32D-4609244DB1F6}"/>
-    <pc:docChg chg="custSel modSld">
-      <pc:chgData name="Parmanto, Dharma" userId="4f9a10d7-3858-4ebd-b991-a7b30feaabcd" providerId="ADAL" clId="{E16A9B21-8A09-4821-A32D-4609244DB1F6}" dt="2022-10-27T15:39:58.704" v="80" actId="14100"/>
+    <pc:docChg chg="undo redo custSel modSld">
+      <pc:chgData name="Parmanto, Dharma" userId="4f9a10d7-3858-4ebd-b991-a7b30feaabcd" providerId="ADAL" clId="{E16A9B21-8A09-4821-A32D-4609244DB1F6}" dt="2022-11-01T17:00:31.720" v="426" actId="1076"/>
       <pc:docMkLst>
         <pc:docMk/>
       </pc:docMkLst>
       <pc:sldChg chg="addSp delSp modSp mod">
-        <pc:chgData name="Parmanto, Dharma" userId="4f9a10d7-3858-4ebd-b991-a7b30feaabcd" providerId="ADAL" clId="{E16A9B21-8A09-4821-A32D-4609244DB1F6}" dt="2022-10-27T15:39:42.702" v="79" actId="692"/>
+        <pc:chgData name="Parmanto, Dharma" userId="4f9a10d7-3858-4ebd-b991-a7b30feaabcd" providerId="ADAL" clId="{E16A9B21-8A09-4821-A32D-4609244DB1F6}" dt="2022-11-01T17:00:31.720" v="426" actId="1076"/>
         <pc:sldMkLst>
           <pc:docMk/>
           <pc:sldMk cId="3265300168" sldId="257"/>
         </pc:sldMkLst>
+        <pc:spChg chg="mod">
+          <ac:chgData name="Parmanto, Dharma" userId="4f9a10d7-3858-4ebd-b991-a7b30feaabcd" providerId="ADAL" clId="{E16A9B21-8A09-4821-A32D-4609244DB1F6}" dt="2022-11-01T16:54:13.760" v="208" actId="1076"/>
+          <ac:spMkLst>
+            <pc:docMk/>
+            <pc:sldMk cId="3265300168" sldId="257"/>
+            <ac:spMk id="4" creationId="{4A1C037F-862B-DB0E-9BFB-63FF9E935B69}"/>
+          </ac:spMkLst>
+        </pc:spChg>
+        <pc:spChg chg="mod">
+          <ac:chgData name="Parmanto, Dharma" userId="4f9a10d7-3858-4ebd-b991-a7b30feaabcd" providerId="ADAL" clId="{E16A9B21-8A09-4821-A32D-4609244DB1F6}" dt="2022-11-01T16:52:57.011" v="193" actId="1076"/>
+          <ac:spMkLst>
+            <pc:docMk/>
+            <pc:sldMk cId="3265300168" sldId="257"/>
+            <ac:spMk id="5" creationId="{9FE5C161-7745-C308-EE49-BD807D8B57EA}"/>
+          </ac:spMkLst>
+        </pc:spChg>
+        <pc:spChg chg="mod">
+          <ac:chgData name="Parmanto, Dharma" userId="4f9a10d7-3858-4ebd-b991-a7b30feaabcd" providerId="ADAL" clId="{E16A9B21-8A09-4821-A32D-4609244DB1F6}" dt="2022-11-01T16:56:12.057" v="227" actId="1076"/>
+          <ac:spMkLst>
+            <pc:docMk/>
+            <pc:sldMk cId="3265300168" sldId="257"/>
+            <ac:spMk id="6" creationId="{484EBA87-EE70-13AD-8BD1-B5BC2F459ADB}"/>
+          </ac:spMkLst>
+        </pc:spChg>
+        <pc:spChg chg="mod">
+          <ac:chgData name="Parmanto, Dharma" userId="4f9a10d7-3858-4ebd-b991-a7b30feaabcd" providerId="ADAL" clId="{E16A9B21-8A09-4821-A32D-4609244DB1F6}" dt="2022-11-01T16:49:27.636" v="153" actId="1076"/>
+          <ac:spMkLst>
+            <pc:docMk/>
+            <pc:sldMk cId="3265300168" sldId="257"/>
+            <ac:spMk id="7" creationId="{1B36DE02-D482-1039-B964-A6B53D55BB48}"/>
+          </ac:spMkLst>
+        </pc:spChg>
+        <pc:spChg chg="mod">
+          <ac:chgData name="Parmanto, Dharma" userId="4f9a10d7-3858-4ebd-b991-a7b30feaabcd" providerId="ADAL" clId="{E16A9B21-8A09-4821-A32D-4609244DB1F6}" dt="2022-11-01T16:49:34.202" v="155" actId="1076"/>
+          <ac:spMkLst>
+            <pc:docMk/>
+            <pc:sldMk cId="3265300168" sldId="257"/>
+            <ac:spMk id="8" creationId="{BCFCA614-3E71-7A77-3EF7-4891C8DFCBDF}"/>
+          </ac:spMkLst>
+        </pc:spChg>
+        <pc:spChg chg="mod">
+          <ac:chgData name="Parmanto, Dharma" userId="4f9a10d7-3858-4ebd-b991-a7b30feaabcd" providerId="ADAL" clId="{E16A9B21-8A09-4821-A32D-4609244DB1F6}" dt="2022-11-01T16:52:59.700" v="194" actId="1076"/>
+          <ac:spMkLst>
+            <pc:docMk/>
+            <pc:sldMk cId="3265300168" sldId="257"/>
+            <ac:spMk id="9" creationId="{50C2FC4D-2AEB-28A5-225D-5C71EC72E750}"/>
+          </ac:spMkLst>
+        </pc:spChg>
+        <pc:spChg chg="del">
+          <ac:chgData name="Parmanto, Dharma" userId="4f9a10d7-3858-4ebd-b991-a7b30feaabcd" providerId="ADAL" clId="{E16A9B21-8A09-4821-A32D-4609244DB1F6}" dt="2022-11-01T16:52:20.350" v="184" actId="478"/>
+          <ac:spMkLst>
+            <pc:docMk/>
+            <pc:sldMk cId="3265300168" sldId="257"/>
+            <ac:spMk id="10" creationId="{7EF13DAD-4C51-EBBE-E7A6-285D4481DE7B}"/>
+          </ac:spMkLst>
+        </pc:spChg>
+        <pc:spChg chg="mod">
+          <ac:chgData name="Parmanto, Dharma" userId="4f9a10d7-3858-4ebd-b991-a7b30feaabcd" providerId="ADAL" clId="{E16A9B21-8A09-4821-A32D-4609244DB1F6}" dt="2022-11-01T16:50:00.078" v="161" actId="1076"/>
+          <ac:spMkLst>
+            <pc:docMk/>
+            <pc:sldMk cId="3265300168" sldId="257"/>
+            <ac:spMk id="11" creationId="{1B14F668-10F0-1478-D93E-92A364184A99}"/>
+          </ac:spMkLst>
+        </pc:spChg>
+        <pc:spChg chg="mod">
+          <ac:chgData name="Parmanto, Dharma" userId="4f9a10d7-3858-4ebd-b991-a7b30feaabcd" providerId="ADAL" clId="{E16A9B21-8A09-4821-A32D-4609244DB1F6}" dt="2022-11-01T16:53:59.514" v="205" actId="1076"/>
+          <ac:spMkLst>
+            <pc:docMk/>
+            <pc:sldMk cId="3265300168" sldId="257"/>
+            <ac:spMk id="12" creationId="{4A033C8E-B94A-EDDE-890F-E216C4746FF5}"/>
+          </ac:spMkLst>
+        </pc:spChg>
+        <pc:spChg chg="mod">
+          <ac:chgData name="Parmanto, Dharma" userId="4f9a10d7-3858-4ebd-b991-a7b30feaabcd" providerId="ADAL" clId="{E16A9B21-8A09-4821-A32D-4609244DB1F6}" dt="2022-11-01T16:56:12.057" v="227" actId="1076"/>
+          <ac:spMkLst>
+            <pc:docMk/>
+            <pc:sldMk cId="3265300168" sldId="257"/>
+            <ac:spMk id="15" creationId="{D9276FFC-6D66-3754-9235-4F5C6C65E24F}"/>
+          </ac:spMkLst>
+        </pc:spChg>
+        <pc:spChg chg="mod">
+          <ac:chgData name="Parmanto, Dharma" userId="4f9a10d7-3858-4ebd-b991-a7b30feaabcd" providerId="ADAL" clId="{E16A9B21-8A09-4821-A32D-4609244DB1F6}" dt="2022-11-01T17:00:31.720" v="426" actId="1076"/>
+          <ac:spMkLst>
+            <pc:docMk/>
+            <pc:sldMk cId="3265300168" sldId="257"/>
+            <ac:spMk id="16" creationId="{098D29A4-D1BA-5297-E222-79FE349EE517}"/>
+          </ac:spMkLst>
+        </pc:spChg>
+        <pc:spChg chg="del">
+          <ac:chgData name="Parmanto, Dharma" userId="4f9a10d7-3858-4ebd-b991-a7b30feaabcd" providerId="ADAL" clId="{E16A9B21-8A09-4821-A32D-4609244DB1F6}" dt="2022-11-01T16:52:35.393" v="188" actId="478"/>
+          <ac:spMkLst>
+            <pc:docMk/>
+            <pc:sldMk cId="3265300168" sldId="257"/>
+            <ac:spMk id="24" creationId="{9DB68599-871F-553A-39E4-931DDA5B81A5}"/>
+          </ac:spMkLst>
+        </pc:spChg>
+        <pc:spChg chg="mod">
+          <ac:chgData name="Parmanto, Dharma" userId="4f9a10d7-3858-4ebd-b991-a7b30feaabcd" providerId="ADAL" clId="{E16A9B21-8A09-4821-A32D-4609244DB1F6}" dt="2022-11-01T16:53:23.751" v="200" actId="1076"/>
+          <ac:spMkLst>
+            <pc:docMk/>
+            <pc:sldMk cId="3265300168" sldId="257"/>
+            <ac:spMk id="27" creationId="{812E3166-9ACD-79F0-A384-FB1D6F168CD0}"/>
+          </ac:spMkLst>
+        </pc:spChg>
+        <pc:spChg chg="mod">
+          <ac:chgData name="Parmanto, Dharma" userId="4f9a10d7-3858-4ebd-b991-a7b30feaabcd" providerId="ADAL" clId="{E16A9B21-8A09-4821-A32D-4609244DB1F6}" dt="2022-11-01T16:49:01.433" v="144" actId="1076"/>
+          <ac:spMkLst>
+            <pc:docMk/>
+            <pc:sldMk cId="3265300168" sldId="257"/>
+            <ac:spMk id="52" creationId="{FFB2C03B-8731-8728-7465-6363A94F35C7}"/>
+          </ac:spMkLst>
+        </pc:spChg>
+        <pc:spChg chg="mod">
+          <ac:chgData name="Parmanto, Dharma" userId="4f9a10d7-3858-4ebd-b991-a7b30feaabcd" providerId="ADAL" clId="{E16A9B21-8A09-4821-A32D-4609244DB1F6}" dt="2022-11-01T16:51:42.486" v="174" actId="1076"/>
+          <ac:spMkLst>
+            <pc:docMk/>
+            <pc:sldMk cId="3265300168" sldId="257"/>
+            <ac:spMk id="63" creationId="{23ACE72E-0088-53F4-76D3-D80533E80A42}"/>
+          </ac:spMkLst>
+        </pc:spChg>
+        <pc:spChg chg="mod">
+          <ac:chgData name="Parmanto, Dharma" userId="4f9a10d7-3858-4ebd-b991-a7b30feaabcd" providerId="ADAL" clId="{E16A9B21-8A09-4821-A32D-4609244DB1F6}" dt="2022-11-01T16:55:19.160" v="221" actId="20577"/>
+          <ac:spMkLst>
+            <pc:docMk/>
+            <pc:sldMk cId="3265300168" sldId="257"/>
+            <ac:spMk id="64" creationId="{0EFF0AE9-1CD1-08EB-FA1B-E839B671F2C2}"/>
+          </ac:spMkLst>
+        </pc:spChg>
+        <pc:spChg chg="mod">
+          <ac:chgData name="Parmanto, Dharma" userId="4f9a10d7-3858-4ebd-b991-a7b30feaabcd" providerId="ADAL" clId="{E16A9B21-8A09-4821-A32D-4609244DB1F6}" dt="2022-11-01T16:49:40.759" v="157" actId="1076"/>
+          <ac:spMkLst>
+            <pc:docMk/>
+            <pc:sldMk cId="3265300168" sldId="257"/>
+            <ac:spMk id="65" creationId="{5058B1ED-A00D-35A2-C6F2-D5198E33302E}"/>
+          </ac:spMkLst>
+        </pc:spChg>
+        <pc:spChg chg="mod">
+          <ac:chgData name="Parmanto, Dharma" userId="4f9a10d7-3858-4ebd-b991-a7b30feaabcd" providerId="ADAL" clId="{E16A9B21-8A09-4821-A32D-4609244DB1F6}" dt="2022-11-01T16:55:39.889" v="224" actId="1076"/>
+          <ac:spMkLst>
+            <pc:docMk/>
+            <pc:sldMk cId="3265300168" sldId="257"/>
+            <ac:spMk id="66" creationId="{2991169A-2EC3-3FB8-1025-73578FC01990}"/>
+          </ac:spMkLst>
+        </pc:spChg>
+        <pc:spChg chg="mod">
+          <ac:chgData name="Parmanto, Dharma" userId="4f9a10d7-3858-4ebd-b991-a7b30feaabcd" providerId="ADAL" clId="{E16A9B21-8A09-4821-A32D-4609244DB1F6}" dt="2022-11-01T16:55:33.869" v="223" actId="1076"/>
+          <ac:spMkLst>
+            <pc:docMk/>
+            <pc:sldMk cId="3265300168" sldId="257"/>
+            <ac:spMk id="67" creationId="{3FB5F393-7A20-FD6A-86C5-E109820FAF6B}"/>
+          </ac:spMkLst>
+        </pc:spChg>
+        <pc:spChg chg="mod">
+          <ac:chgData name="Parmanto, Dharma" userId="4f9a10d7-3858-4ebd-b991-a7b30feaabcd" providerId="ADAL" clId="{E16A9B21-8A09-4821-A32D-4609244DB1F6}" dt="2022-11-01T16:54:10.232" v="207" actId="1076"/>
+          <ac:spMkLst>
+            <pc:docMk/>
+            <pc:sldMk cId="3265300168" sldId="257"/>
+            <ac:spMk id="68" creationId="{420E703E-DD8E-BE8C-132A-865E496BEB02}"/>
+          </ac:spMkLst>
+        </pc:spChg>
+        <pc:spChg chg="del">
+          <ac:chgData name="Parmanto, Dharma" userId="4f9a10d7-3858-4ebd-b991-a7b30feaabcd" providerId="ADAL" clId="{E16A9B21-8A09-4821-A32D-4609244DB1F6}" dt="2022-11-01T16:52:11.437" v="180" actId="478"/>
+          <ac:spMkLst>
+            <pc:docMk/>
+            <pc:sldMk cId="3265300168" sldId="257"/>
+            <ac:spMk id="73" creationId="{9D8409D6-2294-DD3D-75B4-94F7278D20E9}"/>
+          </ac:spMkLst>
+        </pc:spChg>
+        <pc:spChg chg="del">
+          <ac:chgData name="Parmanto, Dharma" userId="4f9a10d7-3858-4ebd-b991-a7b30feaabcd" providerId="ADAL" clId="{E16A9B21-8A09-4821-A32D-4609244DB1F6}" dt="2022-11-01T16:52:08.893" v="179" actId="478"/>
+          <ac:spMkLst>
+            <pc:docMk/>
+            <pc:sldMk cId="3265300168" sldId="257"/>
+            <ac:spMk id="74" creationId="{108E75A3-0A91-E053-0661-2E0FCE69AF93}"/>
+          </ac:spMkLst>
+        </pc:spChg>
+        <pc:spChg chg="mod">
+          <ac:chgData name="Parmanto, Dharma" userId="4f9a10d7-3858-4ebd-b991-a7b30feaabcd" providerId="ADAL" clId="{E16A9B21-8A09-4821-A32D-4609244DB1F6}" dt="2022-11-01T16:55:44.431" v="225" actId="1076"/>
+          <ac:spMkLst>
+            <pc:docMk/>
+            <pc:sldMk cId="3265300168" sldId="257"/>
+            <ac:spMk id="79" creationId="{FDA735F3-4218-2109-D8D2-152FFFA5F0B8}"/>
+          </ac:spMkLst>
+        </pc:spChg>
+        <pc:spChg chg="mod">
+          <ac:chgData name="Parmanto, Dharma" userId="4f9a10d7-3858-4ebd-b991-a7b30feaabcd" providerId="ADAL" clId="{E16A9B21-8A09-4821-A32D-4609244DB1F6}" dt="2022-11-01T16:55:08.918" v="219" actId="20577"/>
+          <ac:spMkLst>
+            <pc:docMk/>
+            <pc:sldMk cId="3265300168" sldId="257"/>
+            <ac:spMk id="83" creationId="{7BA4B782-CD4D-04B5-BDC5-C48B0A870871}"/>
+          </ac:spMkLst>
+        </pc:spChg>
+        <pc:spChg chg="del mod">
+          <ac:chgData name="Parmanto, Dharma" userId="4f9a10d7-3858-4ebd-b991-a7b30feaabcd" providerId="ADAL" clId="{E16A9B21-8A09-4821-A32D-4609244DB1F6}" dt="2022-11-01T16:53:39.836" v="202" actId="478"/>
+          <ac:spMkLst>
+            <pc:docMk/>
+            <pc:sldMk cId="3265300168" sldId="257"/>
+            <ac:spMk id="84" creationId="{33C170D1-3084-57C3-1B03-8B449DB5703B}"/>
+          </ac:spMkLst>
+        </pc:spChg>
+        <pc:spChg chg="add mod">
+          <ac:chgData name="Parmanto, Dharma" userId="4f9a10d7-3858-4ebd-b991-a7b30feaabcd" providerId="ADAL" clId="{E16A9B21-8A09-4821-A32D-4609244DB1F6}" dt="2022-11-01T16:49:25.237" v="151" actId="571"/>
+          <ac:spMkLst>
+            <pc:docMk/>
+            <pc:sldMk cId="3265300168" sldId="257"/>
+            <ac:spMk id="118" creationId="{0BA9E1BD-CAF2-F72C-4D41-AE5CB16C45A0}"/>
+          </ac:spMkLst>
+        </pc:spChg>
+        <pc:spChg chg="add mod">
+          <ac:chgData name="Parmanto, Dharma" userId="4f9a10d7-3858-4ebd-b991-a7b30feaabcd" providerId="ADAL" clId="{E16A9B21-8A09-4821-A32D-4609244DB1F6}" dt="2022-11-01T16:49:25.237" v="151" actId="571"/>
+          <ac:spMkLst>
+            <pc:docMk/>
+            <pc:sldMk cId="3265300168" sldId="257"/>
+            <ac:spMk id="119" creationId="{8613ECAC-D6A1-656C-978A-12A18EB5A3F0}"/>
+          </ac:spMkLst>
+        </pc:spChg>
+        <pc:spChg chg="add mod">
+          <ac:chgData name="Parmanto, Dharma" userId="4f9a10d7-3858-4ebd-b991-a7b30feaabcd" providerId="ADAL" clId="{E16A9B21-8A09-4821-A32D-4609244DB1F6}" dt="2022-11-01T16:49:25.237" v="151" actId="571"/>
+          <ac:spMkLst>
+            <pc:docMk/>
+            <pc:sldMk cId="3265300168" sldId="257"/>
+            <ac:spMk id="120" creationId="{DA40462C-14A2-F750-7C9D-0335029B274E}"/>
+          </ac:spMkLst>
+        </pc:spChg>
+        <pc:spChg chg="add mod">
+          <ac:chgData name="Parmanto, Dharma" userId="4f9a10d7-3858-4ebd-b991-a7b30feaabcd" providerId="ADAL" clId="{E16A9B21-8A09-4821-A32D-4609244DB1F6}" dt="2022-11-01T16:52:18.727" v="183" actId="1076"/>
+          <ac:spMkLst>
+            <pc:docMk/>
+            <pc:sldMk cId="3265300168" sldId="257"/>
+            <ac:spMk id="194" creationId="{09685404-D215-D3A0-FA4E-3F2AA108597D}"/>
+          </ac:spMkLst>
+        </pc:spChg>
+        <pc:spChg chg="mod">
+          <ac:chgData name="Parmanto, Dharma" userId="4f9a10d7-3858-4ebd-b991-a7b30feaabcd" providerId="ADAL" clId="{E16A9B21-8A09-4821-A32D-4609244DB1F6}" dt="2022-11-01T16:52:16.437" v="182" actId="571"/>
+          <ac:spMkLst>
+            <pc:docMk/>
+            <pc:sldMk cId="3265300168" sldId="257"/>
+            <ac:spMk id="196" creationId="{DF2AAE49-9880-2379-EE9E-130E78031E61}"/>
+          </ac:spMkLst>
+        </pc:spChg>
+        <pc:spChg chg="add del mod">
+          <ac:chgData name="Parmanto, Dharma" userId="4f9a10d7-3858-4ebd-b991-a7b30feaabcd" providerId="ADAL" clId="{E16A9B21-8A09-4821-A32D-4609244DB1F6}" dt="2022-11-01T16:53:14.376" v="199" actId="478"/>
+          <ac:spMkLst>
+            <pc:docMk/>
+            <pc:sldMk cId="3265300168" sldId="257"/>
+            <ac:spMk id="213" creationId="{64DECD1E-6EEF-6D05-2380-DD44E2212024}"/>
+          </ac:spMkLst>
+        </pc:spChg>
+        <pc:spChg chg="add mod">
+          <ac:chgData name="Parmanto, Dharma" userId="4f9a10d7-3858-4ebd-b991-a7b30feaabcd" providerId="ADAL" clId="{E16A9B21-8A09-4821-A32D-4609244DB1F6}" dt="2022-11-01T16:55:13.672" v="220" actId="20577"/>
+          <ac:spMkLst>
+            <pc:docMk/>
+            <pc:sldMk cId="3265300168" sldId="257"/>
+            <ac:spMk id="214" creationId="{9FA50EBD-1973-1E31-89F6-937A9E84EC43}"/>
+          </ac:spMkLst>
+        </pc:spChg>
+        <pc:spChg chg="add mod">
+          <ac:chgData name="Parmanto, Dharma" userId="4f9a10d7-3858-4ebd-b991-a7b30feaabcd" providerId="ADAL" clId="{E16A9B21-8A09-4821-A32D-4609244DB1F6}" dt="2022-11-01T16:55:01.392" v="218" actId="20577"/>
+          <ac:spMkLst>
+            <pc:docMk/>
+            <pc:sldMk cId="3265300168" sldId="257"/>
+            <ac:spMk id="234" creationId="{66D19437-939F-5A79-99D5-F72C4DEC4C95}"/>
+          </ac:spMkLst>
+        </pc:spChg>
+        <pc:grpChg chg="del">
+          <ac:chgData name="Parmanto, Dharma" userId="4f9a10d7-3858-4ebd-b991-a7b30feaabcd" providerId="ADAL" clId="{E16A9B21-8A09-4821-A32D-4609244DB1F6}" dt="2022-11-01T16:52:22.265" v="185" actId="478"/>
+          <ac:grpSpMkLst>
+            <pc:docMk/>
+            <pc:sldMk cId="3265300168" sldId="257"/>
+            <ac:grpSpMk id="44" creationId="{58DE1047-8AD8-ADFD-A03F-F110E4A7B4F3}"/>
+          </ac:grpSpMkLst>
+        </pc:grpChg>
+        <pc:grpChg chg="add mod">
+          <ac:chgData name="Parmanto, Dharma" userId="4f9a10d7-3858-4ebd-b991-a7b30feaabcd" providerId="ADAL" clId="{E16A9B21-8A09-4821-A32D-4609244DB1F6}" dt="2022-11-01T16:52:18.727" v="183" actId="1076"/>
+          <ac:grpSpMkLst>
+            <pc:docMk/>
+            <pc:sldMk cId="3265300168" sldId="257"/>
+            <ac:grpSpMk id="195" creationId="{50E2324A-C040-F4E1-FDD1-54D5FF9745C1}"/>
+          </ac:grpSpMkLst>
+        </pc:grpChg>
         <pc:cxnChg chg="del">
           <ac:chgData name="Parmanto, Dharma" userId="4f9a10d7-3858-4ebd-b991-a7b30feaabcd" providerId="ADAL" clId="{E16A9B21-8A09-4821-A32D-4609244DB1F6}" dt="2022-10-27T15:38:40.039" v="64" actId="478"/>
           <ac:cxnSpMkLst>
@@ -227,13 +508,29 @@
           </ac:cxnSpMkLst>
         </pc:cxnChg>
         <pc:cxnChg chg="mod">
-          <ac:chgData name="Parmanto, Dharma" userId="4f9a10d7-3858-4ebd-b991-a7b30feaabcd" providerId="ADAL" clId="{E16A9B21-8A09-4821-A32D-4609244DB1F6}" dt="2022-10-27T15:39:27.401" v="76" actId="692"/>
+          <ac:chgData name="Parmanto, Dharma" userId="4f9a10d7-3858-4ebd-b991-a7b30feaabcd" providerId="ADAL" clId="{E16A9B21-8A09-4821-A32D-4609244DB1F6}" dt="2022-11-01T16:53:59.514" v="205" actId="1076"/>
           <ac:cxnSpMkLst>
             <pc:docMk/>
             <pc:sldMk cId="3265300168" sldId="257"/>
             <ac:cxnSpMk id="14" creationId="{154F5747-B922-40F0-BAE4-0F814299123F}"/>
           </ac:cxnSpMkLst>
         </pc:cxnChg>
+        <pc:cxnChg chg="mod">
+          <ac:chgData name="Parmanto, Dharma" userId="4f9a10d7-3858-4ebd-b991-a7b30feaabcd" providerId="ADAL" clId="{E16A9B21-8A09-4821-A32D-4609244DB1F6}" dt="2022-11-01T17:00:31.720" v="426" actId="1076"/>
+          <ac:cxnSpMkLst>
+            <pc:docMk/>
+            <pc:sldMk cId="3265300168" sldId="257"/>
+            <ac:cxnSpMk id="17" creationId="{2908FEA3-3F65-7118-477F-FCEC86E40A39}"/>
+          </ac:cxnSpMkLst>
+        </pc:cxnChg>
+        <pc:cxnChg chg="mod">
+          <ac:chgData name="Parmanto, Dharma" userId="4f9a10d7-3858-4ebd-b991-a7b30feaabcd" providerId="ADAL" clId="{E16A9B21-8A09-4821-A32D-4609244DB1F6}" dt="2022-11-01T16:54:13.760" v="208" actId="1076"/>
+          <ac:cxnSpMkLst>
+            <pc:docMk/>
+            <pc:sldMk cId="3265300168" sldId="257"/>
+            <ac:cxnSpMk id="18" creationId="{96707A57-E3A1-652D-76B9-9CC1C91A65A1}"/>
+          </ac:cxnSpMkLst>
+        </pc:cxnChg>
         <pc:cxnChg chg="del">
           <ac:chgData name="Parmanto, Dharma" userId="4f9a10d7-3858-4ebd-b991-a7b30feaabcd" providerId="ADAL" clId="{E16A9B21-8A09-4821-A32D-4609244DB1F6}" dt="2022-10-27T15:38:37.447" v="63" actId="478"/>
           <ac:cxnSpMkLst>
@@ -242,8 +539,8 @@
             <ac:cxnSpMk id="19" creationId="{8D84B695-7A00-B609-E61F-40846BF69AC8}"/>
           </ac:cxnSpMkLst>
         </pc:cxnChg>
-        <pc:cxnChg chg="add mod">
-          <ac:chgData name="Parmanto, Dharma" userId="4f9a10d7-3858-4ebd-b991-a7b30feaabcd" providerId="ADAL" clId="{E16A9B21-8A09-4821-A32D-4609244DB1F6}" dt="2022-10-27T15:39:09.024" v="73" actId="692"/>
+        <pc:cxnChg chg="add del mod">
+          <ac:chgData name="Parmanto, Dharma" userId="4f9a10d7-3858-4ebd-b991-a7b30feaabcd" providerId="ADAL" clId="{E16A9B21-8A09-4821-A32D-4609244DB1F6}" dt="2022-11-01T16:52:04.470" v="178" actId="478"/>
           <ac:cxnSpMkLst>
             <pc:docMk/>
             <pc:sldMk cId="3265300168" sldId="257"/>
@@ -258,6 +555,46 @@
             <ac:cxnSpMk id="21" creationId="{205266DB-06B1-18F7-F64C-AAD0FF062BD0}"/>
           </ac:cxnSpMkLst>
         </pc:cxnChg>
+        <pc:cxnChg chg="mod">
+          <ac:chgData name="Parmanto, Dharma" userId="4f9a10d7-3858-4ebd-b991-a7b30feaabcd" providerId="ADAL" clId="{E16A9B21-8A09-4821-A32D-4609244DB1F6}" dt="2022-11-01T16:56:12.057" v="227" actId="1076"/>
+          <ac:cxnSpMkLst>
+            <pc:docMk/>
+            <pc:sldMk cId="3265300168" sldId="257"/>
+            <ac:cxnSpMk id="23" creationId="{64285A40-F14E-4ABF-6413-52C56A46E9D6}"/>
+          </ac:cxnSpMkLst>
+        </pc:cxnChg>
+        <pc:cxnChg chg="del mod">
+          <ac:chgData name="Parmanto, Dharma" userId="4f9a10d7-3858-4ebd-b991-a7b30feaabcd" providerId="ADAL" clId="{E16A9B21-8A09-4821-A32D-4609244DB1F6}" dt="2022-11-01T16:52:12.692" v="181" actId="478"/>
+          <ac:cxnSpMkLst>
+            <pc:docMk/>
+            <pc:sldMk cId="3265300168" sldId="257"/>
+            <ac:cxnSpMk id="25" creationId="{1D9619E7-5CB8-0419-D703-E324E96B345A}"/>
+          </ac:cxnSpMkLst>
+        </pc:cxnChg>
+        <pc:cxnChg chg="mod">
+          <ac:chgData name="Parmanto, Dharma" userId="4f9a10d7-3858-4ebd-b991-a7b30feaabcd" providerId="ADAL" clId="{E16A9B21-8A09-4821-A32D-4609244DB1F6}" dt="2022-11-01T16:54:13.760" v="208" actId="1076"/>
+          <ac:cxnSpMkLst>
+            <pc:docMk/>
+            <pc:sldMk cId="3265300168" sldId="257"/>
+            <ac:cxnSpMk id="28" creationId="{2A6FC7FD-49B4-CA70-4548-E644A0AE6D58}"/>
+          </ac:cxnSpMkLst>
+        </pc:cxnChg>
+        <pc:cxnChg chg="mod">
+          <ac:chgData name="Parmanto, Dharma" userId="4f9a10d7-3858-4ebd-b991-a7b30feaabcd" providerId="ADAL" clId="{E16A9B21-8A09-4821-A32D-4609244DB1F6}" dt="2022-11-01T16:52:59.700" v="194" actId="1076"/>
+          <ac:cxnSpMkLst>
+            <pc:docMk/>
+            <pc:sldMk cId="3265300168" sldId="257"/>
+            <ac:cxnSpMk id="29" creationId="{96E51764-604E-BA68-17AB-C96E314151A0}"/>
+          </ac:cxnSpMkLst>
+        </pc:cxnChg>
+        <pc:cxnChg chg="mod">
+          <ac:chgData name="Parmanto, Dharma" userId="4f9a10d7-3858-4ebd-b991-a7b30feaabcd" providerId="ADAL" clId="{E16A9B21-8A09-4821-A32D-4609244DB1F6}" dt="2022-11-01T16:56:12.057" v="227" actId="1076"/>
+          <ac:cxnSpMkLst>
+            <pc:docMk/>
+            <pc:sldMk cId="3265300168" sldId="257"/>
+            <ac:cxnSpMk id="30" creationId="{56AC74B0-93F7-42F2-1037-2828AE224797}"/>
+          </ac:cxnSpMkLst>
+        </pc:cxnChg>
         <pc:cxnChg chg="del mod">
           <ac:chgData name="Parmanto, Dharma" userId="4f9a10d7-3858-4ebd-b991-a7b30feaabcd" providerId="ADAL" clId="{E16A9B21-8A09-4821-A32D-4609244DB1F6}" dt="2022-10-27T15:38:41.555" v="65" actId="478"/>
           <ac:cxnSpMkLst>
@@ -266,6 +603,14 @@
             <ac:cxnSpMk id="32" creationId="{42DCB8B2-3CAA-D1E9-2E05-300E3E86039E}"/>
           </ac:cxnSpMkLst>
         </pc:cxnChg>
+        <pc:cxnChg chg="mod">
+          <ac:chgData name="Parmanto, Dharma" userId="4f9a10d7-3858-4ebd-b991-a7b30feaabcd" providerId="ADAL" clId="{E16A9B21-8A09-4821-A32D-4609244DB1F6}" dt="2022-11-01T16:56:26.974" v="229" actId="692"/>
+          <ac:cxnSpMkLst>
+            <pc:docMk/>
+            <pc:sldMk cId="3265300168" sldId="257"/>
+            <ac:cxnSpMk id="34" creationId="{DDA579C7-69C7-7243-2A32-0F8531FA559B}"/>
+          </ac:cxnSpMkLst>
+        </pc:cxnChg>
         <pc:cxnChg chg="del mod">
           <ac:chgData name="Parmanto, Dharma" userId="4f9a10d7-3858-4ebd-b991-a7b30feaabcd" providerId="ADAL" clId="{E16A9B21-8A09-4821-A32D-4609244DB1F6}" dt="2022-10-27T15:38:43.373" v="66" actId="478"/>
           <ac:cxnSpMkLst>
@@ -275,13 +620,29 @@
           </ac:cxnSpMkLst>
         </pc:cxnChg>
         <pc:cxnChg chg="mod">
-          <ac:chgData name="Parmanto, Dharma" userId="4f9a10d7-3858-4ebd-b991-a7b30feaabcd" providerId="ADAL" clId="{E16A9B21-8A09-4821-A32D-4609244DB1F6}" dt="2022-10-27T15:39:42.702" v="79" actId="692"/>
+          <ac:chgData name="Parmanto, Dharma" userId="4f9a10d7-3858-4ebd-b991-a7b30feaabcd" providerId="ADAL" clId="{E16A9B21-8A09-4821-A32D-4609244DB1F6}" dt="2022-11-01T16:50:00.078" v="161" actId="1076"/>
+          <ac:cxnSpMkLst>
+            <pc:docMk/>
+            <pc:sldMk cId="3265300168" sldId="257"/>
+            <ac:cxnSpMk id="39" creationId="{C4B1C665-5761-B97F-1793-DF199C1FDA9B}"/>
+          </ac:cxnSpMkLst>
+        </pc:cxnChg>
+        <pc:cxnChg chg="mod">
+          <ac:chgData name="Parmanto, Dharma" userId="4f9a10d7-3858-4ebd-b991-a7b30feaabcd" providerId="ADAL" clId="{E16A9B21-8A09-4821-A32D-4609244DB1F6}" dt="2022-11-01T16:50:00.078" v="161" actId="1076"/>
           <ac:cxnSpMkLst>
             <pc:docMk/>
             <pc:sldMk cId="3265300168" sldId="257"/>
             <ac:cxnSpMk id="43" creationId="{5A96B510-D029-C4C7-8AE4-84DF53FFD064}"/>
           </ac:cxnSpMkLst>
         </pc:cxnChg>
+        <pc:cxnChg chg="mod">
+          <ac:chgData name="Parmanto, Dharma" userId="4f9a10d7-3858-4ebd-b991-a7b30feaabcd" providerId="ADAL" clId="{E16A9B21-8A09-4821-A32D-4609244DB1F6}" dt="2022-11-01T16:54:13.760" v="208" actId="1076"/>
+          <ac:cxnSpMkLst>
+            <pc:docMk/>
+            <pc:sldMk cId="3265300168" sldId="257"/>
+            <ac:cxnSpMk id="45" creationId="{44DB48E6-BEFA-8353-32B8-4C8A2A71CE99}"/>
+          </ac:cxnSpMkLst>
+        </pc:cxnChg>
         <pc:cxnChg chg="del">
           <ac:chgData name="Parmanto, Dharma" userId="4f9a10d7-3858-4ebd-b991-a7b30feaabcd" providerId="ADAL" clId="{E16A9B21-8A09-4821-A32D-4609244DB1F6}" dt="2022-10-27T15:39:36.516" v="77" actId="478"/>
           <ac:cxnSpMkLst>
@@ -291,13 +652,29 @@
           </ac:cxnSpMkLst>
         </pc:cxnChg>
         <pc:cxnChg chg="mod">
-          <ac:chgData name="Parmanto, Dharma" userId="4f9a10d7-3858-4ebd-b991-a7b30feaabcd" providerId="ADAL" clId="{E16A9B21-8A09-4821-A32D-4609244DB1F6}" dt="2022-10-27T15:38:34.136" v="62" actId="692"/>
+          <ac:chgData name="Parmanto, Dharma" userId="4f9a10d7-3858-4ebd-b991-a7b30feaabcd" providerId="ADAL" clId="{E16A9B21-8A09-4821-A32D-4609244DB1F6}" dt="2022-11-01T16:54:13.760" v="208" actId="1076"/>
+          <ac:cxnSpMkLst>
+            <pc:docMk/>
+            <pc:sldMk cId="3265300168" sldId="257"/>
+            <ac:cxnSpMk id="49" creationId="{3A69E441-5885-1B5B-1A4D-62ABCD69D6CD}"/>
+          </ac:cxnSpMkLst>
+        </pc:cxnChg>
+        <pc:cxnChg chg="mod">
+          <ac:chgData name="Parmanto, Dharma" userId="4f9a10d7-3858-4ebd-b991-a7b30feaabcd" providerId="ADAL" clId="{E16A9B21-8A09-4821-A32D-4609244DB1F6}" dt="2022-11-01T16:49:27.636" v="153" actId="1076"/>
           <ac:cxnSpMkLst>
             <pc:docMk/>
             <pc:sldMk cId="3265300168" sldId="257"/>
             <ac:cxnSpMk id="53" creationId="{D4013AB7-7F06-3512-96C3-486A4AF579CD}"/>
           </ac:cxnSpMkLst>
         </pc:cxnChg>
+        <pc:cxnChg chg="mod">
+          <ac:chgData name="Parmanto, Dharma" userId="4f9a10d7-3858-4ebd-b991-a7b30feaabcd" providerId="ADAL" clId="{E16A9B21-8A09-4821-A32D-4609244DB1F6}" dt="2022-11-01T16:56:12.057" v="227" actId="1076"/>
+          <ac:cxnSpMkLst>
+            <pc:docMk/>
+            <pc:sldMk cId="3265300168" sldId="257"/>
+            <ac:cxnSpMk id="56" creationId="{3A717CC6-B29C-AA83-19D7-844C952CEF61}"/>
+          </ac:cxnSpMkLst>
+        </pc:cxnChg>
         <pc:cxnChg chg="del">
           <ac:chgData name="Parmanto, Dharma" userId="4f9a10d7-3858-4ebd-b991-a7b30feaabcd" providerId="ADAL" clId="{E16A9B21-8A09-4821-A32D-4609244DB1F6}" dt="2022-10-27T15:38:27.839" v="60" actId="478"/>
           <ac:cxnSpMkLst>
@@ -306,6 +683,52 @@
             <ac:cxnSpMk id="59" creationId="{E88901CF-5821-8CD1-D6C5-E434D5E3404B}"/>
           </ac:cxnSpMkLst>
         </pc:cxnChg>
+        <pc:cxnChg chg="mod">
+          <ac:chgData name="Parmanto, Dharma" userId="4f9a10d7-3858-4ebd-b991-a7b30feaabcd" providerId="ADAL" clId="{E16A9B21-8A09-4821-A32D-4609244DB1F6}" dt="2022-11-01T16:55:44.431" v="225" actId="1076"/>
+          <ac:cxnSpMkLst>
+            <pc:docMk/>
+            <pc:sldMk cId="3265300168" sldId="257"/>
+            <ac:cxnSpMk id="80" creationId="{40B84FB2-A191-8785-C9C9-BA22D40FA71D}"/>
+          </ac:cxnSpMkLst>
+        </pc:cxnChg>
+        <pc:cxnChg chg="mod">
+          <ac:chgData name="Parmanto, Dharma" userId="4f9a10d7-3858-4ebd-b991-a7b30feaabcd" providerId="ADAL" clId="{E16A9B21-8A09-4821-A32D-4609244DB1F6}" dt="2022-11-01T16:52:16.437" v="182" actId="571"/>
+          <ac:cxnSpMkLst>
+            <pc:docMk/>
+            <pc:sldMk cId="3265300168" sldId="257"/>
+            <ac:cxnSpMk id="197" creationId="{8490BB7B-BF92-DB60-4B54-48274502C908}"/>
+          </ac:cxnSpMkLst>
+        </pc:cxnChg>
+      </pc:sldChg>
+      <pc:sldChg chg="modSp mod">
+        <pc:chgData name="Parmanto, Dharma" userId="4f9a10d7-3858-4ebd-b991-a7b30feaabcd" providerId="ADAL" clId="{E16A9B21-8A09-4821-A32D-4609244DB1F6}" dt="2022-11-01T16:59:50.725" v="419" actId="20577"/>
+        <pc:sldMkLst>
+          <pc:docMk/>
+          <pc:sldMk cId="1871788821" sldId="260"/>
+        </pc:sldMkLst>
+        <pc:spChg chg="mod">
+          <ac:chgData name="Parmanto, Dharma" userId="4f9a10d7-3858-4ebd-b991-a7b30feaabcd" providerId="ADAL" clId="{E16A9B21-8A09-4821-A32D-4609244DB1F6}" dt="2022-11-01T16:59:50.725" v="419" actId="20577"/>
+          <ac:spMkLst>
+            <pc:docMk/>
+            <pc:sldMk cId="1871788821" sldId="260"/>
+            <ac:spMk id="3" creationId="{59C44DD6-9389-6B4C-6D7C-CE926EF1EED2}"/>
+          </ac:spMkLst>
+        </pc:spChg>
+      </pc:sldChg>
+      <pc:sldChg chg="modSp mod">
+        <pc:chgData name="Parmanto, Dharma" userId="4f9a10d7-3858-4ebd-b991-a7b30feaabcd" providerId="ADAL" clId="{E16A9B21-8A09-4821-A32D-4609244DB1F6}" dt="2022-11-01T16:58:23.755" v="273" actId="20577"/>
+        <pc:sldMkLst>
+          <pc:docMk/>
+          <pc:sldMk cId="298272431" sldId="261"/>
+        </pc:sldMkLst>
+        <pc:spChg chg="mod">
+          <ac:chgData name="Parmanto, Dharma" userId="4f9a10d7-3858-4ebd-b991-a7b30feaabcd" providerId="ADAL" clId="{E16A9B21-8A09-4821-A32D-4609244DB1F6}" dt="2022-11-01T16:58:23.755" v="273" actId="20577"/>
+          <ac:spMkLst>
+            <pc:docMk/>
+            <pc:sldMk cId="298272431" sldId="261"/>
+            <ac:spMk id="15" creationId="{645AFB24-AF41-6A9E-0A67-ADDB00DBC052}"/>
+          </ac:spMkLst>
+        </pc:spChg>
       </pc:sldChg>
       <pc:sldChg chg="addSp delSp modSp mod">
         <pc:chgData name="Parmanto, Dharma" userId="4f9a10d7-3858-4ebd-b991-a7b30feaabcd" providerId="ADAL" clId="{E16A9B21-8A09-4821-A32D-4609244DB1F6}" dt="2022-10-27T15:39:58.704" v="80" actId="14100"/>
@@ -6927,7 +7350,7 @@
         </p:nvSpPr>
         <p:spPr>
           <a:xfrm>
-            <a:off x="7454365" y="4832700"/>
+            <a:off x="5975674" y="2624376"/>
             <a:ext cx="1863791" cy="830424"/>
           </a:xfrm>
           <a:prstGeom prst="rect">
@@ -6981,7 +7404,7 @@
         </p:nvSpPr>
         <p:spPr>
           <a:xfrm>
-            <a:off x="6645873" y="592213"/>
+            <a:off x="8409865" y="304758"/>
             <a:ext cx="3387854" cy="1028699"/>
           </a:xfrm>
           <a:prstGeom prst="rect">
@@ -7035,7 +7458,7 @@
         </p:nvSpPr>
         <p:spPr>
           <a:xfrm>
-            <a:off x="1791299" y="649426"/>
+            <a:off x="3282423" y="397369"/>
             <a:ext cx="2031741" cy="839082"/>
           </a:xfrm>
           <a:prstGeom prst="rect">
@@ -7089,7 +7512,7 @@
         </p:nvSpPr>
         <p:spPr>
           <a:xfrm>
-            <a:off x="4546363" y="2649336"/>
+            <a:off x="1038451" y="2624232"/>
             <a:ext cx="1474713" cy="839082"/>
           </a:xfrm>
           <a:prstGeom prst="rect">
@@ -7143,7 +7566,7 @@
         </p:nvSpPr>
         <p:spPr>
           <a:xfrm>
-            <a:off x="831400" y="4775213"/>
+            <a:off x="2976750" y="4668968"/>
             <a:ext cx="2928040" cy="1028699"/>
           </a:xfrm>
           <a:prstGeom prst="rect">
@@ -7197,7 +7620,7 @@
         </p:nvSpPr>
         <p:spPr>
           <a:xfrm>
-            <a:off x="4482702" y="4554437"/>
+            <a:off x="980733" y="4456635"/>
             <a:ext cx="1590148" cy="1464906"/>
           </a:xfrm>
           <a:prstGeom prst="diamond">
@@ -7254,7 +7677,7 @@
         </p:nvSpPr>
         <p:spPr>
           <a:xfrm>
-            <a:off x="7546507" y="2266445"/>
+            <a:off x="3413405" y="2249343"/>
             <a:ext cx="1679509" cy="1604863"/>
           </a:xfrm>
           <a:prstGeom prst="diamond">
@@ -7315,8 +7738,8 @@
         </p:nvCxnSpPr>
         <p:spPr>
           <a:xfrm>
-            <a:off x="6021076" y="3068877"/>
-            <a:ext cx="1525431" cy="0"/>
+            <a:off x="2513164" y="3043773"/>
+            <a:ext cx="900241" cy="8002"/>
           </a:xfrm>
           <a:prstGeom prst="line">
             <a:avLst/>
@@ -7353,15 +7776,15 @@
           </p:cNvPr>
           <p:cNvCxnSpPr>
             <a:cxnSpLocks/>
-            <a:stCxn id="4" idx="0"/>
-            <a:endCxn id="12" idx="2"/>
+            <a:stCxn id="4" idx="1"/>
+            <a:endCxn id="12" idx="3"/>
           </p:cNvCxnSpPr>
           <p:nvPr/>
         </p:nvCxnSpPr>
         <p:spPr>
-          <a:xfrm flipV="1">
-            <a:off x="8386261" y="3871308"/>
-            <a:ext cx="1" cy="961392"/>
+          <a:xfrm flipH="1">
+            <a:off x="5092914" y="3039588"/>
+            <a:ext cx="882760" cy="12187"/>
           </a:xfrm>
           <a:prstGeom prst="line">
             <a:avLst/>
@@ -7387,12 +7810,147 @@
           </a:fontRef>
         </p:style>
       </p:cxnSp>
-      <p:sp>
-        <p:nvSpPr>
-          <p:cNvPr id="24" name="Diamond 23">
+      <p:cxnSp>
+        <p:nvCxnSpPr>
+          <p:cNvPr id="28" name="Straight Connector 27">
             <a:extLst>
               <a:ext uri="{FF2B5EF4-FFF2-40B4-BE49-F238E27FC236}">
-                <a16:creationId xmlns:a16="http://schemas.microsoft.com/office/drawing/2014/main" id="{9DB68599-871F-553A-39E4-931DDA5B81A5}"/>
+                <a16:creationId xmlns:a16="http://schemas.microsoft.com/office/drawing/2014/main" id="{2A6FC7FD-49B4-CA70-4548-E644A0AE6D58}"/>
+              </a:ext>
+            </a:extLst>
+          </p:cNvPr>
+          <p:cNvCxnSpPr>
+            <a:cxnSpLocks/>
+            <a:stCxn id="4" idx="0"/>
+            <a:endCxn id="27" idx="2"/>
+          </p:cNvCxnSpPr>
+          <p:nvPr/>
+        </p:nvCxnSpPr>
+        <p:spPr>
+          <a:xfrm flipH="1" flipV="1">
+            <a:off x="6891074" y="1549363"/>
+            <a:ext cx="16496" cy="1075013"/>
+          </a:xfrm>
+          <a:prstGeom prst="line">
+            <a:avLst/>
+          </a:prstGeom>
+          <a:ln w="38100">
+            <a:solidFill>
+              <a:schemeClr val="tx1"/>
+            </a:solidFill>
+          </a:ln>
+        </p:spPr>
+        <p:style>
+          <a:lnRef idx="1">
+            <a:schemeClr val="dk1"/>
+          </a:lnRef>
+          <a:fillRef idx="0">
+            <a:schemeClr val="dk1"/>
+          </a:fillRef>
+          <a:effectRef idx="0">
+            <a:schemeClr val="dk1"/>
+          </a:effectRef>
+          <a:fontRef idx="minor">
+            <a:schemeClr val="tx1"/>
+          </a:fontRef>
+        </p:style>
+      </p:cxnSp>
+      <p:cxnSp>
+        <p:nvCxnSpPr>
+          <p:cNvPr id="39" name="Straight Connector 38">
+            <a:extLst>
+              <a:ext uri="{FF2B5EF4-FFF2-40B4-BE49-F238E27FC236}">
+                <a16:creationId xmlns:a16="http://schemas.microsoft.com/office/drawing/2014/main" id="{C4B1C665-5761-B97F-1793-DF199C1FDA9B}"/>
+              </a:ext>
+            </a:extLst>
+          </p:cNvPr>
+          <p:cNvCxnSpPr>
+            <a:cxnSpLocks/>
+            <a:stCxn id="8" idx="1"/>
+            <a:endCxn id="11" idx="3"/>
+          </p:cNvCxnSpPr>
+          <p:nvPr/>
+        </p:nvCxnSpPr>
+        <p:spPr>
+          <a:xfrm flipH="1">
+            <a:off x="2570881" y="5183318"/>
+            <a:ext cx="405869" cy="5770"/>
+          </a:xfrm>
+          <a:prstGeom prst="line">
+            <a:avLst/>
+          </a:prstGeom>
+          <a:ln w="38100">
+            <a:solidFill>
+              <a:schemeClr val="tx1"/>
+            </a:solidFill>
+          </a:ln>
+        </p:spPr>
+        <p:style>
+          <a:lnRef idx="1">
+            <a:schemeClr val="dk1"/>
+          </a:lnRef>
+          <a:fillRef idx="0">
+            <a:schemeClr val="dk1"/>
+          </a:fillRef>
+          <a:effectRef idx="0">
+            <a:schemeClr val="dk1"/>
+          </a:effectRef>
+          <a:fontRef idx="minor">
+            <a:schemeClr val="tx1"/>
+          </a:fontRef>
+        </p:style>
+      </p:cxnSp>
+      <p:cxnSp>
+        <p:nvCxnSpPr>
+          <p:cNvPr id="43" name="Straight Connector 42">
+            <a:extLst>
+              <a:ext uri="{FF2B5EF4-FFF2-40B4-BE49-F238E27FC236}">
+                <a16:creationId xmlns:a16="http://schemas.microsoft.com/office/drawing/2014/main" id="{5A96B510-D029-C4C7-8AE4-84DF53FFD064}"/>
+              </a:ext>
+            </a:extLst>
+          </p:cNvPr>
+          <p:cNvCxnSpPr>
+            <a:cxnSpLocks/>
+            <a:stCxn id="7" idx="2"/>
+            <a:endCxn id="11" idx="0"/>
+          </p:cNvCxnSpPr>
+          <p:nvPr/>
+        </p:nvCxnSpPr>
+        <p:spPr>
+          <a:xfrm flipH="1">
+            <a:off x="1775807" y="3463314"/>
+            <a:ext cx="1" cy="993321"/>
+          </a:xfrm>
+          <a:prstGeom prst="line">
+            <a:avLst/>
+          </a:prstGeom>
+          <a:ln w="76200" cmpd="dbl">
+            <a:solidFill>
+              <a:schemeClr val="tx1"/>
+            </a:solidFill>
+          </a:ln>
+        </p:spPr>
+        <p:style>
+          <a:lnRef idx="1">
+            <a:schemeClr val="dk1"/>
+          </a:lnRef>
+          <a:fillRef idx="0">
+            <a:schemeClr val="dk1"/>
+          </a:fillRef>
+          <a:effectRef idx="0">
+            <a:schemeClr val="dk1"/>
+          </a:effectRef>
+          <a:fontRef idx="minor">
+            <a:schemeClr val="tx1"/>
+          </a:fontRef>
+        </p:style>
+      </p:cxnSp>
+      <p:sp>
+        <p:nvSpPr>
+          <p:cNvPr id="52" name="Diamond 51">
+            <a:extLst>
+              <a:ext uri="{FF2B5EF4-FFF2-40B4-BE49-F238E27FC236}">
+                <a16:creationId xmlns:a16="http://schemas.microsoft.com/office/drawing/2014/main" id="{FFB2C03B-8731-8728-7465-6363A94F35C7}"/>
               </a:ext>
             </a:extLst>
           </p:cNvPr>
@@ -7401,7 +7959,7 @@
         </p:nvSpPr>
         <p:spPr>
           <a:xfrm>
-            <a:off x="10065770" y="2266444"/>
+            <a:off x="936054" y="18878"/>
             <a:ext cx="1679509" cy="1604863"/>
           </a:xfrm>
           <a:prstGeom prst="diamond">
@@ -7439,35 +7997,36 @@
             <a:pPr algn="ctr"/>
             <a:r>
               <a:rPr lang="en-US" sz="1050" dirty="0"/>
-              <a:t>Participates</a:t>
+              <a:t>Contains</a:t>
             </a:r>
           </a:p>
         </p:txBody>
       </p:sp>
       <p:cxnSp>
         <p:nvCxnSpPr>
-          <p:cNvPr id="25" name="Straight Connector 24">
+          <p:cNvPr id="53" name="Straight Connector 52">
             <a:extLst>
               <a:ext uri="{FF2B5EF4-FFF2-40B4-BE49-F238E27FC236}">
-                <a16:creationId xmlns:a16="http://schemas.microsoft.com/office/drawing/2014/main" id="{1D9619E7-5CB8-0419-D703-E324E96B345A}"/>
+                <a16:creationId xmlns:a16="http://schemas.microsoft.com/office/drawing/2014/main" id="{D4013AB7-7F06-3512-96C3-486A4AF579CD}"/>
               </a:ext>
             </a:extLst>
           </p:cNvPr>
           <p:cNvCxnSpPr>
             <a:cxnSpLocks/>
-            <a:endCxn id="24" idx="2"/>
+            <a:stCxn id="52" idx="2"/>
+            <a:endCxn id="7" idx="0"/>
           </p:cNvCxnSpPr>
           <p:nvPr/>
         </p:nvCxnSpPr>
         <p:spPr>
-          <a:xfrm flipV="1">
-            <a:off x="10905525" y="3871307"/>
-            <a:ext cx="0" cy="1391068"/>
+          <a:xfrm flipH="1">
+            <a:off x="1775808" y="1623741"/>
+            <a:ext cx="1" cy="1000491"/>
           </a:xfrm>
           <a:prstGeom prst="line">
             <a:avLst/>
           </a:prstGeom>
-          <a:ln w="38100">
+          <a:ln w="76200" cmpd="dbl">
             <a:solidFill>
               <a:schemeClr val="tx1"/>
             </a:solidFill>
@@ -7490,23 +8049,447 @@
       </p:cxnSp>
       <p:cxnSp>
         <p:nvCxnSpPr>
-          <p:cNvPr id="28" name="Straight Connector 27">
+          <p:cNvPr id="56" name="Straight Connector 55">
             <a:extLst>
               <a:ext uri="{FF2B5EF4-FFF2-40B4-BE49-F238E27FC236}">
-                <a16:creationId xmlns:a16="http://schemas.microsoft.com/office/drawing/2014/main" id="{2A6FC7FD-49B4-CA70-4548-E644A0AE6D58}"/>
+                <a16:creationId xmlns:a16="http://schemas.microsoft.com/office/drawing/2014/main" id="{3A717CC6-B29C-AA83-19D7-844C952CEF61}"/>
               </a:ext>
             </a:extLst>
           </p:cNvPr>
           <p:cNvCxnSpPr>
             <a:cxnSpLocks/>
-            <a:stCxn id="4" idx="3"/>
+            <a:stCxn id="52" idx="3"/>
+            <a:endCxn id="6" idx="1"/>
           </p:cNvCxnSpPr>
           <p:nvPr/>
         </p:nvCxnSpPr>
         <p:spPr>
+          <a:xfrm flipV="1">
+            <a:off x="2615563" y="816910"/>
+            <a:ext cx="666860" cy="4400"/>
+          </a:xfrm>
+          <a:prstGeom prst="line">
+            <a:avLst/>
+          </a:prstGeom>
+          <a:ln w="38100">
+            <a:solidFill>
+              <a:schemeClr val="tx1"/>
+            </a:solidFill>
+          </a:ln>
+        </p:spPr>
+        <p:style>
+          <a:lnRef idx="1">
+            <a:schemeClr val="dk1"/>
+          </a:lnRef>
+          <a:fillRef idx="0">
+            <a:schemeClr val="dk1"/>
+          </a:fillRef>
+          <a:effectRef idx="0">
+            <a:schemeClr val="dk1"/>
+          </a:effectRef>
+          <a:fontRef idx="minor">
+            <a:schemeClr val="tx1"/>
+          </a:fontRef>
+        </p:style>
+      </p:cxnSp>
+      <p:sp>
+        <p:nvSpPr>
+          <p:cNvPr id="63" name="TextBox 62">
+            <a:extLst>
+              <a:ext uri="{FF2B5EF4-FFF2-40B4-BE49-F238E27FC236}">
+                <a16:creationId xmlns:a16="http://schemas.microsoft.com/office/drawing/2014/main" id="{23ACE72E-0088-53F4-76D3-D80533E80A42}"/>
+              </a:ext>
+            </a:extLst>
+          </p:cNvPr>
+          <p:cNvSpPr txBox="1"/>
+          <p:nvPr/>
+        </p:nvSpPr>
+        <p:spPr>
           <a:xfrm>
-            <a:off x="9318156" y="5247912"/>
-            <a:ext cx="1587368" cy="0"/>
+            <a:off x="2576463" y="390373"/>
+            <a:ext cx="301686" cy="369332"/>
+          </a:xfrm>
+          <a:prstGeom prst="rect">
+            <a:avLst/>
+          </a:prstGeom>
+          <a:noFill/>
+        </p:spPr>
+        <p:txBody>
+          <a:bodyPr wrap="none" rtlCol="0">
+            <a:spAutoFit/>
+          </a:bodyPr>
+          <a:lstStyle/>
+          <a:p>
+            <a:r>
+              <a:rPr lang="en-US" dirty="0"/>
+              <a:t>1</a:t>
+            </a:r>
+          </a:p>
+        </p:txBody>
+      </p:sp>
+      <p:sp>
+        <p:nvSpPr>
+          <p:cNvPr id="64" name="TextBox 63">
+            <a:extLst>
+              <a:ext uri="{FF2B5EF4-FFF2-40B4-BE49-F238E27FC236}">
+                <a16:creationId xmlns:a16="http://schemas.microsoft.com/office/drawing/2014/main" id="{0EFF0AE9-1CD1-08EB-FA1B-E839B671F2C2}"/>
+              </a:ext>
+            </a:extLst>
+          </p:cNvPr>
+          <p:cNvSpPr txBox="1"/>
+          <p:nvPr/>
+        </p:nvSpPr>
+        <p:spPr>
+          <a:xfrm>
+            <a:off x="1879994" y="2029575"/>
+            <a:ext cx="309700" cy="369332"/>
+          </a:xfrm>
+          <a:prstGeom prst="rect">
+            <a:avLst/>
+          </a:prstGeom>
+          <a:noFill/>
+        </p:spPr>
+        <p:txBody>
+          <a:bodyPr wrap="none" rtlCol="0">
+            <a:spAutoFit/>
+          </a:bodyPr>
+          <a:lstStyle/>
+          <a:p>
+            <a:r>
+              <a:rPr lang="en-US" dirty="0"/>
+              <a:t>R</a:t>
+            </a:r>
+          </a:p>
+        </p:txBody>
+      </p:sp>
+      <p:sp>
+        <p:nvSpPr>
+          <p:cNvPr id="65" name="TextBox 64">
+            <a:extLst>
+              <a:ext uri="{FF2B5EF4-FFF2-40B4-BE49-F238E27FC236}">
+                <a16:creationId xmlns:a16="http://schemas.microsoft.com/office/drawing/2014/main" id="{5058B1ED-A00D-35A2-C6F2-D5198E33302E}"/>
+              </a:ext>
+            </a:extLst>
+          </p:cNvPr>
+          <p:cNvSpPr txBox="1"/>
+          <p:nvPr/>
+        </p:nvSpPr>
+        <p:spPr>
+          <a:xfrm>
+            <a:off x="2513164" y="4736355"/>
+            <a:ext cx="301686" cy="369332"/>
+          </a:xfrm>
+          <a:prstGeom prst="rect">
+            <a:avLst/>
+          </a:prstGeom>
+          <a:noFill/>
+        </p:spPr>
+        <p:txBody>
+          <a:bodyPr wrap="none" rtlCol="0">
+            <a:spAutoFit/>
+          </a:bodyPr>
+          <a:lstStyle/>
+          <a:p>
+            <a:r>
+              <a:rPr lang="en-US" dirty="0"/>
+              <a:t>1</a:t>
+            </a:r>
+          </a:p>
+        </p:txBody>
+      </p:sp>
+      <p:sp>
+        <p:nvSpPr>
+          <p:cNvPr id="66" name="TextBox 65">
+            <a:extLst>
+              <a:ext uri="{FF2B5EF4-FFF2-40B4-BE49-F238E27FC236}">
+                <a16:creationId xmlns:a16="http://schemas.microsoft.com/office/drawing/2014/main" id="{2991169A-2EC3-3FB8-1025-73578FC01990}"/>
+              </a:ext>
+            </a:extLst>
+          </p:cNvPr>
+          <p:cNvSpPr txBox="1"/>
+          <p:nvPr/>
+        </p:nvSpPr>
+        <p:spPr>
+          <a:xfrm>
+            <a:off x="1839598" y="4038285"/>
+            <a:ext cx="333746" cy="369332"/>
+          </a:xfrm>
+          <a:prstGeom prst="rect">
+            <a:avLst/>
+          </a:prstGeom>
+          <a:noFill/>
+        </p:spPr>
+        <p:txBody>
+          <a:bodyPr wrap="none" rtlCol="0">
+            <a:spAutoFit/>
+          </a:bodyPr>
+          <a:lstStyle/>
+          <a:p>
+            <a:r>
+              <a:rPr lang="en-US" dirty="0"/>
+              <a:t>N</a:t>
+            </a:r>
+          </a:p>
+        </p:txBody>
+      </p:sp>
+      <p:sp>
+        <p:nvSpPr>
+          <p:cNvPr id="67" name="TextBox 66">
+            <a:extLst>
+              <a:ext uri="{FF2B5EF4-FFF2-40B4-BE49-F238E27FC236}">
+                <a16:creationId xmlns:a16="http://schemas.microsoft.com/office/drawing/2014/main" id="{3FB5F393-7A20-FD6A-86C5-E109820FAF6B}"/>
+              </a:ext>
+            </a:extLst>
+          </p:cNvPr>
+          <p:cNvSpPr txBox="1"/>
+          <p:nvPr/>
+        </p:nvSpPr>
+        <p:spPr>
+          <a:xfrm>
+            <a:off x="2866906" y="2647807"/>
+            <a:ext cx="381836" cy="369332"/>
+          </a:xfrm>
+          <a:prstGeom prst="rect">
+            <a:avLst/>
+          </a:prstGeom>
+          <a:noFill/>
+        </p:spPr>
+        <p:txBody>
+          <a:bodyPr wrap="none" rtlCol="0">
+            <a:spAutoFit/>
+          </a:bodyPr>
+          <a:lstStyle/>
+          <a:p>
+            <a:r>
+              <a:rPr lang="en-US" dirty="0"/>
+              <a:t>M</a:t>
+            </a:r>
+          </a:p>
+        </p:txBody>
+      </p:sp>
+      <p:sp>
+        <p:nvSpPr>
+          <p:cNvPr id="68" name="TextBox 67">
+            <a:extLst>
+              <a:ext uri="{FF2B5EF4-FFF2-40B4-BE49-F238E27FC236}">
+                <a16:creationId xmlns:a16="http://schemas.microsoft.com/office/drawing/2014/main" id="{420E703E-DD8E-BE8C-132A-865E496BEB02}"/>
+              </a:ext>
+            </a:extLst>
+          </p:cNvPr>
+          <p:cNvSpPr txBox="1"/>
+          <p:nvPr/>
+        </p:nvSpPr>
+        <p:spPr>
+          <a:xfrm>
+            <a:off x="5329169" y="2564037"/>
+            <a:ext cx="301686" cy="369332"/>
+          </a:xfrm>
+          <a:prstGeom prst="rect">
+            <a:avLst/>
+          </a:prstGeom>
+          <a:noFill/>
+        </p:spPr>
+        <p:txBody>
+          <a:bodyPr wrap="none" rtlCol="0">
+            <a:spAutoFit/>
+          </a:bodyPr>
+          <a:lstStyle/>
+          <a:p>
+            <a:r>
+              <a:rPr lang="en-US" dirty="0"/>
+              <a:t>1</a:t>
+            </a:r>
+          </a:p>
+        </p:txBody>
+      </p:sp>
+      <p:sp>
+        <p:nvSpPr>
+          <p:cNvPr id="9" name="Oval 8">
+            <a:extLst>
+              <a:ext uri="{FF2B5EF4-FFF2-40B4-BE49-F238E27FC236}">
+                <a16:creationId xmlns:a16="http://schemas.microsoft.com/office/drawing/2014/main" id="{50C2FC4D-2AEB-28A5-225D-5C71EC72E750}"/>
+              </a:ext>
+            </a:extLst>
+          </p:cNvPr>
+          <p:cNvSpPr/>
+          <p:nvPr/>
+        </p:nvSpPr>
+        <p:spPr>
+          <a:xfrm>
+            <a:off x="9518974" y="2371723"/>
+            <a:ext cx="2198946" cy="555227"/>
+          </a:xfrm>
+          <a:prstGeom prst="ellipse">
+            <a:avLst/>
+          </a:prstGeom>
+          <a:solidFill>
+            <a:schemeClr val="bg1"/>
+          </a:solidFill>
+        </p:spPr>
+        <p:style>
+          <a:lnRef idx="2">
+            <a:schemeClr val="dk1">
+              <a:shade val="50000"/>
+            </a:schemeClr>
+          </a:lnRef>
+          <a:fillRef idx="1">
+            <a:schemeClr val="dk1"/>
+          </a:fillRef>
+          <a:effectRef idx="0">
+            <a:schemeClr val="dk1"/>
+          </a:effectRef>
+          <a:fontRef idx="minor">
+            <a:schemeClr val="lt1"/>
+          </a:fontRef>
+        </p:style>
+        <p:txBody>
+          <a:bodyPr rtlCol="0" anchor="ctr"/>
+          <a:lstStyle/>
+          <a:p>
+            <a:pPr algn="ctr"/>
+            <a:r>
+              <a:rPr lang="en-US" u="sng" dirty="0">
+                <a:solidFill>
+                  <a:schemeClr val="tx1"/>
+                </a:solidFill>
+              </a:rPr>
+              <a:t>promotion_ID</a:t>
+            </a:r>
+          </a:p>
+        </p:txBody>
+      </p:sp>
+      <p:sp>
+        <p:nvSpPr>
+          <p:cNvPr id="15" name="Oval 14">
+            <a:extLst>
+              <a:ext uri="{FF2B5EF4-FFF2-40B4-BE49-F238E27FC236}">
+                <a16:creationId xmlns:a16="http://schemas.microsoft.com/office/drawing/2014/main" id="{D9276FFC-6D66-3754-9235-4F5C6C65E24F}"/>
+              </a:ext>
+            </a:extLst>
+          </p:cNvPr>
+          <p:cNvSpPr/>
+          <p:nvPr/>
+        </p:nvSpPr>
+        <p:spPr>
+          <a:xfrm>
+            <a:off x="3365612" y="1549363"/>
+            <a:ext cx="1628725" cy="479844"/>
+          </a:xfrm>
+          <a:prstGeom prst="ellipse">
+            <a:avLst/>
+          </a:prstGeom>
+          <a:solidFill>
+            <a:schemeClr val="bg1"/>
+          </a:solidFill>
+        </p:spPr>
+        <p:style>
+          <a:lnRef idx="2">
+            <a:schemeClr val="dk1">
+              <a:shade val="50000"/>
+            </a:schemeClr>
+          </a:lnRef>
+          <a:fillRef idx="1">
+            <a:schemeClr val="dk1"/>
+          </a:fillRef>
+          <a:effectRef idx="0">
+            <a:schemeClr val="dk1"/>
+          </a:effectRef>
+          <a:fontRef idx="minor">
+            <a:schemeClr val="lt1"/>
+          </a:fontRef>
+        </p:style>
+        <p:txBody>
+          <a:bodyPr rtlCol="0" anchor="ctr"/>
+          <a:lstStyle/>
+          <a:p>
+            <a:pPr algn="ctr"/>
+            <a:r>
+              <a:rPr lang="en-US" u="sng" dirty="0">
+                <a:solidFill>
+                  <a:schemeClr val="tx1"/>
+                </a:solidFill>
+              </a:rPr>
+              <a:t>coffee_ID</a:t>
+            </a:r>
+          </a:p>
+        </p:txBody>
+      </p:sp>
+      <p:sp>
+        <p:nvSpPr>
+          <p:cNvPr id="16" name="Oval 15">
+            <a:extLst>
+              <a:ext uri="{FF2B5EF4-FFF2-40B4-BE49-F238E27FC236}">
+                <a16:creationId xmlns:a16="http://schemas.microsoft.com/office/drawing/2014/main" id="{098D29A4-D1BA-5297-E222-79FE349EE517}"/>
+              </a:ext>
+            </a:extLst>
+          </p:cNvPr>
+          <p:cNvSpPr/>
+          <p:nvPr/>
+        </p:nvSpPr>
+        <p:spPr>
+          <a:xfrm>
+            <a:off x="6493917" y="4956672"/>
+            <a:ext cx="2040670" cy="453291"/>
+          </a:xfrm>
+          <a:prstGeom prst="ellipse">
+            <a:avLst/>
+          </a:prstGeom>
+          <a:solidFill>
+            <a:schemeClr val="bg1"/>
+          </a:solidFill>
+        </p:spPr>
+        <p:style>
+          <a:lnRef idx="2">
+            <a:schemeClr val="dk1">
+              <a:shade val="50000"/>
+            </a:schemeClr>
+          </a:lnRef>
+          <a:fillRef idx="1">
+            <a:schemeClr val="dk1"/>
+          </a:fillRef>
+          <a:effectRef idx="0">
+            <a:schemeClr val="dk1"/>
+          </a:effectRef>
+          <a:fontRef idx="minor">
+            <a:schemeClr val="lt1"/>
+          </a:fontRef>
+        </p:style>
+        <p:txBody>
+          <a:bodyPr rtlCol="0" anchor="ctr"/>
+          <a:lstStyle/>
+          <a:p>
+            <a:pPr algn="ctr"/>
+            <a:r>
+              <a:rPr lang="en-US" u="sng" dirty="0">
+                <a:solidFill>
+                  <a:schemeClr val="tx1"/>
+                </a:solidFill>
+              </a:rPr>
+              <a:t>customer_ID</a:t>
+            </a:r>
+          </a:p>
+        </p:txBody>
+      </p:sp>
+      <p:cxnSp>
+        <p:nvCxnSpPr>
+          <p:cNvPr id="17" name="Straight Connector 16">
+            <a:extLst>
+              <a:ext uri="{FF2B5EF4-FFF2-40B4-BE49-F238E27FC236}">
+                <a16:creationId xmlns:a16="http://schemas.microsoft.com/office/drawing/2014/main" id="{2908FEA3-3F65-7118-477F-FCEC86E40A39}"/>
+              </a:ext>
+            </a:extLst>
+          </p:cNvPr>
+          <p:cNvCxnSpPr>
+            <a:cxnSpLocks/>
+            <a:stCxn id="16" idx="2"/>
+            <a:endCxn id="8" idx="3"/>
+          </p:cNvCxnSpPr>
+          <p:nvPr/>
+        </p:nvCxnSpPr>
+        <p:spPr>
+          <a:xfrm flipH="1">
+            <a:off x="5904790" y="5183318"/>
+            <a:ext cx="589127" cy="0"/>
           </a:xfrm>
           <a:prstGeom prst="line">
             <a:avLst/>
@@ -7534,23 +8517,24 @@
       </p:cxnSp>
       <p:cxnSp>
         <p:nvCxnSpPr>
-          <p:cNvPr id="39" name="Straight Connector 38">
+          <p:cNvPr id="23" name="Straight Connector 22">
             <a:extLst>
               <a:ext uri="{FF2B5EF4-FFF2-40B4-BE49-F238E27FC236}">
-                <a16:creationId xmlns:a16="http://schemas.microsoft.com/office/drawing/2014/main" id="{C4B1C665-5761-B97F-1793-DF199C1FDA9B}"/>
+                <a16:creationId xmlns:a16="http://schemas.microsoft.com/office/drawing/2014/main" id="{64285A40-F14E-4ABF-6413-52C56A46E9D6}"/>
               </a:ext>
             </a:extLst>
           </p:cNvPr>
           <p:cNvCxnSpPr>
             <a:cxnSpLocks/>
-            <a:endCxn id="8" idx="3"/>
+            <a:stCxn id="6" idx="2"/>
+            <a:endCxn id="15" idx="0"/>
           </p:cNvCxnSpPr>
           <p:nvPr/>
         </p:nvCxnSpPr>
         <p:spPr>
-          <a:xfrm flipH="1" flipV="1">
-            <a:off x="3759440" y="5289563"/>
-            <a:ext cx="723262" cy="9731"/>
+          <a:xfrm flipH="1">
+            <a:off x="4179975" y="1236451"/>
+            <a:ext cx="118319" cy="312912"/>
           </a:xfrm>
           <a:prstGeom prst="line">
             <a:avLst/>
@@ -7578,28 +8562,29 @@
       </p:cxnSp>
       <p:cxnSp>
         <p:nvCxnSpPr>
-          <p:cNvPr id="43" name="Straight Connector 42">
+          <p:cNvPr id="29" name="Straight Connector 28">
             <a:extLst>
               <a:ext uri="{FF2B5EF4-FFF2-40B4-BE49-F238E27FC236}">
-                <a16:creationId xmlns:a16="http://schemas.microsoft.com/office/drawing/2014/main" id="{5A96B510-D029-C4C7-8AE4-84DF53FFD064}"/>
+                <a16:creationId xmlns:a16="http://schemas.microsoft.com/office/drawing/2014/main" id="{96E51764-604E-BA68-17AB-C96E314151A0}"/>
               </a:ext>
             </a:extLst>
           </p:cNvPr>
           <p:cNvCxnSpPr>
             <a:cxnSpLocks/>
-            <a:stCxn id="7" idx="2"/>
+            <a:stCxn id="5" idx="2"/>
+            <a:endCxn id="9" idx="0"/>
           </p:cNvCxnSpPr>
           <p:nvPr/>
         </p:nvCxnSpPr>
         <p:spPr>
-          <a:xfrm flipH="1">
-            <a:off x="5277776" y="3488418"/>
-            <a:ext cx="5944" cy="1078423"/>
+          <a:xfrm>
+            <a:off x="10103792" y="1333457"/>
+            <a:ext cx="514655" cy="1038266"/>
           </a:xfrm>
           <a:prstGeom prst="line">
             <a:avLst/>
           </a:prstGeom>
-          <a:ln w="76200" cmpd="dbl">
+          <a:ln w="38100">
             <a:solidFill>
               <a:schemeClr val="tx1"/>
             </a:solidFill>
@@ -7620,12 +8605,102 @@
           </a:fontRef>
         </p:style>
       </p:cxnSp>
-      <p:sp>
-        <p:nvSpPr>
-          <p:cNvPr id="52" name="Diamond 51">
+      <p:cxnSp>
+        <p:nvCxnSpPr>
+          <p:cNvPr id="45" name="Straight Connector 44">
             <a:extLst>
               <a:ext uri="{FF2B5EF4-FFF2-40B4-BE49-F238E27FC236}">
-                <a16:creationId xmlns:a16="http://schemas.microsoft.com/office/drawing/2014/main" id="{FFB2C03B-8731-8728-7465-6363A94F35C7}"/>
+                <a16:creationId xmlns:a16="http://schemas.microsoft.com/office/drawing/2014/main" id="{44DB48E6-BEFA-8353-32B8-4C8A2A71CE99}"/>
+              </a:ext>
+            </a:extLst>
+          </p:cNvPr>
+          <p:cNvCxnSpPr>
+            <a:cxnSpLocks/>
+            <a:stCxn id="4" idx="2"/>
+            <a:endCxn id="194" idx="0"/>
+          </p:cNvCxnSpPr>
+          <p:nvPr/>
+        </p:nvCxnSpPr>
+        <p:spPr>
+          <a:xfrm flipH="1">
+            <a:off x="6620522" y="3454800"/>
+            <a:ext cx="287048" cy="383406"/>
+          </a:xfrm>
+          <a:prstGeom prst="line">
+            <a:avLst/>
+          </a:prstGeom>
+          <a:ln w="38100">
+            <a:solidFill>
+              <a:schemeClr val="tx1"/>
+            </a:solidFill>
+          </a:ln>
+        </p:spPr>
+        <p:style>
+          <a:lnRef idx="1">
+            <a:schemeClr val="dk1"/>
+          </a:lnRef>
+          <a:fillRef idx="0">
+            <a:schemeClr val="dk1"/>
+          </a:fillRef>
+          <a:effectRef idx="0">
+            <a:schemeClr val="dk1"/>
+          </a:effectRef>
+          <a:fontRef idx="minor">
+            <a:schemeClr val="tx1"/>
+          </a:fontRef>
+        </p:style>
+      </p:cxnSp>
+      <p:cxnSp>
+        <p:nvCxnSpPr>
+          <p:cNvPr id="49" name="Straight Connector 48">
+            <a:extLst>
+              <a:ext uri="{FF2B5EF4-FFF2-40B4-BE49-F238E27FC236}">
+                <a16:creationId xmlns:a16="http://schemas.microsoft.com/office/drawing/2014/main" id="{3A69E441-5885-1B5B-1A4D-62ABCD69D6CD}"/>
+              </a:ext>
+            </a:extLst>
+          </p:cNvPr>
+          <p:cNvCxnSpPr>
+            <a:cxnSpLocks/>
+            <a:stCxn id="4" idx="2"/>
+            <a:endCxn id="196" idx="0"/>
+          </p:cNvCxnSpPr>
+          <p:nvPr/>
+        </p:nvCxnSpPr>
+        <p:spPr>
+          <a:xfrm>
+            <a:off x="6907570" y="3454800"/>
+            <a:ext cx="1620644" cy="383405"/>
+          </a:xfrm>
+          <a:prstGeom prst="line">
+            <a:avLst/>
+          </a:prstGeom>
+          <a:ln w="38100">
+            <a:solidFill>
+              <a:schemeClr val="tx1"/>
+            </a:solidFill>
+          </a:ln>
+        </p:spPr>
+        <p:style>
+          <a:lnRef idx="1">
+            <a:schemeClr val="dk1"/>
+          </a:lnRef>
+          <a:fillRef idx="0">
+            <a:schemeClr val="dk1"/>
+          </a:fillRef>
+          <a:effectRef idx="0">
+            <a:schemeClr val="dk1"/>
+          </a:effectRef>
+          <a:fontRef idx="minor">
+            <a:schemeClr val="tx1"/>
+          </a:fontRef>
+        </p:style>
+      </p:cxnSp>
+      <p:sp>
+        <p:nvSpPr>
+          <p:cNvPr id="79" name="Oval 78">
+            <a:extLst>
+              <a:ext uri="{FF2B5EF4-FFF2-40B4-BE49-F238E27FC236}">
+                <a16:creationId xmlns:a16="http://schemas.microsoft.com/office/drawing/2014/main" id="{FDA735F3-4218-2109-D8D2-152FFFA5F0B8}"/>
               </a:ext>
             </a:extLst>
           </p:cNvPr>
@@ -7634,8 +8709,109 @@
         </p:nvSpPr>
         <p:spPr>
           <a:xfrm>
-            <a:off x="1423509" y="2266443"/>
-            <a:ext cx="1679509" cy="1604863"/>
+            <a:off x="111618" y="3688639"/>
+            <a:ext cx="1464587" cy="445470"/>
+          </a:xfrm>
+          <a:prstGeom prst="ellipse">
+            <a:avLst/>
+          </a:prstGeom>
+          <a:solidFill>
+            <a:schemeClr val="bg1"/>
+          </a:solidFill>
+        </p:spPr>
+        <p:style>
+          <a:lnRef idx="2">
+            <a:schemeClr val="dk1">
+              <a:shade val="50000"/>
+            </a:schemeClr>
+          </a:lnRef>
+          <a:fillRef idx="1">
+            <a:schemeClr val="dk1"/>
+          </a:fillRef>
+          <a:effectRef idx="0">
+            <a:schemeClr val="dk1"/>
+          </a:effectRef>
+          <a:fontRef idx="minor">
+            <a:schemeClr val="lt1"/>
+          </a:fontRef>
+        </p:style>
+        <p:txBody>
+          <a:bodyPr rtlCol="0" anchor="ctr"/>
+          <a:lstStyle/>
+          <a:p>
+            <a:pPr algn="ctr"/>
+            <a:r>
+              <a:rPr lang="en-US" u="sng" dirty="0">
+                <a:solidFill>
+                  <a:schemeClr val="tx1"/>
+                </a:solidFill>
+              </a:rPr>
+              <a:t>sale_ID</a:t>
+            </a:r>
+          </a:p>
+        </p:txBody>
+      </p:sp>
+      <p:cxnSp>
+        <p:nvCxnSpPr>
+          <p:cNvPr id="80" name="Straight Connector 79">
+            <a:extLst>
+              <a:ext uri="{FF2B5EF4-FFF2-40B4-BE49-F238E27FC236}">
+                <a16:creationId xmlns:a16="http://schemas.microsoft.com/office/drawing/2014/main" id="{40B84FB2-A191-8785-C9C9-BA22D40FA71D}"/>
+              </a:ext>
+            </a:extLst>
+          </p:cNvPr>
+          <p:cNvCxnSpPr>
+            <a:cxnSpLocks/>
+            <a:stCxn id="79" idx="0"/>
+            <a:endCxn id="7" idx="1"/>
+          </p:cNvCxnSpPr>
+          <p:nvPr/>
+        </p:nvCxnSpPr>
+        <p:spPr>
+          <a:xfrm flipV="1">
+            <a:off x="843912" y="3043773"/>
+            <a:ext cx="194539" cy="644866"/>
+          </a:xfrm>
+          <a:prstGeom prst="line">
+            <a:avLst/>
+          </a:prstGeom>
+          <a:ln w="38100">
+            <a:solidFill>
+              <a:schemeClr val="tx1"/>
+            </a:solidFill>
+          </a:ln>
+        </p:spPr>
+        <p:style>
+          <a:lnRef idx="1">
+            <a:schemeClr val="dk1"/>
+          </a:lnRef>
+          <a:fillRef idx="0">
+            <a:schemeClr val="dk1"/>
+          </a:fillRef>
+          <a:effectRef idx="0">
+            <a:schemeClr val="dk1"/>
+          </a:effectRef>
+          <a:fontRef idx="minor">
+            <a:schemeClr val="tx1"/>
+          </a:fontRef>
+        </p:style>
+      </p:cxnSp>
+      <p:sp>
+        <p:nvSpPr>
+          <p:cNvPr id="27" name="Diamond 26">
+            <a:extLst>
+              <a:ext uri="{FF2B5EF4-FFF2-40B4-BE49-F238E27FC236}">
+                <a16:creationId xmlns:a16="http://schemas.microsoft.com/office/drawing/2014/main" id="{812E3166-9ACD-79F0-A384-FB1D6F168CD0}"/>
+              </a:ext>
+            </a:extLst>
+          </p:cNvPr>
+          <p:cNvSpPr/>
+          <p:nvPr/>
+        </p:nvSpPr>
+        <p:spPr>
+          <a:xfrm>
+            <a:off x="6096000" y="84457"/>
+            <a:ext cx="1590148" cy="1464906"/>
           </a:xfrm>
           <a:prstGeom prst="diamond">
             <a:avLst/>
@@ -7671,37 +8847,37 @@
           <a:p>
             <a:pPr algn="ctr"/>
             <a:r>
-              <a:rPr lang="en-US" sz="1050" dirty="0"/>
-              <a:t>Contains</a:t>
+              <a:rPr lang="en-US" sz="1000" dirty="0"/>
+              <a:t>Promotes</a:t>
             </a:r>
           </a:p>
         </p:txBody>
       </p:sp>
       <p:cxnSp>
         <p:nvCxnSpPr>
-          <p:cNvPr id="53" name="Straight Connector 52">
+          <p:cNvPr id="30" name="Straight Connector 29">
             <a:extLst>
               <a:ext uri="{FF2B5EF4-FFF2-40B4-BE49-F238E27FC236}">
-                <a16:creationId xmlns:a16="http://schemas.microsoft.com/office/drawing/2014/main" id="{D4013AB7-7F06-3512-96C3-486A4AF579CD}"/>
+                <a16:creationId xmlns:a16="http://schemas.microsoft.com/office/drawing/2014/main" id="{56AC74B0-93F7-42F2-1037-2828AE224797}"/>
               </a:ext>
             </a:extLst>
           </p:cNvPr>
           <p:cNvCxnSpPr>
             <a:cxnSpLocks/>
-            <a:stCxn id="52" idx="3"/>
-            <a:endCxn id="7" idx="1"/>
+            <a:stCxn id="6" idx="3"/>
+            <a:endCxn id="27" idx="1"/>
           </p:cNvCxnSpPr>
           <p:nvPr/>
         </p:nvCxnSpPr>
         <p:spPr>
           <a:xfrm>
-            <a:off x="3103018" y="3068875"/>
-            <a:ext cx="1443345" cy="2"/>
+            <a:off x="5314164" y="816910"/>
+            <a:ext cx="781836" cy="0"/>
           </a:xfrm>
           <a:prstGeom prst="line">
             <a:avLst/>
           </a:prstGeom>
-          <a:ln w="76200" cmpd="dbl">
+          <a:ln w="38100">
             <a:solidFill>
               <a:schemeClr val="tx1"/>
             </a:solidFill>
@@ -7724,29 +8900,29 @@
       </p:cxnSp>
       <p:cxnSp>
         <p:nvCxnSpPr>
-          <p:cNvPr id="56" name="Straight Connector 55">
+          <p:cNvPr id="34" name="Straight Connector 33">
             <a:extLst>
               <a:ext uri="{FF2B5EF4-FFF2-40B4-BE49-F238E27FC236}">
-                <a16:creationId xmlns:a16="http://schemas.microsoft.com/office/drawing/2014/main" id="{3A717CC6-B29C-AA83-19D7-844C952CEF61}"/>
+                <a16:creationId xmlns:a16="http://schemas.microsoft.com/office/drawing/2014/main" id="{DDA579C7-69C7-7243-2A32-0F8531FA559B}"/>
               </a:ext>
             </a:extLst>
           </p:cNvPr>
           <p:cNvCxnSpPr>
             <a:cxnSpLocks/>
-            <a:stCxn id="52" idx="0"/>
-            <a:endCxn id="6" idx="2"/>
+            <a:stCxn id="27" idx="3"/>
+            <a:endCxn id="5" idx="1"/>
           </p:cNvCxnSpPr>
           <p:nvPr/>
         </p:nvCxnSpPr>
         <p:spPr>
-          <a:xfrm flipV="1">
-            <a:off x="2263264" y="1488508"/>
-            <a:ext cx="543906" cy="777935"/>
+          <a:xfrm>
+            <a:off x="7686148" y="816910"/>
+            <a:ext cx="723717" cy="2198"/>
           </a:xfrm>
           <a:prstGeom prst="line">
             <a:avLst/>
           </a:prstGeom>
-          <a:ln w="38100">
+          <a:ln w="76200" cmpd="dbl">
             <a:solidFill>
               <a:schemeClr val="tx1"/>
             </a:solidFill>
@@ -7769,10 +8945,10 @@
       </p:cxnSp>
       <p:sp>
         <p:nvSpPr>
-          <p:cNvPr id="63" name="TextBox 62">
+          <p:cNvPr id="83" name="TextBox 82">
             <a:extLst>
               <a:ext uri="{FF2B5EF4-FFF2-40B4-BE49-F238E27FC236}">
-                <a16:creationId xmlns:a16="http://schemas.microsoft.com/office/drawing/2014/main" id="{23ACE72E-0088-53F4-76D3-D80533E80A42}"/>
+                <a16:creationId xmlns:a16="http://schemas.microsoft.com/office/drawing/2014/main" id="{7BA4B782-CD4D-04B5-BDC5-C48B0A870871}"/>
               </a:ext>
             </a:extLst>
           </p:cNvPr>
@@ -7781,8 +8957,8 @@
         </p:nvSpPr>
         <p:spPr>
           <a:xfrm>
-            <a:off x="2359281" y="2052261"/>
-            <a:ext cx="301686" cy="369332"/>
+            <a:off x="5546230" y="371095"/>
+            <a:ext cx="309700" cy="369332"/>
           </a:xfrm>
           <a:prstGeom prst="rect">
             <a:avLst/>
@@ -7797,262 +8973,17 @@
           <a:p>
             <a:r>
               <a:rPr lang="en-US" dirty="0"/>
-              <a:t>1</a:t>
+              <a:t>P</a:t>
             </a:r>
           </a:p>
         </p:txBody>
       </p:sp>
       <p:sp>
         <p:nvSpPr>
-          <p:cNvPr id="64" name="TextBox 63">
+          <p:cNvPr id="194" name="Oval 193">
             <a:extLst>
               <a:ext uri="{FF2B5EF4-FFF2-40B4-BE49-F238E27FC236}">
-                <a16:creationId xmlns:a16="http://schemas.microsoft.com/office/drawing/2014/main" id="{0EFF0AE9-1CD1-08EB-FA1B-E839B671F2C2}"/>
-              </a:ext>
-            </a:extLst>
-          </p:cNvPr>
-          <p:cNvSpPr txBox="1"/>
-          <p:nvPr/>
-        </p:nvSpPr>
-        <p:spPr>
-          <a:xfrm>
-            <a:off x="2977449" y="2576743"/>
-            <a:ext cx="296876" cy="369332"/>
-          </a:xfrm>
-          <a:prstGeom prst="rect">
-            <a:avLst/>
-          </a:prstGeom>
-          <a:noFill/>
-        </p:spPr>
-        <p:txBody>
-          <a:bodyPr wrap="none" rtlCol="0">
-            <a:spAutoFit/>
-          </a:bodyPr>
-          <a:lstStyle/>
-          <a:p>
-            <a:r>
-              <a:rPr lang="en-US" dirty="0"/>
-              <a:t>T</a:t>
-            </a:r>
-          </a:p>
-        </p:txBody>
-      </p:sp>
-      <p:sp>
-        <p:nvSpPr>
-          <p:cNvPr id="65" name="TextBox 64">
-            <a:extLst>
-              <a:ext uri="{FF2B5EF4-FFF2-40B4-BE49-F238E27FC236}">
-                <a16:creationId xmlns:a16="http://schemas.microsoft.com/office/drawing/2014/main" id="{5058B1ED-A00D-35A2-C6F2-D5198E33302E}"/>
-              </a:ext>
-            </a:extLst>
-          </p:cNvPr>
-          <p:cNvSpPr txBox="1"/>
-          <p:nvPr/>
-        </p:nvSpPr>
-        <p:spPr>
-          <a:xfrm>
-            <a:off x="4181016" y="4929962"/>
-            <a:ext cx="301686" cy="369332"/>
-          </a:xfrm>
-          <a:prstGeom prst="rect">
-            <a:avLst/>
-          </a:prstGeom>
-          <a:noFill/>
-        </p:spPr>
-        <p:txBody>
-          <a:bodyPr wrap="none" rtlCol="0">
-            <a:spAutoFit/>
-          </a:bodyPr>
-          <a:lstStyle/>
-          <a:p>
-            <a:r>
-              <a:rPr lang="en-US" dirty="0"/>
-              <a:t>1</a:t>
-            </a:r>
-          </a:p>
-        </p:txBody>
-      </p:sp>
-      <p:sp>
-        <p:nvSpPr>
-          <p:cNvPr id="66" name="TextBox 65">
-            <a:extLst>
-              <a:ext uri="{FF2B5EF4-FFF2-40B4-BE49-F238E27FC236}">
-                <a16:creationId xmlns:a16="http://schemas.microsoft.com/office/drawing/2014/main" id="{2991169A-2EC3-3FB8-1025-73578FC01990}"/>
-              </a:ext>
-            </a:extLst>
-          </p:cNvPr>
-          <p:cNvSpPr txBox="1"/>
-          <p:nvPr/>
-        </p:nvSpPr>
-        <p:spPr>
-          <a:xfrm>
-            <a:off x="4953352" y="4197509"/>
-            <a:ext cx="333746" cy="369332"/>
-          </a:xfrm>
-          <a:prstGeom prst="rect">
-            <a:avLst/>
-          </a:prstGeom>
-          <a:noFill/>
-        </p:spPr>
-        <p:txBody>
-          <a:bodyPr wrap="none" rtlCol="0">
-            <a:spAutoFit/>
-          </a:bodyPr>
-          <a:lstStyle/>
-          <a:p>
-            <a:r>
-              <a:rPr lang="en-US" dirty="0"/>
-              <a:t>N</a:t>
-            </a:r>
-          </a:p>
-        </p:txBody>
-      </p:sp>
-      <p:sp>
-        <p:nvSpPr>
-          <p:cNvPr id="67" name="TextBox 66">
-            <a:extLst>
-              <a:ext uri="{FF2B5EF4-FFF2-40B4-BE49-F238E27FC236}">
-                <a16:creationId xmlns:a16="http://schemas.microsoft.com/office/drawing/2014/main" id="{3FB5F393-7A20-FD6A-86C5-E109820FAF6B}"/>
-              </a:ext>
-            </a:extLst>
-          </p:cNvPr>
-          <p:cNvSpPr txBox="1"/>
-          <p:nvPr/>
-        </p:nvSpPr>
-        <p:spPr>
-          <a:xfrm>
-            <a:off x="7219547" y="2674441"/>
-            <a:ext cx="381836" cy="369332"/>
-          </a:xfrm>
-          <a:prstGeom prst="rect">
-            <a:avLst/>
-          </a:prstGeom>
-          <a:noFill/>
-        </p:spPr>
-        <p:txBody>
-          <a:bodyPr wrap="none" rtlCol="0">
-            <a:spAutoFit/>
-          </a:bodyPr>
-          <a:lstStyle/>
-          <a:p>
-            <a:r>
-              <a:rPr lang="en-US" dirty="0"/>
-              <a:t>M</a:t>
-            </a:r>
-          </a:p>
-        </p:txBody>
-      </p:sp>
-      <p:sp>
-        <p:nvSpPr>
-          <p:cNvPr id="68" name="TextBox 67">
-            <a:extLst>
-              <a:ext uri="{FF2B5EF4-FFF2-40B4-BE49-F238E27FC236}">
-                <a16:creationId xmlns:a16="http://schemas.microsoft.com/office/drawing/2014/main" id="{420E703E-DD8E-BE8C-132A-865E496BEB02}"/>
-              </a:ext>
-            </a:extLst>
-          </p:cNvPr>
-          <p:cNvSpPr txBox="1"/>
-          <p:nvPr/>
-        </p:nvSpPr>
-        <p:spPr>
-          <a:xfrm>
-            <a:off x="8071938" y="3784972"/>
-            <a:ext cx="301686" cy="369332"/>
-          </a:xfrm>
-          <a:prstGeom prst="rect">
-            <a:avLst/>
-          </a:prstGeom>
-          <a:noFill/>
-        </p:spPr>
-        <p:txBody>
-          <a:bodyPr wrap="none" rtlCol="0">
-            <a:spAutoFit/>
-          </a:bodyPr>
-          <a:lstStyle/>
-          <a:p>
-            <a:r>
-              <a:rPr lang="en-US" dirty="0"/>
-              <a:t>1</a:t>
-            </a:r>
-          </a:p>
-        </p:txBody>
-      </p:sp>
-      <p:sp>
-        <p:nvSpPr>
-          <p:cNvPr id="73" name="TextBox 72">
-            <a:extLst>
-              <a:ext uri="{FF2B5EF4-FFF2-40B4-BE49-F238E27FC236}">
-                <a16:creationId xmlns:a16="http://schemas.microsoft.com/office/drawing/2014/main" id="{9D8409D6-2294-DD3D-75B4-94F7278D20E9}"/>
-              </a:ext>
-            </a:extLst>
-          </p:cNvPr>
-          <p:cNvSpPr txBox="1"/>
-          <p:nvPr/>
-        </p:nvSpPr>
-        <p:spPr>
-          <a:xfrm>
-            <a:off x="10931155" y="3842963"/>
-            <a:ext cx="336952" cy="369332"/>
-          </a:xfrm>
-          <a:prstGeom prst="rect">
-            <a:avLst/>
-          </a:prstGeom>
-          <a:noFill/>
-        </p:spPr>
-        <p:txBody>
-          <a:bodyPr wrap="none" rtlCol="0">
-            <a:spAutoFit/>
-          </a:bodyPr>
-          <a:lstStyle/>
-          <a:p>
-            <a:r>
-              <a:rPr lang="en-US" dirty="0"/>
-              <a:t>O</a:t>
-            </a:r>
-          </a:p>
-        </p:txBody>
-      </p:sp>
-      <p:sp>
-        <p:nvSpPr>
-          <p:cNvPr id="74" name="TextBox 73">
-            <a:extLst>
-              <a:ext uri="{FF2B5EF4-FFF2-40B4-BE49-F238E27FC236}">
-                <a16:creationId xmlns:a16="http://schemas.microsoft.com/office/drawing/2014/main" id="{108E75A3-0A91-E053-0661-2E0FCE69AF93}"/>
-              </a:ext>
-            </a:extLst>
-          </p:cNvPr>
-          <p:cNvSpPr txBox="1"/>
-          <p:nvPr/>
-        </p:nvSpPr>
-        <p:spPr>
-          <a:xfrm>
-            <a:off x="11022114" y="2081777"/>
-            <a:ext cx="303288" cy="369332"/>
-          </a:xfrm>
-          <a:prstGeom prst="rect">
-            <a:avLst/>
-          </a:prstGeom>
-          <a:noFill/>
-        </p:spPr>
-        <p:txBody>
-          <a:bodyPr wrap="none" rtlCol="0">
-            <a:spAutoFit/>
-          </a:bodyPr>
-          <a:lstStyle/>
-          <a:p>
-            <a:r>
-              <a:rPr lang="en-US" dirty="0"/>
-              <a:t>P</a:t>
-            </a:r>
-          </a:p>
-        </p:txBody>
-      </p:sp>
-      <p:sp>
-        <p:nvSpPr>
-          <p:cNvPr id="9" name="Oval 8">
-            <a:extLst>
-              <a:ext uri="{FF2B5EF4-FFF2-40B4-BE49-F238E27FC236}">
-                <a16:creationId xmlns:a16="http://schemas.microsoft.com/office/drawing/2014/main" id="{50C2FC4D-2AEB-28A5-225D-5C71EC72E750}"/>
+                <a16:creationId xmlns:a16="http://schemas.microsoft.com/office/drawing/2014/main" id="{09685404-D215-D3A0-FA4E-3F2AA108597D}"/>
               </a:ext>
             </a:extLst>
           </p:cNvPr>
@@ -8061,8 +8992,8 @@
         </p:nvSpPr>
         <p:spPr>
           <a:xfrm>
-            <a:off x="5866998" y="1903908"/>
-            <a:ext cx="2198946" cy="555227"/>
+            <a:off x="5855930" y="3838206"/>
+            <a:ext cx="1529183" cy="507903"/>
           </a:xfrm>
           <a:prstGeom prst="ellipse">
             <a:avLst/>
@@ -8098,320 +9029,17 @@
                   <a:schemeClr val="tx1"/>
                 </a:solidFill>
               </a:rPr>
-              <a:t>promotion_ID</a:t>
+              <a:t>store_ID</a:t>
             </a:r>
           </a:p>
         </p:txBody>
       </p:sp>
-      <p:sp>
-        <p:nvSpPr>
-          <p:cNvPr id="10" name="Oval 9">
+      <p:grpSp>
+        <p:nvGrpSpPr>
+          <p:cNvPr id="195" name="Group 194">
             <a:extLst>
               <a:ext uri="{FF2B5EF4-FFF2-40B4-BE49-F238E27FC236}">
-                <a16:creationId xmlns:a16="http://schemas.microsoft.com/office/drawing/2014/main" id="{7EF13DAD-4C51-EBBE-E7A6-285D4481DE7B}"/>
-              </a:ext>
-            </a:extLst>
-          </p:cNvPr>
-          <p:cNvSpPr/>
-          <p:nvPr/>
-        </p:nvSpPr>
-        <p:spPr>
-          <a:xfrm>
-            <a:off x="6645873" y="5921542"/>
-            <a:ext cx="1529183" cy="507903"/>
-          </a:xfrm>
-          <a:prstGeom prst="ellipse">
-            <a:avLst/>
-          </a:prstGeom>
-          <a:solidFill>
-            <a:schemeClr val="bg1"/>
-          </a:solidFill>
-        </p:spPr>
-        <p:style>
-          <a:lnRef idx="2">
-            <a:schemeClr val="dk1">
-              <a:shade val="50000"/>
-            </a:schemeClr>
-          </a:lnRef>
-          <a:fillRef idx="1">
-            <a:schemeClr val="dk1"/>
-          </a:fillRef>
-          <a:effectRef idx="0">
-            <a:schemeClr val="dk1"/>
-          </a:effectRef>
-          <a:fontRef idx="minor">
-            <a:schemeClr val="lt1"/>
-          </a:fontRef>
-        </p:style>
-        <p:txBody>
-          <a:bodyPr rtlCol="0" anchor="ctr"/>
-          <a:lstStyle/>
-          <a:p>
-            <a:pPr algn="ctr"/>
-            <a:r>
-              <a:rPr lang="en-US" u="sng" dirty="0">
-                <a:solidFill>
-                  <a:schemeClr val="tx1"/>
-                </a:solidFill>
-              </a:rPr>
-              <a:t>store_ID</a:t>
-            </a:r>
-          </a:p>
-        </p:txBody>
-      </p:sp>
-      <p:sp>
-        <p:nvSpPr>
-          <p:cNvPr id="15" name="Oval 14">
-            <a:extLst>
-              <a:ext uri="{FF2B5EF4-FFF2-40B4-BE49-F238E27FC236}">
-                <a16:creationId xmlns:a16="http://schemas.microsoft.com/office/drawing/2014/main" id="{D9276FFC-6D66-3754-9235-4F5C6C65E24F}"/>
-              </a:ext>
-            </a:extLst>
-          </p:cNvPr>
-          <p:cNvSpPr/>
-          <p:nvPr/>
-        </p:nvSpPr>
-        <p:spPr>
-          <a:xfrm>
-            <a:off x="17037" y="844762"/>
-            <a:ext cx="1628725" cy="479844"/>
-          </a:xfrm>
-          <a:prstGeom prst="ellipse">
-            <a:avLst/>
-          </a:prstGeom>
-          <a:solidFill>
-            <a:schemeClr val="bg1"/>
-          </a:solidFill>
-        </p:spPr>
-        <p:style>
-          <a:lnRef idx="2">
-            <a:schemeClr val="dk1">
-              <a:shade val="50000"/>
-            </a:schemeClr>
-          </a:lnRef>
-          <a:fillRef idx="1">
-            <a:schemeClr val="dk1"/>
-          </a:fillRef>
-          <a:effectRef idx="0">
-            <a:schemeClr val="dk1"/>
-          </a:effectRef>
-          <a:fontRef idx="minor">
-            <a:schemeClr val="lt1"/>
-          </a:fontRef>
-        </p:style>
-        <p:txBody>
-          <a:bodyPr rtlCol="0" anchor="ctr"/>
-          <a:lstStyle/>
-          <a:p>
-            <a:pPr algn="ctr"/>
-            <a:r>
-              <a:rPr lang="en-US" u="sng" dirty="0">
-                <a:solidFill>
-                  <a:schemeClr val="tx1"/>
-                </a:solidFill>
-              </a:rPr>
-              <a:t>coffee_ID</a:t>
-            </a:r>
-          </a:p>
-        </p:txBody>
-      </p:sp>
-      <p:sp>
-        <p:nvSpPr>
-          <p:cNvPr id="16" name="Oval 15">
-            <a:extLst>
-              <a:ext uri="{FF2B5EF4-FFF2-40B4-BE49-F238E27FC236}">
-                <a16:creationId xmlns:a16="http://schemas.microsoft.com/office/drawing/2014/main" id="{098D29A4-D1BA-5297-E222-79FE349EE517}"/>
-              </a:ext>
-            </a:extLst>
-          </p:cNvPr>
-          <p:cNvSpPr/>
-          <p:nvPr/>
-        </p:nvSpPr>
-        <p:spPr>
-          <a:xfrm>
-            <a:off x="1279915" y="4112361"/>
-            <a:ext cx="2040670" cy="453291"/>
-          </a:xfrm>
-          <a:prstGeom prst="ellipse">
-            <a:avLst/>
-          </a:prstGeom>
-          <a:solidFill>
-            <a:schemeClr val="bg1"/>
-          </a:solidFill>
-        </p:spPr>
-        <p:style>
-          <a:lnRef idx="2">
-            <a:schemeClr val="dk1">
-              <a:shade val="50000"/>
-            </a:schemeClr>
-          </a:lnRef>
-          <a:fillRef idx="1">
-            <a:schemeClr val="dk1"/>
-          </a:fillRef>
-          <a:effectRef idx="0">
-            <a:schemeClr val="dk1"/>
-          </a:effectRef>
-          <a:fontRef idx="minor">
-            <a:schemeClr val="lt1"/>
-          </a:fontRef>
-        </p:style>
-        <p:txBody>
-          <a:bodyPr rtlCol="0" anchor="ctr"/>
-          <a:lstStyle/>
-          <a:p>
-            <a:pPr algn="ctr"/>
-            <a:r>
-              <a:rPr lang="en-US" u="sng" dirty="0">
-                <a:solidFill>
-                  <a:schemeClr val="tx1"/>
-                </a:solidFill>
-              </a:rPr>
-              <a:t>customer_ID</a:t>
-            </a:r>
-          </a:p>
-        </p:txBody>
-      </p:sp>
-      <p:cxnSp>
-        <p:nvCxnSpPr>
-          <p:cNvPr id="17" name="Straight Connector 16">
-            <a:extLst>
-              <a:ext uri="{FF2B5EF4-FFF2-40B4-BE49-F238E27FC236}">
-                <a16:creationId xmlns:a16="http://schemas.microsoft.com/office/drawing/2014/main" id="{2908FEA3-3F65-7118-477F-FCEC86E40A39}"/>
-              </a:ext>
-            </a:extLst>
-          </p:cNvPr>
-          <p:cNvCxnSpPr>
-            <a:cxnSpLocks/>
-            <a:stCxn id="16" idx="4"/>
-            <a:endCxn id="8" idx="0"/>
-          </p:cNvCxnSpPr>
-          <p:nvPr/>
-        </p:nvCxnSpPr>
-        <p:spPr>
-          <a:xfrm flipH="1">
-            <a:off x="2295420" y="4565652"/>
-            <a:ext cx="4830" cy="209561"/>
-          </a:xfrm>
-          <a:prstGeom prst="line">
-            <a:avLst/>
-          </a:prstGeom>
-          <a:ln w="38100">
-            <a:solidFill>
-              <a:schemeClr val="tx1"/>
-            </a:solidFill>
-          </a:ln>
-        </p:spPr>
-        <p:style>
-          <a:lnRef idx="1">
-            <a:schemeClr val="dk1"/>
-          </a:lnRef>
-          <a:fillRef idx="0">
-            <a:schemeClr val="dk1"/>
-          </a:fillRef>
-          <a:effectRef idx="0">
-            <a:schemeClr val="dk1"/>
-          </a:effectRef>
-          <a:fontRef idx="minor">
-            <a:schemeClr val="tx1"/>
-          </a:fontRef>
-        </p:style>
-      </p:cxnSp>
-      <p:cxnSp>
-        <p:nvCxnSpPr>
-          <p:cNvPr id="23" name="Straight Connector 22">
-            <a:extLst>
-              <a:ext uri="{FF2B5EF4-FFF2-40B4-BE49-F238E27FC236}">
-                <a16:creationId xmlns:a16="http://schemas.microsoft.com/office/drawing/2014/main" id="{64285A40-F14E-4ABF-6413-52C56A46E9D6}"/>
-              </a:ext>
-            </a:extLst>
-          </p:cNvPr>
-          <p:cNvCxnSpPr>
-            <a:cxnSpLocks/>
-            <a:stCxn id="6" idx="1"/>
-            <a:endCxn id="15" idx="6"/>
-          </p:cNvCxnSpPr>
-          <p:nvPr/>
-        </p:nvCxnSpPr>
-        <p:spPr>
-          <a:xfrm flipH="1">
-            <a:off x="1645762" y="1068967"/>
-            <a:ext cx="145537" cy="15717"/>
-          </a:xfrm>
-          <a:prstGeom prst="line">
-            <a:avLst/>
-          </a:prstGeom>
-          <a:ln w="38100">
-            <a:solidFill>
-              <a:schemeClr val="tx1"/>
-            </a:solidFill>
-          </a:ln>
-        </p:spPr>
-        <p:style>
-          <a:lnRef idx="1">
-            <a:schemeClr val="dk1"/>
-          </a:lnRef>
-          <a:fillRef idx="0">
-            <a:schemeClr val="dk1"/>
-          </a:fillRef>
-          <a:effectRef idx="0">
-            <a:schemeClr val="dk1"/>
-          </a:effectRef>
-          <a:fontRef idx="minor">
-            <a:schemeClr val="tx1"/>
-          </a:fontRef>
-        </p:style>
-      </p:cxnSp>
-      <p:cxnSp>
-        <p:nvCxnSpPr>
-          <p:cNvPr id="29" name="Straight Connector 28">
-            <a:extLst>
-              <a:ext uri="{FF2B5EF4-FFF2-40B4-BE49-F238E27FC236}">
-                <a16:creationId xmlns:a16="http://schemas.microsoft.com/office/drawing/2014/main" id="{96E51764-604E-BA68-17AB-C96E314151A0}"/>
-              </a:ext>
-            </a:extLst>
-          </p:cNvPr>
-          <p:cNvCxnSpPr>
-            <a:cxnSpLocks/>
-            <a:stCxn id="5" idx="2"/>
-            <a:endCxn id="9" idx="7"/>
-          </p:cNvCxnSpPr>
-          <p:nvPr/>
-        </p:nvCxnSpPr>
-        <p:spPr>
-          <a:xfrm flipH="1">
-            <a:off x="7743916" y="1620912"/>
-            <a:ext cx="595884" cy="364307"/>
-          </a:xfrm>
-          <a:prstGeom prst="line">
-            <a:avLst/>
-          </a:prstGeom>
-          <a:ln w="38100">
-            <a:solidFill>
-              <a:schemeClr val="tx1"/>
-            </a:solidFill>
-          </a:ln>
-        </p:spPr>
-        <p:style>
-          <a:lnRef idx="1">
-            <a:schemeClr val="dk1"/>
-          </a:lnRef>
-          <a:fillRef idx="0">
-            <a:schemeClr val="dk1"/>
-          </a:fillRef>
-          <a:effectRef idx="0">
-            <a:schemeClr val="dk1"/>
-          </a:effectRef>
-          <a:fontRef idx="minor">
-            <a:schemeClr val="tx1"/>
-          </a:fontRef>
-        </p:style>
-      </p:cxnSp>
-      <p:grpSp>
-        <p:nvGrpSpPr>
-          <p:cNvPr id="44" name="Group 43">
-            <a:extLst>
-              <a:ext uri="{FF2B5EF4-FFF2-40B4-BE49-F238E27FC236}">
-                <a16:creationId xmlns:a16="http://schemas.microsoft.com/office/drawing/2014/main" id="{58DE1047-8AD8-ADFD-A03F-F110E4A7B4F3}"/>
+                <a16:creationId xmlns:a16="http://schemas.microsoft.com/office/drawing/2014/main" id="{50E2324A-C040-F4E1-FDD1-54D5FF9745C1}"/>
               </a:ext>
             </a:extLst>
           </p:cNvPr>
@@ -8420,7 +9048,7 @@
         </p:nvGrpSpPr>
         <p:grpSpPr>
           <a:xfrm>
-            <a:off x="8524473" y="5921541"/>
+            <a:off x="7734530" y="3838205"/>
             <a:ext cx="1587367" cy="507903"/>
             <a:chOff x="9543722" y="5803912"/>
             <a:chExt cx="1474713" cy="468634"/>
@@ -8428,10 +9056,10 @@
         </p:grpSpPr>
         <p:sp>
           <p:nvSpPr>
-            <p:cNvPr id="13" name="Oval 12">
+            <p:cNvPr id="196" name="Oval 195">
               <a:extLst>
                 <a:ext uri="{FF2B5EF4-FFF2-40B4-BE49-F238E27FC236}">
-                  <a16:creationId xmlns:a16="http://schemas.microsoft.com/office/drawing/2014/main" id="{4ADF8EB0-943B-FAEB-0C78-642D6526AA4F}"/>
+                  <a16:creationId xmlns:a16="http://schemas.microsoft.com/office/drawing/2014/main" id="{DF2AAE49-9880-2379-EE9E-130E78031E61}"/>
                 </a:ext>
               </a:extLst>
             </p:cNvPr>
@@ -8484,10 +9112,10 @@
         </p:sp>
         <p:cxnSp>
           <p:nvCxnSpPr>
-            <p:cNvPr id="42" name="Straight Connector 41">
+            <p:cNvPr id="197" name="Straight Connector 196">
               <a:extLst>
                 <a:ext uri="{FF2B5EF4-FFF2-40B4-BE49-F238E27FC236}">
-                  <a16:creationId xmlns:a16="http://schemas.microsoft.com/office/drawing/2014/main" id="{07B766FF-97DF-659F-388C-54001E71BC66}"/>
+                  <a16:creationId xmlns:a16="http://schemas.microsoft.com/office/drawing/2014/main" id="{8490BB7B-BF92-DB60-4B54-48274502C908}"/>
                 </a:ext>
               </a:extLst>
             </p:cNvPr>
@@ -8519,350 +9147,12 @@
           </p:style>
         </p:cxnSp>
       </p:grpSp>
-      <p:cxnSp>
-        <p:nvCxnSpPr>
-          <p:cNvPr id="45" name="Straight Connector 44">
+      <p:sp>
+        <p:nvSpPr>
+          <p:cNvPr id="214" name="TextBox 213">
             <a:extLst>
               <a:ext uri="{FF2B5EF4-FFF2-40B4-BE49-F238E27FC236}">
-                <a16:creationId xmlns:a16="http://schemas.microsoft.com/office/drawing/2014/main" id="{44DB48E6-BEFA-8353-32B8-4C8A2A71CE99}"/>
-              </a:ext>
-            </a:extLst>
-          </p:cNvPr>
-          <p:cNvCxnSpPr>
-            <a:cxnSpLocks/>
-            <a:stCxn id="4" idx="2"/>
-            <a:endCxn id="10" idx="7"/>
-          </p:cNvCxnSpPr>
-          <p:nvPr/>
-        </p:nvCxnSpPr>
-        <p:spPr>
-          <a:xfrm flipH="1">
-            <a:off x="7951112" y="5663124"/>
-            <a:ext cx="435149" cy="332799"/>
-          </a:xfrm>
-          <a:prstGeom prst="line">
-            <a:avLst/>
-          </a:prstGeom>
-          <a:ln w="38100">
-            <a:solidFill>
-              <a:schemeClr val="tx1"/>
-            </a:solidFill>
-          </a:ln>
-        </p:spPr>
-        <p:style>
-          <a:lnRef idx="1">
-            <a:schemeClr val="dk1"/>
-          </a:lnRef>
-          <a:fillRef idx="0">
-            <a:schemeClr val="dk1"/>
-          </a:fillRef>
-          <a:effectRef idx="0">
-            <a:schemeClr val="dk1"/>
-          </a:effectRef>
-          <a:fontRef idx="minor">
-            <a:schemeClr val="tx1"/>
-          </a:fontRef>
-        </p:style>
-      </p:cxnSp>
-      <p:cxnSp>
-        <p:nvCxnSpPr>
-          <p:cNvPr id="49" name="Straight Connector 48">
-            <a:extLst>
-              <a:ext uri="{FF2B5EF4-FFF2-40B4-BE49-F238E27FC236}">
-                <a16:creationId xmlns:a16="http://schemas.microsoft.com/office/drawing/2014/main" id="{3A69E441-5885-1B5B-1A4D-62ABCD69D6CD}"/>
-              </a:ext>
-            </a:extLst>
-          </p:cNvPr>
-          <p:cNvCxnSpPr>
-            <a:cxnSpLocks/>
-            <a:stCxn id="4" idx="2"/>
-            <a:endCxn id="13" idx="1"/>
-          </p:cNvCxnSpPr>
-          <p:nvPr/>
-        </p:nvCxnSpPr>
-        <p:spPr>
-          <a:xfrm>
-            <a:off x="8386261" y="5663124"/>
-            <a:ext cx="370677" cy="332798"/>
-          </a:xfrm>
-          <a:prstGeom prst="line">
-            <a:avLst/>
-          </a:prstGeom>
-          <a:ln w="38100">
-            <a:solidFill>
-              <a:schemeClr val="tx1"/>
-            </a:solidFill>
-          </a:ln>
-        </p:spPr>
-        <p:style>
-          <a:lnRef idx="1">
-            <a:schemeClr val="dk1"/>
-          </a:lnRef>
-          <a:fillRef idx="0">
-            <a:schemeClr val="dk1"/>
-          </a:fillRef>
-          <a:effectRef idx="0">
-            <a:schemeClr val="dk1"/>
-          </a:effectRef>
-          <a:fontRef idx="minor">
-            <a:schemeClr val="tx1"/>
-          </a:fontRef>
-        </p:style>
-      </p:cxnSp>
-      <p:sp>
-        <p:nvSpPr>
-          <p:cNvPr id="79" name="Oval 78">
-            <a:extLst>
-              <a:ext uri="{FF2B5EF4-FFF2-40B4-BE49-F238E27FC236}">
-                <a16:creationId xmlns:a16="http://schemas.microsoft.com/office/drawing/2014/main" id="{FDA735F3-4218-2109-D8D2-152FFFA5F0B8}"/>
-              </a:ext>
-            </a:extLst>
-          </p:cNvPr>
-          <p:cNvSpPr/>
-          <p:nvPr/>
-        </p:nvSpPr>
-        <p:spPr>
-          <a:xfrm>
-            <a:off x="3387816" y="1940245"/>
-            <a:ext cx="1464587" cy="445470"/>
-          </a:xfrm>
-          <a:prstGeom prst="ellipse">
-            <a:avLst/>
-          </a:prstGeom>
-          <a:solidFill>
-            <a:schemeClr val="bg1"/>
-          </a:solidFill>
-        </p:spPr>
-        <p:style>
-          <a:lnRef idx="2">
-            <a:schemeClr val="dk1">
-              <a:shade val="50000"/>
-            </a:schemeClr>
-          </a:lnRef>
-          <a:fillRef idx="1">
-            <a:schemeClr val="dk1"/>
-          </a:fillRef>
-          <a:effectRef idx="0">
-            <a:schemeClr val="dk1"/>
-          </a:effectRef>
-          <a:fontRef idx="minor">
-            <a:schemeClr val="lt1"/>
-          </a:fontRef>
-        </p:style>
-        <p:txBody>
-          <a:bodyPr rtlCol="0" anchor="ctr"/>
-          <a:lstStyle/>
-          <a:p>
-            <a:pPr algn="ctr"/>
-            <a:r>
-              <a:rPr lang="en-US" u="sng" dirty="0">
-                <a:solidFill>
-                  <a:schemeClr val="tx1"/>
-                </a:solidFill>
-              </a:rPr>
-              <a:t>sale_ID</a:t>
-            </a:r>
-          </a:p>
-        </p:txBody>
-      </p:sp>
-      <p:cxnSp>
-        <p:nvCxnSpPr>
-          <p:cNvPr id="80" name="Straight Connector 79">
-            <a:extLst>
-              <a:ext uri="{FF2B5EF4-FFF2-40B4-BE49-F238E27FC236}">
-                <a16:creationId xmlns:a16="http://schemas.microsoft.com/office/drawing/2014/main" id="{40B84FB2-A191-8785-C9C9-BA22D40FA71D}"/>
-              </a:ext>
-            </a:extLst>
-          </p:cNvPr>
-          <p:cNvCxnSpPr>
-            <a:cxnSpLocks/>
-            <a:stCxn id="7" idx="0"/>
-            <a:endCxn id="79" idx="5"/>
-          </p:cNvCxnSpPr>
-          <p:nvPr/>
-        </p:nvCxnSpPr>
-        <p:spPr>
-          <a:xfrm flipH="1" flipV="1">
-            <a:off x="4637919" y="2320477"/>
-            <a:ext cx="645801" cy="328859"/>
-          </a:xfrm>
-          <a:prstGeom prst="line">
-            <a:avLst/>
-          </a:prstGeom>
-          <a:ln w="38100">
-            <a:solidFill>
-              <a:schemeClr val="tx1"/>
-            </a:solidFill>
-          </a:ln>
-        </p:spPr>
-        <p:style>
-          <a:lnRef idx="1">
-            <a:schemeClr val="dk1"/>
-          </a:lnRef>
-          <a:fillRef idx="0">
-            <a:schemeClr val="dk1"/>
-          </a:fillRef>
-          <a:effectRef idx="0">
-            <a:schemeClr val="dk1"/>
-          </a:effectRef>
-          <a:fontRef idx="minor">
-            <a:schemeClr val="tx1"/>
-          </a:fontRef>
-        </p:style>
-      </p:cxnSp>
-      <p:sp>
-        <p:nvSpPr>
-          <p:cNvPr id="27" name="Diamond 26">
-            <a:extLst>
-              <a:ext uri="{FF2B5EF4-FFF2-40B4-BE49-F238E27FC236}">
-                <a16:creationId xmlns:a16="http://schemas.microsoft.com/office/drawing/2014/main" id="{812E3166-9ACD-79F0-A384-FB1D6F168CD0}"/>
-              </a:ext>
-            </a:extLst>
-          </p:cNvPr>
-          <p:cNvSpPr/>
-          <p:nvPr/>
-        </p:nvSpPr>
-        <p:spPr>
-          <a:xfrm>
-            <a:off x="4363680" y="343902"/>
-            <a:ext cx="1590148" cy="1464906"/>
-          </a:xfrm>
-          <a:prstGeom prst="diamond">
-            <a:avLst/>
-          </a:prstGeom>
-          <a:solidFill>
-            <a:schemeClr val="accent2"/>
-          </a:solidFill>
-          <a:ln w="38100">
-            <a:solidFill>
-              <a:schemeClr val="tx1"/>
-            </a:solidFill>
-          </a:ln>
-        </p:spPr>
-        <p:style>
-          <a:lnRef idx="2">
-            <a:schemeClr val="accent1">
-              <a:shade val="50000"/>
-            </a:schemeClr>
-          </a:lnRef>
-          <a:fillRef idx="1">
-            <a:schemeClr val="accent1"/>
-          </a:fillRef>
-          <a:effectRef idx="0">
-            <a:schemeClr val="accent1"/>
-          </a:effectRef>
-          <a:fontRef idx="minor">
-            <a:schemeClr val="lt1"/>
-          </a:fontRef>
-        </p:style>
-        <p:txBody>
-          <a:bodyPr rtlCol="0" anchor="ctr"/>
-          <a:lstStyle/>
-          <a:p>
-            <a:pPr algn="ctr"/>
-            <a:r>
-              <a:rPr lang="en-US" sz="1000" dirty="0"/>
-              <a:t>Promotes</a:t>
-            </a:r>
-          </a:p>
-        </p:txBody>
-      </p:sp>
-      <p:cxnSp>
-        <p:nvCxnSpPr>
-          <p:cNvPr id="30" name="Straight Connector 29">
-            <a:extLst>
-              <a:ext uri="{FF2B5EF4-FFF2-40B4-BE49-F238E27FC236}">
-                <a16:creationId xmlns:a16="http://schemas.microsoft.com/office/drawing/2014/main" id="{56AC74B0-93F7-42F2-1037-2828AE224797}"/>
-              </a:ext>
-            </a:extLst>
-          </p:cNvPr>
-          <p:cNvCxnSpPr>
-            <a:cxnSpLocks/>
-            <a:stCxn id="6" idx="3"/>
-            <a:endCxn id="27" idx="1"/>
-          </p:cNvCxnSpPr>
-          <p:nvPr/>
-        </p:nvCxnSpPr>
-        <p:spPr>
-          <a:xfrm>
-            <a:off x="3823040" y="1068967"/>
-            <a:ext cx="540640" cy="7388"/>
-          </a:xfrm>
-          <a:prstGeom prst="line">
-            <a:avLst/>
-          </a:prstGeom>
-          <a:ln w="38100">
-            <a:solidFill>
-              <a:schemeClr val="tx1"/>
-            </a:solidFill>
-          </a:ln>
-        </p:spPr>
-        <p:style>
-          <a:lnRef idx="1">
-            <a:schemeClr val="dk1"/>
-          </a:lnRef>
-          <a:fillRef idx="0">
-            <a:schemeClr val="dk1"/>
-          </a:fillRef>
-          <a:effectRef idx="0">
-            <a:schemeClr val="dk1"/>
-          </a:effectRef>
-          <a:fontRef idx="minor">
-            <a:schemeClr val="tx1"/>
-          </a:fontRef>
-        </p:style>
-      </p:cxnSp>
-      <p:cxnSp>
-        <p:nvCxnSpPr>
-          <p:cNvPr id="34" name="Straight Connector 33">
-            <a:extLst>
-              <a:ext uri="{FF2B5EF4-FFF2-40B4-BE49-F238E27FC236}">
-                <a16:creationId xmlns:a16="http://schemas.microsoft.com/office/drawing/2014/main" id="{DDA579C7-69C7-7243-2A32-0F8531FA559B}"/>
-              </a:ext>
-            </a:extLst>
-          </p:cNvPr>
-          <p:cNvCxnSpPr>
-            <a:cxnSpLocks/>
-            <a:stCxn id="27" idx="3"/>
-            <a:endCxn id="5" idx="1"/>
-          </p:cNvCxnSpPr>
-          <p:nvPr/>
-        </p:nvCxnSpPr>
-        <p:spPr>
-          <a:xfrm>
-            <a:off x="5953828" y="1076355"/>
-            <a:ext cx="692045" cy="30208"/>
-          </a:xfrm>
-          <a:prstGeom prst="line">
-            <a:avLst/>
-          </a:prstGeom>
-          <a:ln w="38100">
-            <a:solidFill>
-              <a:schemeClr val="tx1"/>
-            </a:solidFill>
-          </a:ln>
-        </p:spPr>
-        <p:style>
-          <a:lnRef idx="1">
-            <a:schemeClr val="dk1"/>
-          </a:lnRef>
-          <a:fillRef idx="0">
-            <a:schemeClr val="dk1"/>
-          </a:fillRef>
-          <a:effectRef idx="0">
-            <a:schemeClr val="dk1"/>
-          </a:effectRef>
-          <a:fontRef idx="minor">
-            <a:schemeClr val="tx1"/>
-          </a:fontRef>
-        </p:style>
-      </p:cxnSp>
-      <p:sp>
-        <p:nvSpPr>
-          <p:cNvPr id="83" name="TextBox 82">
-            <a:extLst>
-              <a:ext uri="{FF2B5EF4-FFF2-40B4-BE49-F238E27FC236}">
-                <a16:creationId xmlns:a16="http://schemas.microsoft.com/office/drawing/2014/main" id="{7BA4B782-CD4D-04B5-BDC5-C48B0A870871}"/>
+                <a16:creationId xmlns:a16="http://schemas.microsoft.com/office/drawing/2014/main" id="{9FA50EBD-1973-1E31-89F6-937A9E84EC43}"/>
               </a:ext>
             </a:extLst>
           </p:cNvPr>
@@ -8871,8 +9161,8 @@
         </p:nvSpPr>
         <p:spPr>
           <a:xfrm>
-            <a:off x="4120110" y="721828"/>
-            <a:ext cx="309700" cy="369332"/>
+            <a:off x="7768059" y="433360"/>
+            <a:ext cx="340158" cy="369332"/>
           </a:xfrm>
           <a:prstGeom prst="rect">
             <a:avLst/>
@@ -8887,17 +9177,17 @@
           <a:p>
             <a:r>
               <a:rPr lang="en-US" dirty="0"/>
-              <a:t>R</a:t>
+              <a:t>Q</a:t>
             </a:r>
           </a:p>
         </p:txBody>
       </p:sp>
       <p:sp>
         <p:nvSpPr>
-          <p:cNvPr id="84" name="TextBox 83">
+          <p:cNvPr id="234" name="TextBox 233">
             <a:extLst>
               <a:ext uri="{FF2B5EF4-FFF2-40B4-BE49-F238E27FC236}">
-                <a16:creationId xmlns:a16="http://schemas.microsoft.com/office/drawing/2014/main" id="{33C170D1-3084-57C3-1B03-8B449DB5703B}"/>
+                <a16:creationId xmlns:a16="http://schemas.microsoft.com/office/drawing/2014/main" id="{66D19437-939F-5A79-99D5-F72C4DEC4C95}"/>
               </a:ext>
             </a:extLst>
           </p:cNvPr>
@@ -8906,8 +9196,8 @@
         </p:nvSpPr>
         <p:spPr>
           <a:xfrm>
-            <a:off x="5894110" y="682971"/>
-            <a:ext cx="290464" cy="369332"/>
+            <a:off x="6989272" y="1902203"/>
+            <a:ext cx="336952" cy="369332"/>
           </a:xfrm>
           <a:prstGeom prst="rect">
             <a:avLst/>
@@ -8922,55 +9212,11 @@
           <a:p>
             <a:r>
               <a:rPr lang="en-US" dirty="0"/>
-              <a:t>S</a:t>
+              <a:t>O</a:t>
             </a:r>
           </a:p>
         </p:txBody>
       </p:sp>
-      <p:cxnSp>
-        <p:nvCxnSpPr>
-          <p:cNvPr id="20" name="Connector: Elbow 19">
-            <a:extLst>
-              <a:ext uri="{FF2B5EF4-FFF2-40B4-BE49-F238E27FC236}">
-                <a16:creationId xmlns:a16="http://schemas.microsoft.com/office/drawing/2014/main" id="{594EA61F-5C02-983F-DB32-D462FD79F789}"/>
-              </a:ext>
-            </a:extLst>
-          </p:cNvPr>
-          <p:cNvCxnSpPr>
-            <a:stCxn id="5" idx="3"/>
-            <a:endCxn id="24" idx="0"/>
-          </p:cNvCxnSpPr>
-          <p:nvPr/>
-        </p:nvCxnSpPr>
-        <p:spPr>
-          <a:xfrm>
-            <a:off x="10033727" y="1106563"/>
-            <a:ext cx="871798" cy="1159881"/>
-          </a:xfrm>
-          <a:prstGeom prst="bentConnector2">
-            <a:avLst/>
-          </a:prstGeom>
-          <a:ln w="38100" cmpd="sng">
-            <a:solidFill>
-              <a:schemeClr val="tx1"/>
-            </a:solidFill>
-          </a:ln>
-        </p:spPr>
-        <p:style>
-          <a:lnRef idx="1">
-            <a:schemeClr val="accent1"/>
-          </a:lnRef>
-          <a:fillRef idx="0">
-            <a:schemeClr val="accent1"/>
-          </a:fillRef>
-          <a:effectRef idx="0">
-            <a:schemeClr val="accent1"/>
-          </a:effectRef>
-          <a:fontRef idx="minor">
-            <a:schemeClr val="tx1"/>
-          </a:fontRef>
-        </p:style>
-      </p:cxnSp>
     </p:spTree>
     <p:extLst>
       <p:ext uri="{BB962C8B-B14F-4D97-AF65-F5344CB8AC3E}">
@@ -13551,7 +13797,7 @@
         <p:spPr>
           <a:xfrm>
             <a:off x="6096000" y="-1"/>
-            <a:ext cx="6096000" cy="4385816"/>
+            <a:ext cx="6096000" cy="3554819"/>
           </a:xfrm>
           <a:prstGeom prst="rect">
             <a:avLst/>
@@ -13587,11 +13833,11 @@
             </a:pPr>
             <a:r>
               <a:rPr lang="en-US" b="1" dirty="0"/>
-              <a:t>PARTICIPATES</a:t>
+              <a:t>PROMOTES</a:t>
             </a:r>
             <a:r>
               <a:rPr lang="en-US" dirty="0"/>
-              <a:t>: &lt;PROMOTION, STORE&gt;, P:Q, TOTAL/PARTIAL;</a:t>
+              <a:t>:&lt;COFFEE, PROMOTION, STORE&gt;, P:Q:O, PARTIAL/TOTAL/PARTIAL;</a:t>
             </a:r>
           </a:p>
           <a:p>
@@ -13603,11 +13849,11 @@
             </a:pPr>
             <a:r>
               <a:rPr lang="en-US" b="1" dirty="0"/>
-              <a:t>PROMOTES</a:t>
+              <a:t>CONTAINS</a:t>
             </a:r>
             <a:r>
               <a:rPr lang="en-US" dirty="0"/>
-              <a:t>:&lt;COFFEE, PROMOTION&gt;, R:S, PARTIAL/PARTIAL;</a:t>
+              <a:t>: &lt;COFFEE, SALE&gt;, 1:R, PARTIAL/TOTAL;</a:t>
             </a:r>
           </a:p>
           <a:p>
@@ -13619,11 +13865,11 @@
             </a:pPr>
             <a:r>
               <a:rPr lang="en-US" b="1" dirty="0"/>
-              <a:t>CONTAINS</a:t>
+              <a:t>RECEIVES: </a:t>
             </a:r>
             <a:r>
               <a:rPr lang="en-US" dirty="0"/>
-              <a:t>: &lt;COFFEE, SALE&gt;, 1:T, PARTIAL/TOTAL;</a:t>
+              <a:t>&lt;CUSTOMER, SALE&gt;, 1:N, PARTIAL/TOTAL;</a:t>
             </a:r>
           </a:p>
           <a:p>
@@ -13635,27 +13881,11 @@
             </a:pPr>
             <a:r>
               <a:rPr lang="en-US" b="1" dirty="0"/>
-              <a:t>RECEIVES: </a:t>
+              <a:t>TRANSACTION: </a:t>
             </a:r>
             <a:r>
               <a:rPr lang="en-US" dirty="0"/>
-              <a:t>&lt;CUSTOMER, SALE&gt;, 1:N, PARTIAL/TOTAL;</a:t>
-            </a:r>
-          </a:p>
-          <a:p>
-            <a:pPr marL="742950" indent="-742950">
-              <a:lnSpc>
-                <a:spcPct val="150000"/>
-              </a:lnSpc>
-              <a:buAutoNum type="arabicPeriod"/>
-            </a:pPr>
-            <a:r>
-              <a:rPr lang="en-US" b="1" dirty="0"/>
-              <a:t>TRANSACTION: </a:t>
-            </a:r>
-            <a:r>
-              <a:rPr lang="en-US" dirty="0"/>
-              <a:t>&lt;SALE, STORE&gt;, M:1, TOTAL/1;</a:t>
+              <a:t>&lt;SALE, STORE&gt;, M:1, TOTAL/PARTIAL;</a:t>
             </a:r>
             <a:endParaRPr lang="en-US" b="1" dirty="0"/>
           </a:p>
@@ -13985,12 +14215,9 @@
             </a:pPr>
             <a:r>
               <a:rPr lang="en-US" sz="1400" dirty="0">
-                <a:highlight>
-                  <a:srgbClr val="FFFF00"/>
-                </a:highlight>
                 <a:latin typeface="+mj-lt"/>
               </a:rPr>
-              <a:t>Each Promotion Will have at least one store where it is promoted thus Promotion will have Total Participation with Store</a:t>
+              <a:t>Each Promotion Will have at least one store and Coffee where it is promoted thus Promotion will have Total Participation with “Promotes”. (Total Participation of this entity will be Enforced through Triggers and is not implemented in the SQL DB of Part 1).</a:t>
             </a:r>
           </a:p>
           <a:p>

</xml_diff>